<commit_message>
Added more slides for different design
</commit_message>
<xml_diff>
--- a/IOVWST-poster-draft.pptx
+++ b/IOVWST-poster-draft.pptx
@@ -2,18 +2,27 @@
 <file path=ppt/presentation.xml><?xml version="1.0" encoding="utf-8"?>
 <p:presentation xmlns:a="http://schemas.openxmlformats.org/drawingml/2006/main" xmlns:r="http://schemas.openxmlformats.org/officeDocument/2006/relationships" xmlns:p="http://schemas.openxmlformats.org/presentationml/2006/main" saveSubsetFonts="1">
   <p:sldMasterIdLst>
-    <p:sldMasterId id="2147483648" r:id="rId1"/>
+    <p:sldMasterId id="2147483672" r:id="rId1"/>
   </p:sldMasterIdLst>
   <p:sldIdLst>
     <p:sldId id="256" r:id="rId2"/>
+    <p:sldId id="257" r:id="rId3"/>
+    <p:sldId id="258" r:id="rId4"/>
+    <p:sldId id="259" r:id="rId5"/>
+    <p:sldId id="260" r:id="rId6"/>
+    <p:sldId id="261" r:id="rId7"/>
+    <p:sldId id="262" r:id="rId8"/>
+    <p:sldId id="263" r:id="rId9"/>
+    <p:sldId id="264" r:id="rId10"/>
+    <p:sldId id="265" r:id="rId11"/>
   </p:sldIdLst>
-  <p:sldSz cx="12192000" cy="6858000"/>
-  <p:notesSz cx="6858000" cy="9144000"/>
+  <p:sldSz cx="41148000" cy="41148000"/>
+  <p:notesSz cx="9144000" cy="6858000"/>
   <p:defaultTextStyle>
     <a:defPPr>
       <a:defRPr lang="en-US"/>
     </a:defPPr>
-    <a:lvl1pPr marL="0" algn="l" defTabSz="914400" rtl="0" eaLnBrk="1" latinLnBrk="0" hangingPunct="1">
+    <a:lvl1pPr marL="0" algn="l" defTabSz="457200" rtl="0" eaLnBrk="1" latinLnBrk="0" hangingPunct="1">
       <a:defRPr sz="1800" kern="1200">
         <a:solidFill>
           <a:schemeClr val="tx1"/>
@@ -23,7 +32,7 @@
         <a:cs typeface="+mn-cs"/>
       </a:defRPr>
     </a:lvl1pPr>
-    <a:lvl2pPr marL="457200" algn="l" defTabSz="914400" rtl="0" eaLnBrk="1" latinLnBrk="0" hangingPunct="1">
+    <a:lvl2pPr marL="457200" algn="l" defTabSz="457200" rtl="0" eaLnBrk="1" latinLnBrk="0" hangingPunct="1">
       <a:defRPr sz="1800" kern="1200">
         <a:solidFill>
           <a:schemeClr val="tx1"/>
@@ -33,7 +42,7 @@
         <a:cs typeface="+mn-cs"/>
       </a:defRPr>
     </a:lvl2pPr>
-    <a:lvl3pPr marL="914400" algn="l" defTabSz="914400" rtl="0" eaLnBrk="1" latinLnBrk="0" hangingPunct="1">
+    <a:lvl3pPr marL="914400" algn="l" defTabSz="457200" rtl="0" eaLnBrk="1" latinLnBrk="0" hangingPunct="1">
       <a:defRPr sz="1800" kern="1200">
         <a:solidFill>
           <a:schemeClr val="tx1"/>
@@ -43,7 +52,7 @@
         <a:cs typeface="+mn-cs"/>
       </a:defRPr>
     </a:lvl3pPr>
-    <a:lvl4pPr marL="1371600" algn="l" defTabSz="914400" rtl="0" eaLnBrk="1" latinLnBrk="0" hangingPunct="1">
+    <a:lvl4pPr marL="1371600" algn="l" defTabSz="457200" rtl="0" eaLnBrk="1" latinLnBrk="0" hangingPunct="1">
       <a:defRPr sz="1800" kern="1200">
         <a:solidFill>
           <a:schemeClr val="tx1"/>
@@ -53,7 +62,7 @@
         <a:cs typeface="+mn-cs"/>
       </a:defRPr>
     </a:lvl4pPr>
-    <a:lvl5pPr marL="1828800" algn="l" defTabSz="914400" rtl="0" eaLnBrk="1" latinLnBrk="0" hangingPunct="1">
+    <a:lvl5pPr marL="1828800" algn="l" defTabSz="457200" rtl="0" eaLnBrk="1" latinLnBrk="0" hangingPunct="1">
       <a:defRPr sz="1800" kern="1200">
         <a:solidFill>
           <a:schemeClr val="tx1"/>
@@ -63,7 +72,7 @@
         <a:cs typeface="+mn-cs"/>
       </a:defRPr>
     </a:lvl5pPr>
-    <a:lvl6pPr marL="2286000" algn="l" defTabSz="914400" rtl="0" eaLnBrk="1" latinLnBrk="0" hangingPunct="1">
+    <a:lvl6pPr marL="2286000" algn="l" defTabSz="457200" rtl="0" eaLnBrk="1" latinLnBrk="0" hangingPunct="1">
       <a:defRPr sz="1800" kern="1200">
         <a:solidFill>
           <a:schemeClr val="tx1"/>
@@ -73,7 +82,7 @@
         <a:cs typeface="+mn-cs"/>
       </a:defRPr>
     </a:lvl6pPr>
-    <a:lvl7pPr marL="2743200" algn="l" defTabSz="914400" rtl="0" eaLnBrk="1" latinLnBrk="0" hangingPunct="1">
+    <a:lvl7pPr marL="2743200" algn="l" defTabSz="457200" rtl="0" eaLnBrk="1" latinLnBrk="0" hangingPunct="1">
       <a:defRPr sz="1800" kern="1200">
         <a:solidFill>
           <a:schemeClr val="tx1"/>
@@ -83,7 +92,7 @@
         <a:cs typeface="+mn-cs"/>
       </a:defRPr>
     </a:lvl7pPr>
-    <a:lvl8pPr marL="3200400" algn="l" defTabSz="914400" rtl="0" eaLnBrk="1" latinLnBrk="0" hangingPunct="1">
+    <a:lvl8pPr marL="3200400" algn="l" defTabSz="457200" rtl="0" eaLnBrk="1" latinLnBrk="0" hangingPunct="1">
       <a:defRPr sz="1800" kern="1200">
         <a:solidFill>
           <a:schemeClr val="tx1"/>
@@ -93,7 +102,7 @@
         <a:cs typeface="+mn-cs"/>
       </a:defRPr>
     </a:lvl8pPr>
-    <a:lvl9pPr marL="3657600" algn="l" defTabSz="914400" rtl="0" eaLnBrk="1" latinLnBrk="0" hangingPunct="1">
+    <a:lvl9pPr marL="3657600" algn="l" defTabSz="457200" rtl="0" eaLnBrk="1" latinLnBrk="0" hangingPunct="1">
       <a:defRPr sz="1800" kern="1200">
         <a:solidFill>
           <a:schemeClr val="tx1"/>
@@ -104,6 +113,11 @@
       </a:defRPr>
     </a:lvl9pPr>
   </p:defaultTextStyle>
+  <p:extLst>
+    <p:ext uri="{EFAFB233-063F-42B5-8137-9DF3F51BA10A}">
+      <p15:sldGuideLst xmlns:p15="http://schemas.microsoft.com/office/powerpoint/2012/main"/>
+    </p:ext>
+  </p:extLst>
 </p:presentation>
 </file>
 
@@ -122,18 +136,9 @@
 <file path=ppt/comments/comment1.xml><?xml version="1.0" encoding="utf-8"?>
 <p:cmLst xmlns:a="http://schemas.openxmlformats.org/drawingml/2006/main" xmlns:r="http://schemas.openxmlformats.org/officeDocument/2006/relationships" xmlns:p="http://schemas.openxmlformats.org/presentationml/2006/main">
   <p:cm authorId="1" dt="2021-01-21T17:11:25.781" idx="1">
-    <p:pos x="97" y="1857"/>
+    <p:pos x="625" y="6225"/>
     <p:text>Way too much text for a poster abstract</p:text>
-    <p:extLst>
-      <p:ext uri="{C676402C-5697-4E1C-873F-D02D1690AC5C}">
-        <p15:threadingInfo xmlns:p15="http://schemas.microsoft.com/office/powerpoint/2012/main" timeZoneBias="480"/>
-      </p:ext>
-    </p:extLst>
-  </p:cm>
-  <p:cm authorId="1" dt="2021-01-21T17:12:04.709" idx="2">
-    <p:pos x="2461" y="1275"/>
-    <p:text>Anna recommended following the format that appeared at OSM20 where the conclusion was given the entire middle panel.</p:text>
-    <p:extLst>
+    <p:extLst mod="1">
       <p:ext uri="{C676402C-5697-4E1C-873F-D02D1690AC5C}">
         <p15:threadingInfo xmlns:p15="http://schemas.microsoft.com/office/powerpoint/2012/main" timeZoneBias="480"/>
       </p:ext>
@@ -188,13 +193,7 @@
       </p:grpSpPr>
       <p:sp>
         <p:nvSpPr>
-          <p:cNvPr id="2" name="Title 1">
-            <a:extLst>
-              <a:ext uri="{FF2B5EF4-FFF2-40B4-BE49-F238E27FC236}">
-                <a16:creationId xmlns:a16="http://schemas.microsoft.com/office/drawing/2014/main" id="{20B43611-067C-4E00-B813-089299CEB53F}"/>
-              </a:ext>
-            </a:extLst>
-          </p:cNvPr>
+          <p:cNvPr id="2" name="Title 1"/>
           <p:cNvSpPr>
             <a:spLocks noGrp="1"/>
           </p:cNvSpPr>
@@ -204,15 +203,15 @@
         </p:nvSpPr>
         <p:spPr>
           <a:xfrm>
-            <a:off x="1524000" y="1122363"/>
-            <a:ext cx="9144000" cy="2387600"/>
+            <a:off x="3086100" y="6734178"/>
+            <a:ext cx="34975800" cy="14325600"/>
           </a:xfrm>
         </p:spPr>
         <p:txBody>
           <a:bodyPr anchor="b"/>
           <a:lstStyle>
             <a:lvl1pPr algn="ctr">
-              <a:defRPr sz="6000"/>
+              <a:defRPr sz="27000"/>
             </a:lvl1pPr>
           </a:lstStyle>
           <a:p>
@@ -220,18 +219,13 @@
               <a:rPr lang="en-US"/>
               <a:t>Click to edit Master title style</a:t>
             </a:r>
-          </a:p>
-        </p:txBody>
-      </p:sp>
-      <p:sp>
-        <p:nvSpPr>
-          <p:cNvPr id="3" name="Subtitle 2">
-            <a:extLst>
-              <a:ext uri="{FF2B5EF4-FFF2-40B4-BE49-F238E27FC236}">
-                <a16:creationId xmlns:a16="http://schemas.microsoft.com/office/drawing/2014/main" id="{FA93D39A-5918-44DB-8BC0-21ED9AFDC956}"/>
-              </a:ext>
-            </a:extLst>
-          </p:cNvPr>
+            <a:endParaRPr lang="en-US" dirty="0"/>
+          </a:p>
+        </p:txBody>
+      </p:sp>
+      <p:sp>
+        <p:nvSpPr>
+          <p:cNvPr id="3" name="Subtitle 2"/>
           <p:cNvSpPr>
             <a:spLocks noGrp="1"/>
           </p:cNvSpPr>
@@ -241,8 +235,8 @@
         </p:nvSpPr>
         <p:spPr>
           <a:xfrm>
-            <a:off x="1524000" y="3602038"/>
-            <a:ext cx="9144000" cy="1655762"/>
+            <a:off x="5143500" y="21612228"/>
+            <a:ext cx="30861000" cy="9934572"/>
           </a:xfrm>
         </p:spPr>
         <p:txBody>
@@ -250,39 +244,39 @@
           <a:lstStyle>
             <a:lvl1pPr marL="0" indent="0" algn="ctr">
               <a:buNone/>
-              <a:defRPr sz="2400"/>
+              <a:defRPr sz="10800"/>
             </a:lvl1pPr>
-            <a:lvl2pPr marL="457200" indent="0" algn="ctr">
-              <a:buNone/>
-              <a:defRPr sz="2000"/>
+            <a:lvl2pPr marL="2057400" indent="0" algn="ctr">
+              <a:buNone/>
+              <a:defRPr sz="9000"/>
             </a:lvl2pPr>
-            <a:lvl3pPr marL="914400" indent="0" algn="ctr">
-              <a:buNone/>
-              <a:defRPr sz="1800"/>
+            <a:lvl3pPr marL="4114800" indent="0" algn="ctr">
+              <a:buNone/>
+              <a:defRPr sz="8100"/>
             </a:lvl3pPr>
-            <a:lvl4pPr marL="1371600" indent="0" algn="ctr">
-              <a:buNone/>
-              <a:defRPr sz="1600"/>
+            <a:lvl4pPr marL="6172200" indent="0" algn="ctr">
+              <a:buNone/>
+              <a:defRPr sz="7200"/>
             </a:lvl4pPr>
-            <a:lvl5pPr marL="1828800" indent="0" algn="ctr">
-              <a:buNone/>
-              <a:defRPr sz="1600"/>
+            <a:lvl5pPr marL="8229600" indent="0" algn="ctr">
+              <a:buNone/>
+              <a:defRPr sz="7200"/>
             </a:lvl5pPr>
-            <a:lvl6pPr marL="2286000" indent="0" algn="ctr">
-              <a:buNone/>
-              <a:defRPr sz="1600"/>
+            <a:lvl6pPr marL="10287000" indent="0" algn="ctr">
+              <a:buNone/>
+              <a:defRPr sz="7200"/>
             </a:lvl6pPr>
-            <a:lvl7pPr marL="2743200" indent="0" algn="ctr">
-              <a:buNone/>
-              <a:defRPr sz="1600"/>
+            <a:lvl7pPr marL="12344400" indent="0" algn="ctr">
+              <a:buNone/>
+              <a:defRPr sz="7200"/>
             </a:lvl7pPr>
-            <a:lvl8pPr marL="3200400" indent="0" algn="ctr">
-              <a:buNone/>
-              <a:defRPr sz="1600"/>
+            <a:lvl8pPr marL="14401800" indent="0" algn="ctr">
+              <a:buNone/>
+              <a:defRPr sz="7200"/>
             </a:lvl8pPr>
-            <a:lvl9pPr marL="3657600" indent="0" algn="ctr">
-              <a:buNone/>
-              <a:defRPr sz="1600"/>
+            <a:lvl9pPr marL="16459200" indent="0" algn="ctr">
+              <a:buNone/>
+              <a:defRPr sz="7200"/>
             </a:lvl9pPr>
           </a:lstStyle>
           <a:p>
@@ -290,18 +284,13 @@
               <a:rPr lang="en-US"/>
               <a:t>Click to edit Master subtitle style</a:t>
             </a:r>
-          </a:p>
-        </p:txBody>
-      </p:sp>
-      <p:sp>
-        <p:nvSpPr>
-          <p:cNvPr id="4" name="Date Placeholder 3">
-            <a:extLst>
-              <a:ext uri="{FF2B5EF4-FFF2-40B4-BE49-F238E27FC236}">
-                <a16:creationId xmlns:a16="http://schemas.microsoft.com/office/drawing/2014/main" id="{CFA89EC5-EE00-4430-B03E-38649A0BF34F}"/>
-              </a:ext>
-            </a:extLst>
-          </p:cNvPr>
+            <a:endParaRPr lang="en-US" dirty="0"/>
+          </a:p>
+        </p:txBody>
+      </p:sp>
+      <p:sp>
+        <p:nvSpPr>
+          <p:cNvPr id="4" name="Date Placeholder 3"/>
           <p:cNvSpPr>
             <a:spLocks noGrp="1"/>
           </p:cNvSpPr>
@@ -316,7 +305,7 @@
           <a:p>
             <a:fld id="{AABE0D5F-EF8E-4089-A75E-93EF4FB18C62}" type="datetimeFigureOut">
               <a:rPr lang="en-US" smtClean="0"/>
-              <a:t>1/21/2021</a:t>
+              <a:t>1/27/2021</a:t>
             </a:fld>
             <a:endParaRPr lang="en-US"/>
           </a:p>
@@ -324,13 +313,7 @@
       </p:sp>
       <p:sp>
         <p:nvSpPr>
-          <p:cNvPr id="5" name="Footer Placeholder 4">
-            <a:extLst>
-              <a:ext uri="{FF2B5EF4-FFF2-40B4-BE49-F238E27FC236}">
-                <a16:creationId xmlns:a16="http://schemas.microsoft.com/office/drawing/2014/main" id="{30BCB797-0942-41C3-A9F6-DC3D5F3BA14C}"/>
-              </a:ext>
-            </a:extLst>
-          </p:cNvPr>
+          <p:cNvPr id="5" name="Footer Placeholder 4"/>
           <p:cNvSpPr>
             <a:spLocks noGrp="1"/>
           </p:cNvSpPr>
@@ -349,13 +332,7 @@
       </p:sp>
       <p:sp>
         <p:nvSpPr>
-          <p:cNvPr id="6" name="Slide Number Placeholder 5">
-            <a:extLst>
-              <a:ext uri="{FF2B5EF4-FFF2-40B4-BE49-F238E27FC236}">
-                <a16:creationId xmlns:a16="http://schemas.microsoft.com/office/drawing/2014/main" id="{8A11DE9E-429D-4A5E-B906-029C1273A534}"/>
-              </a:ext>
-            </a:extLst>
-          </p:cNvPr>
+          <p:cNvPr id="6" name="Slide Number Placeholder 5"/>
           <p:cNvSpPr>
             <a:spLocks noGrp="1"/>
           </p:cNvSpPr>
@@ -379,7 +356,7 @@
     </p:spTree>
     <p:extLst>
       <p:ext uri="{BB962C8B-B14F-4D97-AF65-F5344CB8AC3E}">
-        <p14:creationId xmlns:p14="http://schemas.microsoft.com/office/powerpoint/2010/main" val="947957637"/>
+        <p14:creationId xmlns:p14="http://schemas.microsoft.com/office/powerpoint/2010/main" val="46002443"/>
       </p:ext>
     </p:extLst>
   </p:cSld>
@@ -408,13 +385,7 @@
       </p:grpSpPr>
       <p:sp>
         <p:nvSpPr>
-          <p:cNvPr id="2" name="Title 1">
-            <a:extLst>
-              <a:ext uri="{FF2B5EF4-FFF2-40B4-BE49-F238E27FC236}">
-                <a16:creationId xmlns:a16="http://schemas.microsoft.com/office/drawing/2014/main" id="{46C6743E-90C5-4954-9E4E-C0BE074C8E30}"/>
-              </a:ext>
-            </a:extLst>
-          </p:cNvPr>
+          <p:cNvPr id="2" name="Title 1"/>
           <p:cNvSpPr>
             <a:spLocks noGrp="1"/>
           </p:cNvSpPr>
@@ -431,18 +402,13 @@
               <a:rPr lang="en-US"/>
               <a:t>Click to edit Master title style</a:t>
             </a:r>
-          </a:p>
-        </p:txBody>
-      </p:sp>
-      <p:sp>
-        <p:nvSpPr>
-          <p:cNvPr id="3" name="Vertical Text Placeholder 2">
-            <a:extLst>
-              <a:ext uri="{FF2B5EF4-FFF2-40B4-BE49-F238E27FC236}">
-                <a16:creationId xmlns:a16="http://schemas.microsoft.com/office/drawing/2014/main" id="{5D557B96-F0CC-4C67-B938-4FD486ADE365}"/>
-              </a:ext>
-            </a:extLst>
-          </p:cNvPr>
+            <a:endParaRPr lang="en-US" dirty="0"/>
+          </a:p>
+        </p:txBody>
+      </p:sp>
+      <p:sp>
+        <p:nvSpPr>
+          <p:cNvPr id="3" name="Vertical Text Placeholder 2"/>
           <p:cNvSpPr>
             <a:spLocks noGrp="1"/>
           </p:cNvSpPr>
@@ -488,18 +454,13 @@
               <a:rPr lang="en-US"/>
               <a:t>Fifth level</a:t>
             </a:r>
-          </a:p>
-        </p:txBody>
-      </p:sp>
-      <p:sp>
-        <p:nvSpPr>
-          <p:cNvPr id="4" name="Date Placeholder 3">
-            <a:extLst>
-              <a:ext uri="{FF2B5EF4-FFF2-40B4-BE49-F238E27FC236}">
-                <a16:creationId xmlns:a16="http://schemas.microsoft.com/office/drawing/2014/main" id="{BF49DE17-D6AE-4DFF-B658-AC4586E6AF6C}"/>
-              </a:ext>
-            </a:extLst>
-          </p:cNvPr>
+            <a:endParaRPr lang="en-US" dirty="0"/>
+          </a:p>
+        </p:txBody>
+      </p:sp>
+      <p:sp>
+        <p:nvSpPr>
+          <p:cNvPr id="4" name="Date Placeholder 3"/>
           <p:cNvSpPr>
             <a:spLocks noGrp="1"/>
           </p:cNvSpPr>
@@ -514,7 +475,7 @@
           <a:p>
             <a:fld id="{AABE0D5F-EF8E-4089-A75E-93EF4FB18C62}" type="datetimeFigureOut">
               <a:rPr lang="en-US" smtClean="0"/>
-              <a:t>1/21/2021</a:t>
+              <a:t>1/27/2021</a:t>
             </a:fld>
             <a:endParaRPr lang="en-US"/>
           </a:p>
@@ -522,13 +483,7 @@
       </p:sp>
       <p:sp>
         <p:nvSpPr>
-          <p:cNvPr id="5" name="Footer Placeholder 4">
-            <a:extLst>
-              <a:ext uri="{FF2B5EF4-FFF2-40B4-BE49-F238E27FC236}">
-                <a16:creationId xmlns:a16="http://schemas.microsoft.com/office/drawing/2014/main" id="{920259C1-EC8E-477C-B682-72647CD1D05C}"/>
-              </a:ext>
-            </a:extLst>
-          </p:cNvPr>
+          <p:cNvPr id="5" name="Footer Placeholder 4"/>
           <p:cNvSpPr>
             <a:spLocks noGrp="1"/>
           </p:cNvSpPr>
@@ -547,13 +502,7 @@
       </p:sp>
       <p:sp>
         <p:nvSpPr>
-          <p:cNvPr id="6" name="Slide Number Placeholder 5">
-            <a:extLst>
-              <a:ext uri="{FF2B5EF4-FFF2-40B4-BE49-F238E27FC236}">
-                <a16:creationId xmlns:a16="http://schemas.microsoft.com/office/drawing/2014/main" id="{0F57DD9A-FC17-4B97-BD5A-6F0756ECD107}"/>
-              </a:ext>
-            </a:extLst>
-          </p:cNvPr>
+          <p:cNvPr id="6" name="Slide Number Placeholder 5"/>
           <p:cNvSpPr>
             <a:spLocks noGrp="1"/>
           </p:cNvSpPr>
@@ -577,7 +526,7 @@
     </p:spTree>
     <p:extLst>
       <p:ext uri="{BB962C8B-B14F-4D97-AF65-F5344CB8AC3E}">
-        <p14:creationId xmlns:p14="http://schemas.microsoft.com/office/powerpoint/2010/main" val="616711167"/>
+        <p14:creationId xmlns:p14="http://schemas.microsoft.com/office/powerpoint/2010/main" val="1544384509"/>
       </p:ext>
     </p:extLst>
   </p:cSld>
@@ -606,13 +555,7 @@
       </p:grpSpPr>
       <p:sp>
         <p:nvSpPr>
-          <p:cNvPr id="2" name="Vertical Title 1">
-            <a:extLst>
-              <a:ext uri="{FF2B5EF4-FFF2-40B4-BE49-F238E27FC236}">
-                <a16:creationId xmlns:a16="http://schemas.microsoft.com/office/drawing/2014/main" id="{57469E0F-461F-4B18-822D-F951F2313A6F}"/>
-              </a:ext>
-            </a:extLst>
-          </p:cNvPr>
+          <p:cNvPr id="2" name="Vertical Title 1"/>
           <p:cNvSpPr>
             <a:spLocks noGrp="1"/>
           </p:cNvSpPr>
@@ -622,8 +565,8 @@
         </p:nvSpPr>
         <p:spPr>
           <a:xfrm>
-            <a:off x="8724900" y="365125"/>
-            <a:ext cx="2628900" cy="5811838"/>
+            <a:off x="29446540" y="2190750"/>
+            <a:ext cx="8872538" cy="34871028"/>
           </a:xfrm>
         </p:spPr>
         <p:txBody>
@@ -634,18 +577,13 @@
               <a:rPr lang="en-US"/>
               <a:t>Click to edit Master title style</a:t>
             </a:r>
-          </a:p>
-        </p:txBody>
-      </p:sp>
-      <p:sp>
-        <p:nvSpPr>
-          <p:cNvPr id="3" name="Vertical Text Placeholder 2">
-            <a:extLst>
-              <a:ext uri="{FF2B5EF4-FFF2-40B4-BE49-F238E27FC236}">
-                <a16:creationId xmlns:a16="http://schemas.microsoft.com/office/drawing/2014/main" id="{AB2353EF-0303-496D-A01F-AEBE48EF20B7}"/>
-              </a:ext>
-            </a:extLst>
-          </p:cNvPr>
+            <a:endParaRPr lang="en-US" dirty="0"/>
+          </a:p>
+        </p:txBody>
+      </p:sp>
+      <p:sp>
+        <p:nvSpPr>
+          <p:cNvPr id="3" name="Vertical Text Placeholder 2"/>
           <p:cNvSpPr>
             <a:spLocks noGrp="1"/>
           </p:cNvSpPr>
@@ -655,8 +593,8 @@
         </p:nvSpPr>
         <p:spPr>
           <a:xfrm>
-            <a:off x="838200" y="365125"/>
-            <a:ext cx="7734300" cy="5811838"/>
+            <a:off x="2828927" y="2190750"/>
+            <a:ext cx="26103263" cy="34871028"/>
           </a:xfrm>
         </p:spPr>
         <p:txBody>
@@ -696,18 +634,13 @@
               <a:rPr lang="en-US"/>
               <a:t>Fifth level</a:t>
             </a:r>
-          </a:p>
-        </p:txBody>
-      </p:sp>
-      <p:sp>
-        <p:nvSpPr>
-          <p:cNvPr id="4" name="Date Placeholder 3">
-            <a:extLst>
-              <a:ext uri="{FF2B5EF4-FFF2-40B4-BE49-F238E27FC236}">
-                <a16:creationId xmlns:a16="http://schemas.microsoft.com/office/drawing/2014/main" id="{799909A8-8660-4552-A5BF-40FC458A6193}"/>
-              </a:ext>
-            </a:extLst>
-          </p:cNvPr>
+            <a:endParaRPr lang="en-US" dirty="0"/>
+          </a:p>
+        </p:txBody>
+      </p:sp>
+      <p:sp>
+        <p:nvSpPr>
+          <p:cNvPr id="4" name="Date Placeholder 3"/>
           <p:cNvSpPr>
             <a:spLocks noGrp="1"/>
           </p:cNvSpPr>
@@ -722,7 +655,7 @@
           <a:p>
             <a:fld id="{AABE0D5F-EF8E-4089-A75E-93EF4FB18C62}" type="datetimeFigureOut">
               <a:rPr lang="en-US" smtClean="0"/>
-              <a:t>1/21/2021</a:t>
+              <a:t>1/27/2021</a:t>
             </a:fld>
             <a:endParaRPr lang="en-US"/>
           </a:p>
@@ -730,13 +663,7 @@
       </p:sp>
       <p:sp>
         <p:nvSpPr>
-          <p:cNvPr id="5" name="Footer Placeholder 4">
-            <a:extLst>
-              <a:ext uri="{FF2B5EF4-FFF2-40B4-BE49-F238E27FC236}">
-                <a16:creationId xmlns:a16="http://schemas.microsoft.com/office/drawing/2014/main" id="{41BCB527-E5CD-465F-B322-0DAA39A83B77}"/>
-              </a:ext>
-            </a:extLst>
-          </p:cNvPr>
+          <p:cNvPr id="5" name="Footer Placeholder 4"/>
           <p:cNvSpPr>
             <a:spLocks noGrp="1"/>
           </p:cNvSpPr>
@@ -755,13 +682,7 @@
       </p:sp>
       <p:sp>
         <p:nvSpPr>
-          <p:cNvPr id="6" name="Slide Number Placeholder 5">
-            <a:extLst>
-              <a:ext uri="{FF2B5EF4-FFF2-40B4-BE49-F238E27FC236}">
-                <a16:creationId xmlns:a16="http://schemas.microsoft.com/office/drawing/2014/main" id="{AE794991-487C-43D4-A960-D730371A756D}"/>
-              </a:ext>
-            </a:extLst>
-          </p:cNvPr>
+          <p:cNvPr id="6" name="Slide Number Placeholder 5"/>
           <p:cNvSpPr>
             <a:spLocks noGrp="1"/>
           </p:cNvSpPr>
@@ -785,7 +706,7 @@
     </p:spTree>
     <p:extLst>
       <p:ext uri="{BB962C8B-B14F-4D97-AF65-F5344CB8AC3E}">
-        <p14:creationId xmlns:p14="http://schemas.microsoft.com/office/powerpoint/2010/main" val="4230810340"/>
+        <p14:creationId xmlns:p14="http://schemas.microsoft.com/office/powerpoint/2010/main" val="3771286506"/>
       </p:ext>
     </p:extLst>
   </p:cSld>
@@ -814,13 +735,7 @@
       </p:grpSpPr>
       <p:sp>
         <p:nvSpPr>
-          <p:cNvPr id="2" name="Title 1">
-            <a:extLst>
-              <a:ext uri="{FF2B5EF4-FFF2-40B4-BE49-F238E27FC236}">
-                <a16:creationId xmlns:a16="http://schemas.microsoft.com/office/drawing/2014/main" id="{4C7ADBBC-27D3-40EE-AAB5-BF06BD48412D}"/>
-              </a:ext>
-            </a:extLst>
-          </p:cNvPr>
+          <p:cNvPr id="2" name="Title 1"/>
           <p:cNvSpPr>
             <a:spLocks noGrp="1"/>
           </p:cNvSpPr>
@@ -837,18 +752,13 @@
               <a:rPr lang="en-US"/>
               <a:t>Click to edit Master title style</a:t>
             </a:r>
-          </a:p>
-        </p:txBody>
-      </p:sp>
-      <p:sp>
-        <p:nvSpPr>
-          <p:cNvPr id="3" name="Content Placeholder 2">
-            <a:extLst>
-              <a:ext uri="{FF2B5EF4-FFF2-40B4-BE49-F238E27FC236}">
-                <a16:creationId xmlns:a16="http://schemas.microsoft.com/office/drawing/2014/main" id="{B1279D9B-8E26-4D5E-8559-712DA4CED6C0}"/>
-              </a:ext>
-            </a:extLst>
-          </p:cNvPr>
+            <a:endParaRPr lang="en-US" dirty="0"/>
+          </a:p>
+        </p:txBody>
+      </p:sp>
+      <p:sp>
+        <p:nvSpPr>
+          <p:cNvPr id="3" name="Content Placeholder 2"/>
           <p:cNvSpPr>
             <a:spLocks noGrp="1"/>
           </p:cNvSpPr>
@@ -894,18 +804,13 @@
               <a:rPr lang="en-US"/>
               <a:t>Fifth level</a:t>
             </a:r>
-          </a:p>
-        </p:txBody>
-      </p:sp>
-      <p:sp>
-        <p:nvSpPr>
-          <p:cNvPr id="4" name="Date Placeholder 3">
-            <a:extLst>
-              <a:ext uri="{FF2B5EF4-FFF2-40B4-BE49-F238E27FC236}">
-                <a16:creationId xmlns:a16="http://schemas.microsoft.com/office/drawing/2014/main" id="{47B4D383-C626-495E-AAD2-19707B518A4E}"/>
-              </a:ext>
-            </a:extLst>
-          </p:cNvPr>
+            <a:endParaRPr lang="en-US" dirty="0"/>
+          </a:p>
+        </p:txBody>
+      </p:sp>
+      <p:sp>
+        <p:nvSpPr>
+          <p:cNvPr id="4" name="Date Placeholder 3"/>
           <p:cNvSpPr>
             <a:spLocks noGrp="1"/>
           </p:cNvSpPr>
@@ -920,7 +825,7 @@
           <a:p>
             <a:fld id="{AABE0D5F-EF8E-4089-A75E-93EF4FB18C62}" type="datetimeFigureOut">
               <a:rPr lang="en-US" smtClean="0"/>
-              <a:t>1/21/2021</a:t>
+              <a:t>1/27/2021</a:t>
             </a:fld>
             <a:endParaRPr lang="en-US"/>
           </a:p>
@@ -928,13 +833,7 @@
       </p:sp>
       <p:sp>
         <p:nvSpPr>
-          <p:cNvPr id="5" name="Footer Placeholder 4">
-            <a:extLst>
-              <a:ext uri="{FF2B5EF4-FFF2-40B4-BE49-F238E27FC236}">
-                <a16:creationId xmlns:a16="http://schemas.microsoft.com/office/drawing/2014/main" id="{8F94CB95-157E-4EB8-89F4-1EC20BE45374}"/>
-              </a:ext>
-            </a:extLst>
-          </p:cNvPr>
+          <p:cNvPr id="5" name="Footer Placeholder 4"/>
           <p:cNvSpPr>
             <a:spLocks noGrp="1"/>
           </p:cNvSpPr>
@@ -953,13 +852,7 @@
       </p:sp>
       <p:sp>
         <p:nvSpPr>
-          <p:cNvPr id="6" name="Slide Number Placeholder 5">
-            <a:extLst>
-              <a:ext uri="{FF2B5EF4-FFF2-40B4-BE49-F238E27FC236}">
-                <a16:creationId xmlns:a16="http://schemas.microsoft.com/office/drawing/2014/main" id="{B0072E86-1464-49DC-85EB-EB930347CF6C}"/>
-              </a:ext>
-            </a:extLst>
-          </p:cNvPr>
+          <p:cNvPr id="6" name="Slide Number Placeholder 5"/>
           <p:cNvSpPr>
             <a:spLocks noGrp="1"/>
           </p:cNvSpPr>
@@ -983,7 +876,7 @@
     </p:spTree>
     <p:extLst>
       <p:ext uri="{BB962C8B-B14F-4D97-AF65-F5344CB8AC3E}">
-        <p14:creationId xmlns:p14="http://schemas.microsoft.com/office/powerpoint/2010/main" val="1020680044"/>
+        <p14:creationId xmlns:p14="http://schemas.microsoft.com/office/powerpoint/2010/main" val="824410792"/>
       </p:ext>
     </p:extLst>
   </p:cSld>
@@ -1012,13 +905,7 @@
       </p:grpSpPr>
       <p:sp>
         <p:nvSpPr>
-          <p:cNvPr id="2" name="Title 1">
-            <a:extLst>
-              <a:ext uri="{FF2B5EF4-FFF2-40B4-BE49-F238E27FC236}">
-                <a16:creationId xmlns:a16="http://schemas.microsoft.com/office/drawing/2014/main" id="{20A41AEC-492C-4B95-9035-B85CA0BC2202}"/>
-              </a:ext>
-            </a:extLst>
-          </p:cNvPr>
+          <p:cNvPr id="2" name="Title 1"/>
           <p:cNvSpPr>
             <a:spLocks noGrp="1"/>
           </p:cNvSpPr>
@@ -1028,15 +915,15 @@
         </p:nvSpPr>
         <p:spPr>
           <a:xfrm>
-            <a:off x="831850" y="1709738"/>
-            <a:ext cx="10515600" cy="2852737"/>
+            <a:off x="2807496" y="10258437"/>
+            <a:ext cx="35490150" cy="17116422"/>
           </a:xfrm>
         </p:spPr>
         <p:txBody>
           <a:bodyPr anchor="b"/>
           <a:lstStyle>
             <a:lvl1pPr>
-              <a:defRPr sz="6000"/>
+              <a:defRPr sz="27000"/>
             </a:lvl1pPr>
           </a:lstStyle>
           <a:p>
@@ -1044,18 +931,13 @@
               <a:rPr lang="en-US"/>
               <a:t>Click to edit Master title style</a:t>
             </a:r>
-          </a:p>
-        </p:txBody>
-      </p:sp>
-      <p:sp>
-        <p:nvSpPr>
-          <p:cNvPr id="3" name="Text Placeholder 2">
-            <a:extLst>
-              <a:ext uri="{FF2B5EF4-FFF2-40B4-BE49-F238E27FC236}">
-                <a16:creationId xmlns:a16="http://schemas.microsoft.com/office/drawing/2014/main" id="{99231421-8762-41AD-85CE-B41DB61CD9B0}"/>
-              </a:ext>
-            </a:extLst>
-          </p:cNvPr>
+            <a:endParaRPr lang="en-US" dirty="0"/>
+          </a:p>
+        </p:txBody>
+      </p:sp>
+      <p:sp>
+        <p:nvSpPr>
+          <p:cNvPr id="3" name="Text Placeholder 2"/>
           <p:cNvSpPr>
             <a:spLocks noGrp="1"/>
           </p:cNvSpPr>
@@ -1065,8 +947,8 @@
         </p:nvSpPr>
         <p:spPr>
           <a:xfrm>
-            <a:off x="831850" y="4589463"/>
-            <a:ext cx="10515600" cy="1500187"/>
+            <a:off x="2807496" y="27536787"/>
+            <a:ext cx="35490150" cy="9001122"/>
           </a:xfrm>
         </p:spPr>
         <p:txBody>
@@ -1074,17 +956,15 @@
           <a:lstStyle>
             <a:lvl1pPr marL="0" indent="0">
               <a:buNone/>
-              <a:defRPr sz="2400">
+              <a:defRPr sz="10800">
                 <a:solidFill>
-                  <a:schemeClr val="tx1">
-                    <a:tint val="75000"/>
-                  </a:schemeClr>
+                  <a:schemeClr val="tx1"/>
                 </a:solidFill>
               </a:defRPr>
             </a:lvl1pPr>
-            <a:lvl2pPr marL="457200" indent="0">
-              <a:buNone/>
-              <a:defRPr sz="2000">
+            <a:lvl2pPr marL="2057400" indent="0">
+              <a:buNone/>
+              <a:defRPr sz="9000">
                 <a:solidFill>
                   <a:schemeClr val="tx1">
                     <a:tint val="75000"/>
@@ -1092,9 +972,9 @@
                 </a:solidFill>
               </a:defRPr>
             </a:lvl2pPr>
-            <a:lvl3pPr marL="914400" indent="0">
-              <a:buNone/>
-              <a:defRPr sz="1800">
+            <a:lvl3pPr marL="4114800" indent="0">
+              <a:buNone/>
+              <a:defRPr sz="8100">
                 <a:solidFill>
                   <a:schemeClr val="tx1">
                     <a:tint val="75000"/>
@@ -1102,9 +982,9 @@
                 </a:solidFill>
               </a:defRPr>
             </a:lvl3pPr>
-            <a:lvl4pPr marL="1371600" indent="0">
-              <a:buNone/>
-              <a:defRPr sz="1600">
+            <a:lvl4pPr marL="6172200" indent="0">
+              <a:buNone/>
+              <a:defRPr sz="7200">
                 <a:solidFill>
                   <a:schemeClr val="tx1">
                     <a:tint val="75000"/>
@@ -1112,9 +992,9 @@
                 </a:solidFill>
               </a:defRPr>
             </a:lvl4pPr>
-            <a:lvl5pPr marL="1828800" indent="0">
-              <a:buNone/>
-              <a:defRPr sz="1600">
+            <a:lvl5pPr marL="8229600" indent="0">
+              <a:buNone/>
+              <a:defRPr sz="7200">
                 <a:solidFill>
                   <a:schemeClr val="tx1">
                     <a:tint val="75000"/>
@@ -1122,9 +1002,9 @@
                 </a:solidFill>
               </a:defRPr>
             </a:lvl5pPr>
-            <a:lvl6pPr marL="2286000" indent="0">
-              <a:buNone/>
-              <a:defRPr sz="1600">
+            <a:lvl6pPr marL="10287000" indent="0">
+              <a:buNone/>
+              <a:defRPr sz="7200">
                 <a:solidFill>
                   <a:schemeClr val="tx1">
                     <a:tint val="75000"/>
@@ -1132,9 +1012,9 @@
                 </a:solidFill>
               </a:defRPr>
             </a:lvl6pPr>
-            <a:lvl7pPr marL="2743200" indent="0">
-              <a:buNone/>
-              <a:defRPr sz="1600">
+            <a:lvl7pPr marL="12344400" indent="0">
+              <a:buNone/>
+              <a:defRPr sz="7200">
                 <a:solidFill>
                   <a:schemeClr val="tx1">
                     <a:tint val="75000"/>
@@ -1142,9 +1022,9 @@
                 </a:solidFill>
               </a:defRPr>
             </a:lvl7pPr>
-            <a:lvl8pPr marL="3200400" indent="0">
-              <a:buNone/>
-              <a:defRPr sz="1600">
+            <a:lvl8pPr marL="14401800" indent="0">
+              <a:buNone/>
+              <a:defRPr sz="7200">
                 <a:solidFill>
                   <a:schemeClr val="tx1">
                     <a:tint val="75000"/>
@@ -1152,9 +1032,9 @@
                 </a:solidFill>
               </a:defRPr>
             </a:lvl8pPr>
-            <a:lvl9pPr marL="3657600" indent="0">
-              <a:buNone/>
-              <a:defRPr sz="1600">
+            <a:lvl9pPr marL="16459200" indent="0">
+              <a:buNone/>
+              <a:defRPr sz="7200">
                 <a:solidFill>
                   <a:schemeClr val="tx1">
                     <a:tint val="75000"/>
@@ -1174,13 +1054,7 @@
       </p:sp>
       <p:sp>
         <p:nvSpPr>
-          <p:cNvPr id="4" name="Date Placeholder 3">
-            <a:extLst>
-              <a:ext uri="{FF2B5EF4-FFF2-40B4-BE49-F238E27FC236}">
-                <a16:creationId xmlns:a16="http://schemas.microsoft.com/office/drawing/2014/main" id="{44725CAD-261F-4F32-BE58-8B8CEBF06187}"/>
-              </a:ext>
-            </a:extLst>
-          </p:cNvPr>
+          <p:cNvPr id="4" name="Date Placeholder 3"/>
           <p:cNvSpPr>
             <a:spLocks noGrp="1"/>
           </p:cNvSpPr>
@@ -1195,7 +1069,7 @@
           <a:p>
             <a:fld id="{AABE0D5F-EF8E-4089-A75E-93EF4FB18C62}" type="datetimeFigureOut">
               <a:rPr lang="en-US" smtClean="0"/>
-              <a:t>1/21/2021</a:t>
+              <a:t>1/27/2021</a:t>
             </a:fld>
             <a:endParaRPr lang="en-US"/>
           </a:p>
@@ -1203,13 +1077,7 @@
       </p:sp>
       <p:sp>
         <p:nvSpPr>
-          <p:cNvPr id="5" name="Footer Placeholder 4">
-            <a:extLst>
-              <a:ext uri="{FF2B5EF4-FFF2-40B4-BE49-F238E27FC236}">
-                <a16:creationId xmlns:a16="http://schemas.microsoft.com/office/drawing/2014/main" id="{C764E3F4-4554-4E95-9EBD-4CC9A97D6F54}"/>
-              </a:ext>
-            </a:extLst>
-          </p:cNvPr>
+          <p:cNvPr id="5" name="Footer Placeholder 4"/>
           <p:cNvSpPr>
             <a:spLocks noGrp="1"/>
           </p:cNvSpPr>
@@ -1228,13 +1096,7 @@
       </p:sp>
       <p:sp>
         <p:nvSpPr>
-          <p:cNvPr id="6" name="Slide Number Placeholder 5">
-            <a:extLst>
-              <a:ext uri="{FF2B5EF4-FFF2-40B4-BE49-F238E27FC236}">
-                <a16:creationId xmlns:a16="http://schemas.microsoft.com/office/drawing/2014/main" id="{A4E372F9-4088-448C-B33D-FD0B1DC14F2E}"/>
-              </a:ext>
-            </a:extLst>
-          </p:cNvPr>
+          <p:cNvPr id="6" name="Slide Number Placeholder 5"/>
           <p:cNvSpPr>
             <a:spLocks noGrp="1"/>
           </p:cNvSpPr>
@@ -1258,7 +1120,7 @@
     </p:spTree>
     <p:extLst>
       <p:ext uri="{BB962C8B-B14F-4D97-AF65-F5344CB8AC3E}">
-        <p14:creationId xmlns:p14="http://schemas.microsoft.com/office/powerpoint/2010/main" val="4031358778"/>
+        <p14:creationId xmlns:p14="http://schemas.microsoft.com/office/powerpoint/2010/main" val="3211194776"/>
       </p:ext>
     </p:extLst>
   </p:cSld>
@@ -1287,13 +1149,7 @@
       </p:grpSpPr>
       <p:sp>
         <p:nvSpPr>
-          <p:cNvPr id="2" name="Title 1">
-            <a:extLst>
-              <a:ext uri="{FF2B5EF4-FFF2-40B4-BE49-F238E27FC236}">
-                <a16:creationId xmlns:a16="http://schemas.microsoft.com/office/drawing/2014/main" id="{BDDDB759-3235-4F2C-9821-1A5FC857CA3F}"/>
-              </a:ext>
-            </a:extLst>
-          </p:cNvPr>
+          <p:cNvPr id="2" name="Title 1"/>
           <p:cNvSpPr>
             <a:spLocks noGrp="1"/>
           </p:cNvSpPr>
@@ -1310,18 +1166,13 @@
               <a:rPr lang="en-US"/>
               <a:t>Click to edit Master title style</a:t>
             </a:r>
-          </a:p>
-        </p:txBody>
-      </p:sp>
-      <p:sp>
-        <p:nvSpPr>
-          <p:cNvPr id="3" name="Content Placeholder 2">
-            <a:extLst>
-              <a:ext uri="{FF2B5EF4-FFF2-40B4-BE49-F238E27FC236}">
-                <a16:creationId xmlns:a16="http://schemas.microsoft.com/office/drawing/2014/main" id="{269BC294-71F7-436D-9FA8-8DC752F1279A}"/>
-              </a:ext>
-            </a:extLst>
-          </p:cNvPr>
+            <a:endParaRPr lang="en-US" dirty="0"/>
+          </a:p>
+        </p:txBody>
+      </p:sp>
+      <p:sp>
+        <p:nvSpPr>
+          <p:cNvPr id="3" name="Content Placeholder 2"/>
           <p:cNvSpPr>
             <a:spLocks noGrp="1"/>
           </p:cNvSpPr>
@@ -1331,8 +1182,8 @@
         </p:nvSpPr>
         <p:spPr>
           <a:xfrm>
-            <a:off x="838200" y="1825625"/>
-            <a:ext cx="5181600" cy="4351338"/>
+            <a:off x="2828925" y="10953750"/>
+            <a:ext cx="17487900" cy="26108028"/>
           </a:xfrm>
         </p:spPr>
         <p:txBody>
@@ -1372,18 +1223,13 @@
               <a:rPr lang="en-US"/>
               <a:t>Fifth level</a:t>
             </a:r>
-          </a:p>
-        </p:txBody>
-      </p:sp>
-      <p:sp>
-        <p:nvSpPr>
-          <p:cNvPr id="4" name="Content Placeholder 3">
-            <a:extLst>
-              <a:ext uri="{FF2B5EF4-FFF2-40B4-BE49-F238E27FC236}">
-                <a16:creationId xmlns:a16="http://schemas.microsoft.com/office/drawing/2014/main" id="{2AB81058-16FD-4AF9-BC5C-4551D19180CA}"/>
-              </a:ext>
-            </a:extLst>
-          </p:cNvPr>
+            <a:endParaRPr lang="en-US" dirty="0"/>
+          </a:p>
+        </p:txBody>
+      </p:sp>
+      <p:sp>
+        <p:nvSpPr>
+          <p:cNvPr id="4" name="Content Placeholder 3"/>
           <p:cNvSpPr>
             <a:spLocks noGrp="1"/>
           </p:cNvSpPr>
@@ -1393,8 +1239,8 @@
         </p:nvSpPr>
         <p:spPr>
           <a:xfrm>
-            <a:off x="6172200" y="1825625"/>
-            <a:ext cx="5181600" cy="4351338"/>
+            <a:off x="20831175" y="10953750"/>
+            <a:ext cx="17487900" cy="26108028"/>
           </a:xfrm>
         </p:spPr>
         <p:txBody>
@@ -1434,18 +1280,13 @@
               <a:rPr lang="en-US"/>
               <a:t>Fifth level</a:t>
             </a:r>
-          </a:p>
-        </p:txBody>
-      </p:sp>
-      <p:sp>
-        <p:nvSpPr>
-          <p:cNvPr id="5" name="Date Placeholder 4">
-            <a:extLst>
-              <a:ext uri="{FF2B5EF4-FFF2-40B4-BE49-F238E27FC236}">
-                <a16:creationId xmlns:a16="http://schemas.microsoft.com/office/drawing/2014/main" id="{9584EF3A-78E7-475B-A491-E7BBBEF60131}"/>
-              </a:ext>
-            </a:extLst>
-          </p:cNvPr>
+            <a:endParaRPr lang="en-US" dirty="0"/>
+          </a:p>
+        </p:txBody>
+      </p:sp>
+      <p:sp>
+        <p:nvSpPr>
+          <p:cNvPr id="5" name="Date Placeholder 4"/>
           <p:cNvSpPr>
             <a:spLocks noGrp="1"/>
           </p:cNvSpPr>
@@ -1460,7 +1301,7 @@
           <a:p>
             <a:fld id="{AABE0D5F-EF8E-4089-A75E-93EF4FB18C62}" type="datetimeFigureOut">
               <a:rPr lang="en-US" smtClean="0"/>
-              <a:t>1/21/2021</a:t>
+              <a:t>1/27/2021</a:t>
             </a:fld>
             <a:endParaRPr lang="en-US"/>
           </a:p>
@@ -1468,13 +1309,7 @@
       </p:sp>
       <p:sp>
         <p:nvSpPr>
-          <p:cNvPr id="6" name="Footer Placeholder 5">
-            <a:extLst>
-              <a:ext uri="{FF2B5EF4-FFF2-40B4-BE49-F238E27FC236}">
-                <a16:creationId xmlns:a16="http://schemas.microsoft.com/office/drawing/2014/main" id="{7C39344C-C31A-4CDF-9169-85F67BAFB43D}"/>
-              </a:ext>
-            </a:extLst>
-          </p:cNvPr>
+          <p:cNvPr id="6" name="Footer Placeholder 5"/>
           <p:cNvSpPr>
             <a:spLocks noGrp="1"/>
           </p:cNvSpPr>
@@ -1493,13 +1328,7 @@
       </p:sp>
       <p:sp>
         <p:nvSpPr>
-          <p:cNvPr id="7" name="Slide Number Placeholder 6">
-            <a:extLst>
-              <a:ext uri="{FF2B5EF4-FFF2-40B4-BE49-F238E27FC236}">
-                <a16:creationId xmlns:a16="http://schemas.microsoft.com/office/drawing/2014/main" id="{4C366D3A-415D-49A1-8915-59932BBB546E}"/>
-              </a:ext>
-            </a:extLst>
-          </p:cNvPr>
+          <p:cNvPr id="7" name="Slide Number Placeholder 6"/>
           <p:cNvSpPr>
             <a:spLocks noGrp="1"/>
           </p:cNvSpPr>
@@ -1523,7 +1352,7 @@
     </p:spTree>
     <p:extLst>
       <p:ext uri="{BB962C8B-B14F-4D97-AF65-F5344CB8AC3E}">
-        <p14:creationId xmlns:p14="http://schemas.microsoft.com/office/powerpoint/2010/main" val="2870893987"/>
+        <p14:creationId xmlns:p14="http://schemas.microsoft.com/office/powerpoint/2010/main" val="2497375087"/>
       </p:ext>
     </p:extLst>
   </p:cSld>
@@ -1552,13 +1381,7 @@
       </p:grpSpPr>
       <p:sp>
         <p:nvSpPr>
-          <p:cNvPr id="2" name="Title 1">
-            <a:extLst>
-              <a:ext uri="{FF2B5EF4-FFF2-40B4-BE49-F238E27FC236}">
-                <a16:creationId xmlns:a16="http://schemas.microsoft.com/office/drawing/2014/main" id="{C164F62E-343B-4294-802E-DE6ED0FBF869}"/>
-              </a:ext>
-            </a:extLst>
-          </p:cNvPr>
+          <p:cNvPr id="2" name="Title 1"/>
           <p:cNvSpPr>
             <a:spLocks noGrp="1"/>
           </p:cNvSpPr>
@@ -1568,8 +1391,8 @@
         </p:nvSpPr>
         <p:spPr>
           <a:xfrm>
-            <a:off x="839788" y="365125"/>
-            <a:ext cx="10515600" cy="1325563"/>
+            <a:off x="2834285" y="2190759"/>
+            <a:ext cx="35490150" cy="7953378"/>
           </a:xfrm>
         </p:spPr>
         <p:txBody>
@@ -1580,18 +1403,13 @@
               <a:rPr lang="en-US"/>
               <a:t>Click to edit Master title style</a:t>
             </a:r>
-          </a:p>
-        </p:txBody>
-      </p:sp>
-      <p:sp>
-        <p:nvSpPr>
-          <p:cNvPr id="3" name="Text Placeholder 2">
-            <a:extLst>
-              <a:ext uri="{FF2B5EF4-FFF2-40B4-BE49-F238E27FC236}">
-                <a16:creationId xmlns:a16="http://schemas.microsoft.com/office/drawing/2014/main" id="{60903DAF-6DE7-4F18-AA7B-C4AFA648095F}"/>
-              </a:ext>
-            </a:extLst>
-          </p:cNvPr>
+            <a:endParaRPr lang="en-US" dirty="0"/>
+          </a:p>
+        </p:txBody>
+      </p:sp>
+      <p:sp>
+        <p:nvSpPr>
+          <p:cNvPr id="3" name="Text Placeholder 2"/>
           <p:cNvSpPr>
             <a:spLocks noGrp="1"/>
           </p:cNvSpPr>
@@ -1601,8 +1419,8 @@
         </p:nvSpPr>
         <p:spPr>
           <a:xfrm>
-            <a:off x="839788" y="1681163"/>
-            <a:ext cx="5157787" cy="823912"/>
+            <a:off x="2834289" y="10086978"/>
+            <a:ext cx="17407530" cy="4943472"/>
           </a:xfrm>
         </p:spPr>
         <p:txBody>
@@ -1610,39 +1428,39 @@
           <a:lstStyle>
             <a:lvl1pPr marL="0" indent="0">
               <a:buNone/>
-              <a:defRPr sz="2400" b="1"/>
+              <a:defRPr sz="10800" b="1"/>
             </a:lvl1pPr>
-            <a:lvl2pPr marL="457200" indent="0">
-              <a:buNone/>
-              <a:defRPr sz="2000" b="1"/>
+            <a:lvl2pPr marL="2057400" indent="0">
+              <a:buNone/>
+              <a:defRPr sz="9000" b="1"/>
             </a:lvl2pPr>
-            <a:lvl3pPr marL="914400" indent="0">
-              <a:buNone/>
-              <a:defRPr sz="1800" b="1"/>
+            <a:lvl3pPr marL="4114800" indent="0">
+              <a:buNone/>
+              <a:defRPr sz="8100" b="1"/>
             </a:lvl3pPr>
-            <a:lvl4pPr marL="1371600" indent="0">
-              <a:buNone/>
-              <a:defRPr sz="1600" b="1"/>
+            <a:lvl4pPr marL="6172200" indent="0">
+              <a:buNone/>
+              <a:defRPr sz="7200" b="1"/>
             </a:lvl4pPr>
-            <a:lvl5pPr marL="1828800" indent="0">
-              <a:buNone/>
-              <a:defRPr sz="1600" b="1"/>
+            <a:lvl5pPr marL="8229600" indent="0">
+              <a:buNone/>
+              <a:defRPr sz="7200" b="1"/>
             </a:lvl5pPr>
-            <a:lvl6pPr marL="2286000" indent="0">
-              <a:buNone/>
-              <a:defRPr sz="1600" b="1"/>
+            <a:lvl6pPr marL="10287000" indent="0">
+              <a:buNone/>
+              <a:defRPr sz="7200" b="1"/>
             </a:lvl6pPr>
-            <a:lvl7pPr marL="2743200" indent="0">
-              <a:buNone/>
-              <a:defRPr sz="1600" b="1"/>
+            <a:lvl7pPr marL="12344400" indent="0">
+              <a:buNone/>
+              <a:defRPr sz="7200" b="1"/>
             </a:lvl7pPr>
-            <a:lvl8pPr marL="3200400" indent="0">
-              <a:buNone/>
-              <a:defRPr sz="1600" b="1"/>
+            <a:lvl8pPr marL="14401800" indent="0">
+              <a:buNone/>
+              <a:defRPr sz="7200" b="1"/>
             </a:lvl8pPr>
-            <a:lvl9pPr marL="3657600" indent="0">
-              <a:buNone/>
-              <a:defRPr sz="1600" b="1"/>
+            <a:lvl9pPr marL="16459200" indent="0">
+              <a:buNone/>
+              <a:defRPr sz="7200" b="1"/>
             </a:lvl9pPr>
           </a:lstStyle>
           <a:p>
@@ -1656,13 +1474,7 @@
       </p:sp>
       <p:sp>
         <p:nvSpPr>
-          <p:cNvPr id="4" name="Content Placeholder 3">
-            <a:extLst>
-              <a:ext uri="{FF2B5EF4-FFF2-40B4-BE49-F238E27FC236}">
-                <a16:creationId xmlns:a16="http://schemas.microsoft.com/office/drawing/2014/main" id="{596D15B6-FEFD-4522-BEEC-403026ABD35F}"/>
-              </a:ext>
-            </a:extLst>
-          </p:cNvPr>
+          <p:cNvPr id="4" name="Content Placeholder 3"/>
           <p:cNvSpPr>
             <a:spLocks noGrp="1"/>
           </p:cNvSpPr>
@@ -1672,8 +1484,8 @@
         </p:nvSpPr>
         <p:spPr>
           <a:xfrm>
-            <a:off x="839788" y="2505075"/>
-            <a:ext cx="5157787" cy="3684588"/>
+            <a:off x="2834289" y="15030450"/>
+            <a:ext cx="17407530" cy="22107528"/>
           </a:xfrm>
         </p:spPr>
         <p:txBody>
@@ -1713,18 +1525,13 @@
               <a:rPr lang="en-US"/>
               <a:t>Fifth level</a:t>
             </a:r>
-          </a:p>
-        </p:txBody>
-      </p:sp>
-      <p:sp>
-        <p:nvSpPr>
-          <p:cNvPr id="5" name="Text Placeholder 4">
-            <a:extLst>
-              <a:ext uri="{FF2B5EF4-FFF2-40B4-BE49-F238E27FC236}">
-                <a16:creationId xmlns:a16="http://schemas.microsoft.com/office/drawing/2014/main" id="{7135FC28-8F40-44EF-A5EE-A9A522F09F95}"/>
-              </a:ext>
-            </a:extLst>
-          </p:cNvPr>
+            <a:endParaRPr lang="en-US" dirty="0"/>
+          </a:p>
+        </p:txBody>
+      </p:sp>
+      <p:sp>
+        <p:nvSpPr>
+          <p:cNvPr id="5" name="Text Placeholder 4"/>
           <p:cNvSpPr>
             <a:spLocks noGrp="1"/>
           </p:cNvSpPr>
@@ -1734,8 +1541,8 @@
         </p:nvSpPr>
         <p:spPr>
           <a:xfrm>
-            <a:off x="6172200" y="1681163"/>
-            <a:ext cx="5183188" cy="823912"/>
+            <a:off x="20831177" y="10086978"/>
+            <a:ext cx="17493260" cy="4943472"/>
           </a:xfrm>
         </p:spPr>
         <p:txBody>
@@ -1743,39 +1550,39 @@
           <a:lstStyle>
             <a:lvl1pPr marL="0" indent="0">
               <a:buNone/>
-              <a:defRPr sz="2400" b="1"/>
+              <a:defRPr sz="10800" b="1"/>
             </a:lvl1pPr>
-            <a:lvl2pPr marL="457200" indent="0">
-              <a:buNone/>
-              <a:defRPr sz="2000" b="1"/>
+            <a:lvl2pPr marL="2057400" indent="0">
+              <a:buNone/>
+              <a:defRPr sz="9000" b="1"/>
             </a:lvl2pPr>
-            <a:lvl3pPr marL="914400" indent="0">
-              <a:buNone/>
-              <a:defRPr sz="1800" b="1"/>
+            <a:lvl3pPr marL="4114800" indent="0">
+              <a:buNone/>
+              <a:defRPr sz="8100" b="1"/>
             </a:lvl3pPr>
-            <a:lvl4pPr marL="1371600" indent="0">
-              <a:buNone/>
-              <a:defRPr sz="1600" b="1"/>
+            <a:lvl4pPr marL="6172200" indent="0">
+              <a:buNone/>
+              <a:defRPr sz="7200" b="1"/>
             </a:lvl4pPr>
-            <a:lvl5pPr marL="1828800" indent="0">
-              <a:buNone/>
-              <a:defRPr sz="1600" b="1"/>
+            <a:lvl5pPr marL="8229600" indent="0">
+              <a:buNone/>
+              <a:defRPr sz="7200" b="1"/>
             </a:lvl5pPr>
-            <a:lvl6pPr marL="2286000" indent="0">
-              <a:buNone/>
-              <a:defRPr sz="1600" b="1"/>
+            <a:lvl6pPr marL="10287000" indent="0">
+              <a:buNone/>
+              <a:defRPr sz="7200" b="1"/>
             </a:lvl6pPr>
-            <a:lvl7pPr marL="2743200" indent="0">
-              <a:buNone/>
-              <a:defRPr sz="1600" b="1"/>
+            <a:lvl7pPr marL="12344400" indent="0">
+              <a:buNone/>
+              <a:defRPr sz="7200" b="1"/>
             </a:lvl7pPr>
-            <a:lvl8pPr marL="3200400" indent="0">
-              <a:buNone/>
-              <a:defRPr sz="1600" b="1"/>
+            <a:lvl8pPr marL="14401800" indent="0">
+              <a:buNone/>
+              <a:defRPr sz="7200" b="1"/>
             </a:lvl8pPr>
-            <a:lvl9pPr marL="3657600" indent="0">
-              <a:buNone/>
-              <a:defRPr sz="1600" b="1"/>
+            <a:lvl9pPr marL="16459200" indent="0">
+              <a:buNone/>
+              <a:defRPr sz="7200" b="1"/>
             </a:lvl9pPr>
           </a:lstStyle>
           <a:p>
@@ -1789,13 +1596,7 @@
       </p:sp>
       <p:sp>
         <p:nvSpPr>
-          <p:cNvPr id="6" name="Content Placeholder 5">
-            <a:extLst>
-              <a:ext uri="{FF2B5EF4-FFF2-40B4-BE49-F238E27FC236}">
-                <a16:creationId xmlns:a16="http://schemas.microsoft.com/office/drawing/2014/main" id="{108FE1F4-285A-4A79-8C60-15C746C6A2AB}"/>
-              </a:ext>
-            </a:extLst>
-          </p:cNvPr>
+          <p:cNvPr id="6" name="Content Placeholder 5"/>
           <p:cNvSpPr>
             <a:spLocks noGrp="1"/>
           </p:cNvSpPr>
@@ -1805,8 +1606,8 @@
         </p:nvSpPr>
         <p:spPr>
           <a:xfrm>
-            <a:off x="6172200" y="2505075"/>
-            <a:ext cx="5183188" cy="3684588"/>
+            <a:off x="20831177" y="15030450"/>
+            <a:ext cx="17493260" cy="22107528"/>
           </a:xfrm>
         </p:spPr>
         <p:txBody>
@@ -1846,18 +1647,13 @@
               <a:rPr lang="en-US"/>
               <a:t>Fifth level</a:t>
             </a:r>
-          </a:p>
-        </p:txBody>
-      </p:sp>
-      <p:sp>
-        <p:nvSpPr>
-          <p:cNvPr id="7" name="Date Placeholder 6">
-            <a:extLst>
-              <a:ext uri="{FF2B5EF4-FFF2-40B4-BE49-F238E27FC236}">
-                <a16:creationId xmlns:a16="http://schemas.microsoft.com/office/drawing/2014/main" id="{259B4B09-130C-49E6-ABF1-A3F2899CE3AC}"/>
-              </a:ext>
-            </a:extLst>
-          </p:cNvPr>
+            <a:endParaRPr lang="en-US" dirty="0"/>
+          </a:p>
+        </p:txBody>
+      </p:sp>
+      <p:sp>
+        <p:nvSpPr>
+          <p:cNvPr id="7" name="Date Placeholder 6"/>
           <p:cNvSpPr>
             <a:spLocks noGrp="1"/>
           </p:cNvSpPr>
@@ -1872,7 +1668,7 @@
           <a:p>
             <a:fld id="{AABE0D5F-EF8E-4089-A75E-93EF4FB18C62}" type="datetimeFigureOut">
               <a:rPr lang="en-US" smtClean="0"/>
-              <a:t>1/21/2021</a:t>
+              <a:t>1/27/2021</a:t>
             </a:fld>
             <a:endParaRPr lang="en-US"/>
           </a:p>
@@ -1880,13 +1676,7 @@
       </p:sp>
       <p:sp>
         <p:nvSpPr>
-          <p:cNvPr id="8" name="Footer Placeholder 7">
-            <a:extLst>
-              <a:ext uri="{FF2B5EF4-FFF2-40B4-BE49-F238E27FC236}">
-                <a16:creationId xmlns:a16="http://schemas.microsoft.com/office/drawing/2014/main" id="{9722D2C8-3EC1-47C4-9621-6F56A6948541}"/>
-              </a:ext>
-            </a:extLst>
-          </p:cNvPr>
+          <p:cNvPr id="8" name="Footer Placeholder 7"/>
           <p:cNvSpPr>
             <a:spLocks noGrp="1"/>
           </p:cNvSpPr>
@@ -1905,13 +1695,7 @@
       </p:sp>
       <p:sp>
         <p:nvSpPr>
-          <p:cNvPr id="9" name="Slide Number Placeholder 8">
-            <a:extLst>
-              <a:ext uri="{FF2B5EF4-FFF2-40B4-BE49-F238E27FC236}">
-                <a16:creationId xmlns:a16="http://schemas.microsoft.com/office/drawing/2014/main" id="{695372D6-2F2A-4E5D-BB13-E17EC785E449}"/>
-              </a:ext>
-            </a:extLst>
-          </p:cNvPr>
+          <p:cNvPr id="9" name="Slide Number Placeholder 8"/>
           <p:cNvSpPr>
             <a:spLocks noGrp="1"/>
           </p:cNvSpPr>
@@ -1935,7 +1719,7 @@
     </p:spTree>
     <p:extLst>
       <p:ext uri="{BB962C8B-B14F-4D97-AF65-F5344CB8AC3E}">
-        <p14:creationId xmlns:p14="http://schemas.microsoft.com/office/powerpoint/2010/main" val="1737665943"/>
+        <p14:creationId xmlns:p14="http://schemas.microsoft.com/office/powerpoint/2010/main" val="4118227313"/>
       </p:ext>
     </p:extLst>
   </p:cSld>
@@ -1964,13 +1748,7 @@
       </p:grpSpPr>
       <p:sp>
         <p:nvSpPr>
-          <p:cNvPr id="2" name="Title 1">
-            <a:extLst>
-              <a:ext uri="{FF2B5EF4-FFF2-40B4-BE49-F238E27FC236}">
-                <a16:creationId xmlns:a16="http://schemas.microsoft.com/office/drawing/2014/main" id="{349484E2-6224-47D4-A935-C7615F474DEA}"/>
-              </a:ext>
-            </a:extLst>
-          </p:cNvPr>
+          <p:cNvPr id="2" name="Title 1"/>
           <p:cNvSpPr>
             <a:spLocks noGrp="1"/>
           </p:cNvSpPr>
@@ -1987,18 +1765,13 @@
               <a:rPr lang="en-US"/>
               <a:t>Click to edit Master title style</a:t>
             </a:r>
-          </a:p>
-        </p:txBody>
-      </p:sp>
-      <p:sp>
-        <p:nvSpPr>
-          <p:cNvPr id="3" name="Date Placeholder 2">
-            <a:extLst>
-              <a:ext uri="{FF2B5EF4-FFF2-40B4-BE49-F238E27FC236}">
-                <a16:creationId xmlns:a16="http://schemas.microsoft.com/office/drawing/2014/main" id="{D53034B4-6DB3-47D0-A8E4-E0E35A48728D}"/>
-              </a:ext>
-            </a:extLst>
-          </p:cNvPr>
+            <a:endParaRPr lang="en-US" dirty="0"/>
+          </a:p>
+        </p:txBody>
+      </p:sp>
+      <p:sp>
+        <p:nvSpPr>
+          <p:cNvPr id="3" name="Date Placeholder 2"/>
           <p:cNvSpPr>
             <a:spLocks noGrp="1"/>
           </p:cNvSpPr>
@@ -2013,7 +1786,7 @@
           <a:p>
             <a:fld id="{AABE0D5F-EF8E-4089-A75E-93EF4FB18C62}" type="datetimeFigureOut">
               <a:rPr lang="en-US" smtClean="0"/>
-              <a:t>1/21/2021</a:t>
+              <a:t>1/27/2021</a:t>
             </a:fld>
             <a:endParaRPr lang="en-US"/>
           </a:p>
@@ -2021,13 +1794,7 @@
       </p:sp>
       <p:sp>
         <p:nvSpPr>
-          <p:cNvPr id="4" name="Footer Placeholder 3">
-            <a:extLst>
-              <a:ext uri="{FF2B5EF4-FFF2-40B4-BE49-F238E27FC236}">
-                <a16:creationId xmlns:a16="http://schemas.microsoft.com/office/drawing/2014/main" id="{6E7427E7-FB5E-46CE-AD5F-E48F01764D3B}"/>
-              </a:ext>
-            </a:extLst>
-          </p:cNvPr>
+          <p:cNvPr id="4" name="Footer Placeholder 3"/>
           <p:cNvSpPr>
             <a:spLocks noGrp="1"/>
           </p:cNvSpPr>
@@ -2046,13 +1813,7 @@
       </p:sp>
       <p:sp>
         <p:nvSpPr>
-          <p:cNvPr id="5" name="Slide Number Placeholder 4">
-            <a:extLst>
-              <a:ext uri="{FF2B5EF4-FFF2-40B4-BE49-F238E27FC236}">
-                <a16:creationId xmlns:a16="http://schemas.microsoft.com/office/drawing/2014/main" id="{D2B460FB-EC90-45F3-B419-83CDC8BCAD9C}"/>
-              </a:ext>
-            </a:extLst>
-          </p:cNvPr>
+          <p:cNvPr id="5" name="Slide Number Placeholder 4"/>
           <p:cNvSpPr>
             <a:spLocks noGrp="1"/>
           </p:cNvSpPr>
@@ -2076,7 +1837,7 @@
     </p:spTree>
     <p:extLst>
       <p:ext uri="{BB962C8B-B14F-4D97-AF65-F5344CB8AC3E}">
-        <p14:creationId xmlns:p14="http://schemas.microsoft.com/office/powerpoint/2010/main" val="417173789"/>
+        <p14:creationId xmlns:p14="http://schemas.microsoft.com/office/powerpoint/2010/main" val="1785299930"/>
       </p:ext>
     </p:extLst>
   </p:cSld>
@@ -2105,13 +1866,7 @@
       </p:grpSpPr>
       <p:sp>
         <p:nvSpPr>
-          <p:cNvPr id="2" name="Date Placeholder 1">
-            <a:extLst>
-              <a:ext uri="{FF2B5EF4-FFF2-40B4-BE49-F238E27FC236}">
-                <a16:creationId xmlns:a16="http://schemas.microsoft.com/office/drawing/2014/main" id="{65471DFC-0E9B-4BA2-823E-6A41CFBED7D2}"/>
-              </a:ext>
-            </a:extLst>
-          </p:cNvPr>
+          <p:cNvPr id="2" name="Date Placeholder 1"/>
           <p:cNvSpPr>
             <a:spLocks noGrp="1"/>
           </p:cNvSpPr>
@@ -2126,7 +1881,7 @@
           <a:p>
             <a:fld id="{AABE0D5F-EF8E-4089-A75E-93EF4FB18C62}" type="datetimeFigureOut">
               <a:rPr lang="en-US" smtClean="0"/>
-              <a:t>1/21/2021</a:t>
+              <a:t>1/27/2021</a:t>
             </a:fld>
             <a:endParaRPr lang="en-US"/>
           </a:p>
@@ -2134,13 +1889,7 @@
       </p:sp>
       <p:sp>
         <p:nvSpPr>
-          <p:cNvPr id="3" name="Footer Placeholder 2">
-            <a:extLst>
-              <a:ext uri="{FF2B5EF4-FFF2-40B4-BE49-F238E27FC236}">
-                <a16:creationId xmlns:a16="http://schemas.microsoft.com/office/drawing/2014/main" id="{1ABBC8A5-7A44-431E-A241-A5CE3C7F2F39}"/>
-              </a:ext>
-            </a:extLst>
-          </p:cNvPr>
+          <p:cNvPr id="3" name="Footer Placeholder 2"/>
           <p:cNvSpPr>
             <a:spLocks noGrp="1"/>
           </p:cNvSpPr>
@@ -2159,13 +1908,7 @@
       </p:sp>
       <p:sp>
         <p:nvSpPr>
-          <p:cNvPr id="4" name="Slide Number Placeholder 3">
-            <a:extLst>
-              <a:ext uri="{FF2B5EF4-FFF2-40B4-BE49-F238E27FC236}">
-                <a16:creationId xmlns:a16="http://schemas.microsoft.com/office/drawing/2014/main" id="{E5E07184-9D20-4174-BE25-FCA231151994}"/>
-              </a:ext>
-            </a:extLst>
-          </p:cNvPr>
+          <p:cNvPr id="4" name="Slide Number Placeholder 3"/>
           <p:cNvSpPr>
             <a:spLocks noGrp="1"/>
           </p:cNvSpPr>
@@ -2189,7 +1932,7 @@
     </p:spTree>
     <p:extLst>
       <p:ext uri="{BB962C8B-B14F-4D97-AF65-F5344CB8AC3E}">
-        <p14:creationId xmlns:p14="http://schemas.microsoft.com/office/powerpoint/2010/main" val="2785773083"/>
+        <p14:creationId xmlns:p14="http://schemas.microsoft.com/office/powerpoint/2010/main" val="381916250"/>
       </p:ext>
     </p:extLst>
   </p:cSld>
@@ -2218,13 +1961,7 @@
       </p:grpSpPr>
       <p:sp>
         <p:nvSpPr>
-          <p:cNvPr id="2" name="Title 1">
-            <a:extLst>
-              <a:ext uri="{FF2B5EF4-FFF2-40B4-BE49-F238E27FC236}">
-                <a16:creationId xmlns:a16="http://schemas.microsoft.com/office/drawing/2014/main" id="{E8777B4C-BAED-483E-988B-EE572ADD35D9}"/>
-              </a:ext>
-            </a:extLst>
-          </p:cNvPr>
+          <p:cNvPr id="2" name="Title 1"/>
           <p:cNvSpPr>
             <a:spLocks noGrp="1"/>
           </p:cNvSpPr>
@@ -2234,15 +1971,15 @@
         </p:nvSpPr>
         <p:spPr>
           <a:xfrm>
-            <a:off x="839788" y="457200"/>
-            <a:ext cx="3932237" cy="1600200"/>
+            <a:off x="2834285" y="2743200"/>
+            <a:ext cx="13271301" cy="9601200"/>
           </a:xfrm>
         </p:spPr>
         <p:txBody>
           <a:bodyPr anchor="b"/>
           <a:lstStyle>
             <a:lvl1pPr>
-              <a:defRPr sz="3200"/>
+              <a:defRPr sz="14400"/>
             </a:lvl1pPr>
           </a:lstStyle>
           <a:p>
@@ -2250,18 +1987,13 @@
               <a:rPr lang="en-US"/>
               <a:t>Click to edit Master title style</a:t>
             </a:r>
-          </a:p>
-        </p:txBody>
-      </p:sp>
-      <p:sp>
-        <p:nvSpPr>
-          <p:cNvPr id="3" name="Content Placeholder 2">
-            <a:extLst>
-              <a:ext uri="{FF2B5EF4-FFF2-40B4-BE49-F238E27FC236}">
-                <a16:creationId xmlns:a16="http://schemas.microsoft.com/office/drawing/2014/main" id="{12407C1D-9E77-48B5-94C2-603021E951DB}"/>
-              </a:ext>
-            </a:extLst>
-          </p:cNvPr>
+            <a:endParaRPr lang="en-US" dirty="0"/>
+          </a:p>
+        </p:txBody>
+      </p:sp>
+      <p:sp>
+        <p:nvSpPr>
+          <p:cNvPr id="3" name="Content Placeholder 2"/>
           <p:cNvSpPr>
             <a:spLocks noGrp="1"/>
           </p:cNvSpPr>
@@ -2271,39 +2003,39 @@
         </p:nvSpPr>
         <p:spPr>
           <a:xfrm>
-            <a:off x="5183188" y="987425"/>
-            <a:ext cx="6172200" cy="4873625"/>
+            <a:off x="17493259" y="5924559"/>
+            <a:ext cx="20831175" cy="29241750"/>
           </a:xfrm>
         </p:spPr>
         <p:txBody>
           <a:bodyPr/>
           <a:lstStyle>
             <a:lvl1pPr>
-              <a:defRPr sz="3200"/>
+              <a:defRPr sz="14400"/>
             </a:lvl1pPr>
             <a:lvl2pPr>
-              <a:defRPr sz="2800"/>
+              <a:defRPr sz="12600"/>
             </a:lvl2pPr>
             <a:lvl3pPr>
-              <a:defRPr sz="2400"/>
+              <a:defRPr sz="10800"/>
             </a:lvl3pPr>
             <a:lvl4pPr>
-              <a:defRPr sz="2000"/>
+              <a:defRPr sz="9000"/>
             </a:lvl4pPr>
             <a:lvl5pPr>
-              <a:defRPr sz="2000"/>
+              <a:defRPr sz="9000"/>
             </a:lvl5pPr>
             <a:lvl6pPr>
-              <a:defRPr sz="2000"/>
+              <a:defRPr sz="9000"/>
             </a:lvl6pPr>
             <a:lvl7pPr>
-              <a:defRPr sz="2000"/>
+              <a:defRPr sz="9000"/>
             </a:lvl7pPr>
             <a:lvl8pPr>
-              <a:defRPr sz="2000"/>
+              <a:defRPr sz="9000"/>
             </a:lvl8pPr>
             <a:lvl9pPr>
-              <a:defRPr sz="2000"/>
+              <a:defRPr sz="9000"/>
             </a:lvl9pPr>
           </a:lstStyle>
           <a:p>
@@ -2340,18 +2072,13 @@
               <a:rPr lang="en-US"/>
               <a:t>Fifth level</a:t>
             </a:r>
-          </a:p>
-        </p:txBody>
-      </p:sp>
-      <p:sp>
-        <p:nvSpPr>
-          <p:cNvPr id="4" name="Text Placeholder 3">
-            <a:extLst>
-              <a:ext uri="{FF2B5EF4-FFF2-40B4-BE49-F238E27FC236}">
-                <a16:creationId xmlns:a16="http://schemas.microsoft.com/office/drawing/2014/main" id="{0C0D2C41-75CB-456B-95D7-A9C9BC43BE1E}"/>
-              </a:ext>
-            </a:extLst>
-          </p:cNvPr>
+            <a:endParaRPr lang="en-US" dirty="0"/>
+          </a:p>
+        </p:txBody>
+      </p:sp>
+      <p:sp>
+        <p:nvSpPr>
+          <p:cNvPr id="4" name="Text Placeholder 3"/>
           <p:cNvSpPr>
             <a:spLocks noGrp="1"/>
           </p:cNvSpPr>
@@ -2361,8 +2088,8 @@
         </p:nvSpPr>
         <p:spPr>
           <a:xfrm>
-            <a:off x="839788" y="2057400"/>
-            <a:ext cx="3932237" cy="3811588"/>
+            <a:off x="2834285" y="12344400"/>
+            <a:ext cx="13271301" cy="22869528"/>
           </a:xfrm>
         </p:spPr>
         <p:txBody>
@@ -2370,39 +2097,39 @@
           <a:lstStyle>
             <a:lvl1pPr marL="0" indent="0">
               <a:buNone/>
-              <a:defRPr sz="1600"/>
+              <a:defRPr sz="7200"/>
             </a:lvl1pPr>
-            <a:lvl2pPr marL="457200" indent="0">
-              <a:buNone/>
-              <a:defRPr sz="1400"/>
+            <a:lvl2pPr marL="2057400" indent="0">
+              <a:buNone/>
+              <a:defRPr sz="6300"/>
             </a:lvl2pPr>
-            <a:lvl3pPr marL="914400" indent="0">
-              <a:buNone/>
-              <a:defRPr sz="1200"/>
+            <a:lvl3pPr marL="4114800" indent="0">
+              <a:buNone/>
+              <a:defRPr sz="5400"/>
             </a:lvl3pPr>
-            <a:lvl4pPr marL="1371600" indent="0">
-              <a:buNone/>
-              <a:defRPr sz="1000"/>
+            <a:lvl4pPr marL="6172200" indent="0">
+              <a:buNone/>
+              <a:defRPr sz="4500"/>
             </a:lvl4pPr>
-            <a:lvl5pPr marL="1828800" indent="0">
-              <a:buNone/>
-              <a:defRPr sz="1000"/>
+            <a:lvl5pPr marL="8229600" indent="0">
+              <a:buNone/>
+              <a:defRPr sz="4500"/>
             </a:lvl5pPr>
-            <a:lvl6pPr marL="2286000" indent="0">
-              <a:buNone/>
-              <a:defRPr sz="1000"/>
+            <a:lvl6pPr marL="10287000" indent="0">
+              <a:buNone/>
+              <a:defRPr sz="4500"/>
             </a:lvl6pPr>
-            <a:lvl7pPr marL="2743200" indent="0">
-              <a:buNone/>
-              <a:defRPr sz="1000"/>
+            <a:lvl7pPr marL="12344400" indent="0">
+              <a:buNone/>
+              <a:defRPr sz="4500"/>
             </a:lvl7pPr>
-            <a:lvl8pPr marL="3200400" indent="0">
-              <a:buNone/>
-              <a:defRPr sz="1000"/>
+            <a:lvl8pPr marL="14401800" indent="0">
+              <a:buNone/>
+              <a:defRPr sz="4500"/>
             </a:lvl8pPr>
-            <a:lvl9pPr marL="3657600" indent="0">
-              <a:buNone/>
-              <a:defRPr sz="1000"/>
+            <a:lvl9pPr marL="16459200" indent="0">
+              <a:buNone/>
+              <a:defRPr sz="4500"/>
             </a:lvl9pPr>
           </a:lstStyle>
           <a:p>
@@ -2416,13 +2143,7 @@
       </p:sp>
       <p:sp>
         <p:nvSpPr>
-          <p:cNvPr id="5" name="Date Placeholder 4">
-            <a:extLst>
-              <a:ext uri="{FF2B5EF4-FFF2-40B4-BE49-F238E27FC236}">
-                <a16:creationId xmlns:a16="http://schemas.microsoft.com/office/drawing/2014/main" id="{8F97DC93-0FE0-4B4B-B772-C7DB65DE1A57}"/>
-              </a:ext>
-            </a:extLst>
-          </p:cNvPr>
+          <p:cNvPr id="5" name="Date Placeholder 4"/>
           <p:cNvSpPr>
             <a:spLocks noGrp="1"/>
           </p:cNvSpPr>
@@ -2437,7 +2158,7 @@
           <a:p>
             <a:fld id="{AABE0D5F-EF8E-4089-A75E-93EF4FB18C62}" type="datetimeFigureOut">
               <a:rPr lang="en-US" smtClean="0"/>
-              <a:t>1/21/2021</a:t>
+              <a:t>1/27/2021</a:t>
             </a:fld>
             <a:endParaRPr lang="en-US"/>
           </a:p>
@@ -2445,13 +2166,7 @@
       </p:sp>
       <p:sp>
         <p:nvSpPr>
-          <p:cNvPr id="6" name="Footer Placeholder 5">
-            <a:extLst>
-              <a:ext uri="{FF2B5EF4-FFF2-40B4-BE49-F238E27FC236}">
-                <a16:creationId xmlns:a16="http://schemas.microsoft.com/office/drawing/2014/main" id="{8D59B2FF-362A-4CCC-82BE-2E3269D06D45}"/>
-              </a:ext>
-            </a:extLst>
-          </p:cNvPr>
+          <p:cNvPr id="6" name="Footer Placeholder 5"/>
           <p:cNvSpPr>
             <a:spLocks noGrp="1"/>
           </p:cNvSpPr>
@@ -2470,13 +2185,7 @@
       </p:sp>
       <p:sp>
         <p:nvSpPr>
-          <p:cNvPr id="7" name="Slide Number Placeholder 6">
-            <a:extLst>
-              <a:ext uri="{FF2B5EF4-FFF2-40B4-BE49-F238E27FC236}">
-                <a16:creationId xmlns:a16="http://schemas.microsoft.com/office/drawing/2014/main" id="{1A42C7F9-8334-4FE0-8FE9-E095F864CB27}"/>
-              </a:ext>
-            </a:extLst>
-          </p:cNvPr>
+          <p:cNvPr id="7" name="Slide Number Placeholder 6"/>
           <p:cNvSpPr>
             <a:spLocks noGrp="1"/>
           </p:cNvSpPr>
@@ -2500,7 +2209,7 @@
     </p:spTree>
     <p:extLst>
       <p:ext uri="{BB962C8B-B14F-4D97-AF65-F5344CB8AC3E}">
-        <p14:creationId xmlns:p14="http://schemas.microsoft.com/office/powerpoint/2010/main" val="3018080434"/>
+        <p14:creationId xmlns:p14="http://schemas.microsoft.com/office/powerpoint/2010/main" val="1284189845"/>
       </p:ext>
     </p:extLst>
   </p:cSld>
@@ -2529,13 +2238,7 @@
       </p:grpSpPr>
       <p:sp>
         <p:nvSpPr>
-          <p:cNvPr id="2" name="Title 1">
-            <a:extLst>
-              <a:ext uri="{FF2B5EF4-FFF2-40B4-BE49-F238E27FC236}">
-                <a16:creationId xmlns:a16="http://schemas.microsoft.com/office/drawing/2014/main" id="{683CB84E-E137-445E-A301-CDC82D28206F}"/>
-              </a:ext>
-            </a:extLst>
-          </p:cNvPr>
+          <p:cNvPr id="2" name="Title 1"/>
           <p:cNvSpPr>
             <a:spLocks noGrp="1"/>
           </p:cNvSpPr>
@@ -2545,15 +2248,15 @@
         </p:nvSpPr>
         <p:spPr>
           <a:xfrm>
-            <a:off x="839788" y="457200"/>
-            <a:ext cx="3932237" cy="1600200"/>
+            <a:off x="2834285" y="2743200"/>
+            <a:ext cx="13271301" cy="9601200"/>
           </a:xfrm>
         </p:spPr>
         <p:txBody>
           <a:bodyPr anchor="b"/>
           <a:lstStyle>
             <a:lvl1pPr>
-              <a:defRPr sz="3200"/>
+              <a:defRPr sz="14400"/>
             </a:lvl1pPr>
           </a:lstStyle>
           <a:p>
@@ -2561,20 +2264,15 @@
               <a:rPr lang="en-US"/>
               <a:t>Click to edit Master title style</a:t>
             </a:r>
-          </a:p>
-        </p:txBody>
-      </p:sp>
-      <p:sp>
-        <p:nvSpPr>
-          <p:cNvPr id="3" name="Picture Placeholder 2">
-            <a:extLst>
-              <a:ext uri="{FF2B5EF4-FFF2-40B4-BE49-F238E27FC236}">
-                <a16:creationId xmlns:a16="http://schemas.microsoft.com/office/drawing/2014/main" id="{158B2269-A20C-4800-8B95-4B49DD865A96}"/>
-              </a:ext>
-            </a:extLst>
-          </p:cNvPr>
-          <p:cNvSpPr>
-            <a:spLocks noGrp="1"/>
+            <a:endParaRPr lang="en-US" dirty="0"/>
+          </a:p>
+        </p:txBody>
+      </p:sp>
+      <p:sp>
+        <p:nvSpPr>
+          <p:cNvPr id="3" name="Picture Placeholder 2"/>
+          <p:cNvSpPr>
+            <a:spLocks noGrp="1" noChangeAspect="1"/>
           </p:cNvSpPr>
           <p:nvPr>
             <p:ph type="pic" idx="1"/>
@@ -2582,8 +2280,73 @@
         </p:nvSpPr>
         <p:spPr>
           <a:xfrm>
-            <a:off x="5183188" y="987425"/>
-            <a:ext cx="6172200" cy="4873625"/>
+            <a:off x="17493259" y="5924559"/>
+            <a:ext cx="20831175" cy="29241750"/>
+          </a:xfrm>
+        </p:spPr>
+        <p:txBody>
+          <a:bodyPr anchor="t"/>
+          <a:lstStyle>
+            <a:lvl1pPr marL="0" indent="0">
+              <a:buNone/>
+              <a:defRPr sz="14400"/>
+            </a:lvl1pPr>
+            <a:lvl2pPr marL="2057400" indent="0">
+              <a:buNone/>
+              <a:defRPr sz="12600"/>
+            </a:lvl2pPr>
+            <a:lvl3pPr marL="4114800" indent="0">
+              <a:buNone/>
+              <a:defRPr sz="10800"/>
+            </a:lvl3pPr>
+            <a:lvl4pPr marL="6172200" indent="0">
+              <a:buNone/>
+              <a:defRPr sz="9000"/>
+            </a:lvl4pPr>
+            <a:lvl5pPr marL="8229600" indent="0">
+              <a:buNone/>
+              <a:defRPr sz="9000"/>
+            </a:lvl5pPr>
+            <a:lvl6pPr marL="10287000" indent="0">
+              <a:buNone/>
+              <a:defRPr sz="9000"/>
+            </a:lvl6pPr>
+            <a:lvl7pPr marL="12344400" indent="0">
+              <a:buNone/>
+              <a:defRPr sz="9000"/>
+            </a:lvl7pPr>
+            <a:lvl8pPr marL="14401800" indent="0">
+              <a:buNone/>
+              <a:defRPr sz="9000"/>
+            </a:lvl8pPr>
+            <a:lvl9pPr marL="16459200" indent="0">
+              <a:buNone/>
+              <a:defRPr sz="9000"/>
+            </a:lvl9pPr>
+          </a:lstStyle>
+          <a:p>
+            <a:r>
+              <a:rPr lang="en-US"/>
+              <a:t>Click icon to add picture</a:t>
+            </a:r>
+            <a:endParaRPr lang="en-US" dirty="0"/>
+          </a:p>
+        </p:txBody>
+      </p:sp>
+      <p:sp>
+        <p:nvSpPr>
+          <p:cNvPr id="4" name="Text Placeholder 3"/>
+          <p:cNvSpPr>
+            <a:spLocks noGrp="1"/>
+          </p:cNvSpPr>
+          <p:nvPr>
+            <p:ph type="body" sz="half" idx="2"/>
+          </p:nvPr>
+        </p:nvSpPr>
+        <p:spPr>
+          <a:xfrm>
+            <a:off x="2834285" y="12344400"/>
+            <a:ext cx="13271301" cy="22869528"/>
           </a:xfrm>
         </p:spPr>
         <p:txBody>
@@ -2591,109 +2354,42 @@
           <a:lstStyle>
             <a:lvl1pPr marL="0" indent="0">
               <a:buNone/>
-              <a:defRPr sz="3200"/>
+              <a:defRPr sz="7200"/>
             </a:lvl1pPr>
-            <a:lvl2pPr marL="457200" indent="0">
-              <a:buNone/>
-              <a:defRPr sz="2800"/>
+            <a:lvl2pPr marL="2057400" indent="0">
+              <a:buNone/>
+              <a:defRPr sz="6300"/>
             </a:lvl2pPr>
-            <a:lvl3pPr marL="914400" indent="0">
-              <a:buNone/>
-              <a:defRPr sz="2400"/>
+            <a:lvl3pPr marL="4114800" indent="0">
+              <a:buNone/>
+              <a:defRPr sz="5400"/>
             </a:lvl3pPr>
-            <a:lvl4pPr marL="1371600" indent="0">
-              <a:buNone/>
-              <a:defRPr sz="2000"/>
+            <a:lvl4pPr marL="6172200" indent="0">
+              <a:buNone/>
+              <a:defRPr sz="4500"/>
             </a:lvl4pPr>
-            <a:lvl5pPr marL="1828800" indent="0">
-              <a:buNone/>
-              <a:defRPr sz="2000"/>
+            <a:lvl5pPr marL="8229600" indent="0">
+              <a:buNone/>
+              <a:defRPr sz="4500"/>
             </a:lvl5pPr>
-            <a:lvl6pPr marL="2286000" indent="0">
-              <a:buNone/>
-              <a:defRPr sz="2000"/>
+            <a:lvl6pPr marL="10287000" indent="0">
+              <a:buNone/>
+              <a:defRPr sz="4500"/>
             </a:lvl6pPr>
-            <a:lvl7pPr marL="2743200" indent="0">
-              <a:buNone/>
-              <a:defRPr sz="2000"/>
+            <a:lvl7pPr marL="12344400" indent="0">
+              <a:buNone/>
+              <a:defRPr sz="4500"/>
             </a:lvl7pPr>
-            <a:lvl8pPr marL="3200400" indent="0">
-              <a:buNone/>
-              <a:defRPr sz="2000"/>
+            <a:lvl8pPr marL="14401800" indent="0">
+              <a:buNone/>
+              <a:defRPr sz="4500"/>
             </a:lvl8pPr>
-            <a:lvl9pPr marL="3657600" indent="0">
-              <a:buNone/>
-              <a:defRPr sz="2000"/>
+            <a:lvl9pPr marL="16459200" indent="0">
+              <a:buNone/>
+              <a:defRPr sz="4500"/>
             </a:lvl9pPr>
           </a:lstStyle>
           <a:p>
-            <a:endParaRPr lang="en-US"/>
-          </a:p>
-        </p:txBody>
-      </p:sp>
-      <p:sp>
-        <p:nvSpPr>
-          <p:cNvPr id="4" name="Text Placeholder 3">
-            <a:extLst>
-              <a:ext uri="{FF2B5EF4-FFF2-40B4-BE49-F238E27FC236}">
-                <a16:creationId xmlns:a16="http://schemas.microsoft.com/office/drawing/2014/main" id="{91D302DC-8115-4EBE-83A7-CAF1C50E1A85}"/>
-              </a:ext>
-            </a:extLst>
-          </p:cNvPr>
-          <p:cNvSpPr>
-            <a:spLocks noGrp="1"/>
-          </p:cNvSpPr>
-          <p:nvPr>
-            <p:ph type="body" sz="half" idx="2"/>
-          </p:nvPr>
-        </p:nvSpPr>
-        <p:spPr>
-          <a:xfrm>
-            <a:off x="839788" y="2057400"/>
-            <a:ext cx="3932237" cy="3811588"/>
-          </a:xfrm>
-        </p:spPr>
-        <p:txBody>
-          <a:bodyPr/>
-          <a:lstStyle>
-            <a:lvl1pPr marL="0" indent="0">
-              <a:buNone/>
-              <a:defRPr sz="1600"/>
-            </a:lvl1pPr>
-            <a:lvl2pPr marL="457200" indent="0">
-              <a:buNone/>
-              <a:defRPr sz="1400"/>
-            </a:lvl2pPr>
-            <a:lvl3pPr marL="914400" indent="0">
-              <a:buNone/>
-              <a:defRPr sz="1200"/>
-            </a:lvl3pPr>
-            <a:lvl4pPr marL="1371600" indent="0">
-              <a:buNone/>
-              <a:defRPr sz="1000"/>
-            </a:lvl4pPr>
-            <a:lvl5pPr marL="1828800" indent="0">
-              <a:buNone/>
-              <a:defRPr sz="1000"/>
-            </a:lvl5pPr>
-            <a:lvl6pPr marL="2286000" indent="0">
-              <a:buNone/>
-              <a:defRPr sz="1000"/>
-            </a:lvl6pPr>
-            <a:lvl7pPr marL="2743200" indent="0">
-              <a:buNone/>
-              <a:defRPr sz="1000"/>
-            </a:lvl7pPr>
-            <a:lvl8pPr marL="3200400" indent="0">
-              <a:buNone/>
-              <a:defRPr sz="1000"/>
-            </a:lvl8pPr>
-            <a:lvl9pPr marL="3657600" indent="0">
-              <a:buNone/>
-              <a:defRPr sz="1000"/>
-            </a:lvl9pPr>
-          </a:lstStyle>
-          <a:p>
             <a:pPr lvl="0"/>
             <a:r>
               <a:rPr lang="en-US"/>
@@ -2704,13 +2400,7 @@
       </p:sp>
       <p:sp>
         <p:nvSpPr>
-          <p:cNvPr id="5" name="Date Placeholder 4">
-            <a:extLst>
-              <a:ext uri="{FF2B5EF4-FFF2-40B4-BE49-F238E27FC236}">
-                <a16:creationId xmlns:a16="http://schemas.microsoft.com/office/drawing/2014/main" id="{575D3EBF-3C99-419C-B4E1-16BF51306A24}"/>
-              </a:ext>
-            </a:extLst>
-          </p:cNvPr>
+          <p:cNvPr id="5" name="Date Placeholder 4"/>
           <p:cNvSpPr>
             <a:spLocks noGrp="1"/>
           </p:cNvSpPr>
@@ -2725,7 +2415,7 @@
           <a:p>
             <a:fld id="{AABE0D5F-EF8E-4089-A75E-93EF4FB18C62}" type="datetimeFigureOut">
               <a:rPr lang="en-US" smtClean="0"/>
-              <a:t>1/21/2021</a:t>
+              <a:t>1/27/2021</a:t>
             </a:fld>
             <a:endParaRPr lang="en-US"/>
           </a:p>
@@ -2733,13 +2423,7 @@
       </p:sp>
       <p:sp>
         <p:nvSpPr>
-          <p:cNvPr id="6" name="Footer Placeholder 5">
-            <a:extLst>
-              <a:ext uri="{FF2B5EF4-FFF2-40B4-BE49-F238E27FC236}">
-                <a16:creationId xmlns:a16="http://schemas.microsoft.com/office/drawing/2014/main" id="{A003EE54-67D1-4230-958D-F85262AA94C4}"/>
-              </a:ext>
-            </a:extLst>
-          </p:cNvPr>
+          <p:cNvPr id="6" name="Footer Placeholder 5"/>
           <p:cNvSpPr>
             <a:spLocks noGrp="1"/>
           </p:cNvSpPr>
@@ -2758,13 +2442,7 @@
       </p:sp>
       <p:sp>
         <p:nvSpPr>
-          <p:cNvPr id="7" name="Slide Number Placeholder 6">
-            <a:extLst>
-              <a:ext uri="{FF2B5EF4-FFF2-40B4-BE49-F238E27FC236}">
-                <a16:creationId xmlns:a16="http://schemas.microsoft.com/office/drawing/2014/main" id="{7F893BAF-A042-452F-962A-24AD3D482AA9}"/>
-              </a:ext>
-            </a:extLst>
-          </p:cNvPr>
+          <p:cNvPr id="7" name="Slide Number Placeholder 6"/>
           <p:cNvSpPr>
             <a:spLocks noGrp="1"/>
           </p:cNvSpPr>
@@ -2788,7 +2466,7 @@
     </p:spTree>
     <p:extLst>
       <p:ext uri="{BB962C8B-B14F-4D97-AF65-F5344CB8AC3E}">
-        <p14:creationId xmlns:p14="http://schemas.microsoft.com/office/powerpoint/2010/main" val="984361844"/>
+        <p14:creationId xmlns:p14="http://schemas.microsoft.com/office/powerpoint/2010/main" val="106285338"/>
       </p:ext>
     </p:extLst>
   </p:cSld>
@@ -2802,9 +2480,42 @@
 <p:sldMaster xmlns:a="http://schemas.openxmlformats.org/drawingml/2006/main" xmlns:r="http://schemas.openxmlformats.org/officeDocument/2006/relationships" xmlns:p="http://schemas.openxmlformats.org/presentationml/2006/main">
   <p:cSld>
     <p:bg>
-      <p:bgRef idx="1001">
-        <a:schemeClr val="bg1"/>
-      </p:bgRef>
+      <p:bgPr>
+        <a:gradFill flip="none" rotWithShape="1">
+          <a:gsLst>
+            <a:gs pos="53000">
+              <a:schemeClr val="accent1">
+                <a:lumMod val="60000"/>
+                <a:lumOff val="40000"/>
+              </a:schemeClr>
+            </a:gs>
+            <a:gs pos="27000">
+              <a:srgbClr val="D1476E"/>
+            </a:gs>
+            <a:gs pos="74000">
+              <a:schemeClr val="accent1">
+                <a:lumMod val="45000"/>
+                <a:lumOff val="55000"/>
+              </a:schemeClr>
+            </a:gs>
+            <a:gs pos="83000">
+              <a:schemeClr val="accent1">
+                <a:lumMod val="45000"/>
+                <a:lumOff val="55000"/>
+              </a:schemeClr>
+            </a:gs>
+            <a:gs pos="100000">
+              <a:schemeClr val="accent1">
+                <a:lumMod val="30000"/>
+                <a:lumOff val="70000"/>
+              </a:schemeClr>
+            </a:gs>
+          </a:gsLst>
+          <a:lin ang="5400000" scaled="1"/>
+          <a:tileRect/>
+        </a:gradFill>
+        <a:effectLst/>
+      </p:bgPr>
     </p:bg>
     <p:spTree>
       <p:nvGrpSpPr>
@@ -2822,13 +2533,7 @@
       </p:grpSpPr>
       <p:sp>
         <p:nvSpPr>
-          <p:cNvPr id="2" name="Title Placeholder 1">
-            <a:extLst>
-              <a:ext uri="{FF2B5EF4-FFF2-40B4-BE49-F238E27FC236}">
-                <a16:creationId xmlns:a16="http://schemas.microsoft.com/office/drawing/2014/main" id="{D1E418B1-1170-4884-9152-F5850B4D357A}"/>
-              </a:ext>
-            </a:extLst>
-          </p:cNvPr>
+          <p:cNvPr id="2" name="Title Placeholder 1"/>
           <p:cNvSpPr>
             <a:spLocks noGrp="1"/>
           </p:cNvSpPr>
@@ -2838,8 +2543,8 @@
         </p:nvSpPr>
         <p:spPr>
           <a:xfrm>
-            <a:off x="838200" y="365125"/>
-            <a:ext cx="10515600" cy="1325563"/>
+            <a:off x="2828925" y="2190759"/>
+            <a:ext cx="35490150" cy="7953378"/>
           </a:xfrm>
           <a:prstGeom prst="rect">
             <a:avLst/>
@@ -2855,18 +2560,13 @@
               <a:rPr lang="en-US"/>
               <a:t>Click to edit Master title style</a:t>
             </a:r>
-          </a:p>
-        </p:txBody>
-      </p:sp>
-      <p:sp>
-        <p:nvSpPr>
-          <p:cNvPr id="3" name="Text Placeholder 2">
-            <a:extLst>
-              <a:ext uri="{FF2B5EF4-FFF2-40B4-BE49-F238E27FC236}">
-                <a16:creationId xmlns:a16="http://schemas.microsoft.com/office/drawing/2014/main" id="{AA86E4B2-43E0-4B5A-9775-2F77CB2D6C9A}"/>
-              </a:ext>
-            </a:extLst>
-          </p:cNvPr>
+            <a:endParaRPr lang="en-US" dirty="0"/>
+          </a:p>
+        </p:txBody>
+      </p:sp>
+      <p:sp>
+        <p:nvSpPr>
+          <p:cNvPr id="3" name="Text Placeholder 2"/>
           <p:cNvSpPr>
             <a:spLocks noGrp="1"/>
           </p:cNvSpPr>
@@ -2876,8 +2576,8 @@
         </p:nvSpPr>
         <p:spPr>
           <a:xfrm>
-            <a:off x="838200" y="1825625"/>
-            <a:ext cx="10515600" cy="4351338"/>
+            <a:off x="2828925" y="10953750"/>
+            <a:ext cx="35490150" cy="26108028"/>
           </a:xfrm>
           <a:prstGeom prst="rect">
             <a:avLst/>
@@ -2922,18 +2622,13 @@
               <a:rPr lang="en-US"/>
               <a:t>Fifth level</a:t>
             </a:r>
-          </a:p>
-        </p:txBody>
-      </p:sp>
-      <p:sp>
-        <p:nvSpPr>
-          <p:cNvPr id="4" name="Date Placeholder 3">
-            <a:extLst>
-              <a:ext uri="{FF2B5EF4-FFF2-40B4-BE49-F238E27FC236}">
-                <a16:creationId xmlns:a16="http://schemas.microsoft.com/office/drawing/2014/main" id="{91B46406-8687-4F21-BB77-C1705FA9A1D7}"/>
-              </a:ext>
-            </a:extLst>
-          </p:cNvPr>
+            <a:endParaRPr lang="en-US" dirty="0"/>
+          </a:p>
+        </p:txBody>
+      </p:sp>
+      <p:sp>
+        <p:nvSpPr>
+          <p:cNvPr id="4" name="Date Placeholder 3"/>
           <p:cNvSpPr>
             <a:spLocks noGrp="1"/>
           </p:cNvSpPr>
@@ -2943,8 +2638,8 @@
         </p:nvSpPr>
         <p:spPr>
           <a:xfrm>
-            <a:off x="838200" y="6356350"/>
-            <a:ext cx="2743200" cy="365125"/>
+            <a:off x="2828925" y="38138109"/>
+            <a:ext cx="9258300" cy="2190750"/>
           </a:xfrm>
           <a:prstGeom prst="rect">
             <a:avLst/>
@@ -2954,7 +2649,7 @@
           <a:bodyPr vert="horz" lIns="91440" tIns="45720" rIns="91440" bIns="45720" rtlCol="0" anchor="ctr"/>
           <a:lstStyle>
             <a:lvl1pPr algn="l">
-              <a:defRPr sz="1200">
+              <a:defRPr sz="5400">
                 <a:solidFill>
                   <a:schemeClr val="tx1">
                     <a:tint val="75000"/>
@@ -2966,7 +2661,7 @@
           <a:p>
             <a:fld id="{AABE0D5F-EF8E-4089-A75E-93EF4FB18C62}" type="datetimeFigureOut">
               <a:rPr lang="en-US" smtClean="0"/>
-              <a:t>1/21/2021</a:t>
+              <a:t>1/27/2021</a:t>
             </a:fld>
             <a:endParaRPr lang="en-US"/>
           </a:p>
@@ -2974,13 +2669,7 @@
       </p:sp>
       <p:sp>
         <p:nvSpPr>
-          <p:cNvPr id="5" name="Footer Placeholder 4">
-            <a:extLst>
-              <a:ext uri="{FF2B5EF4-FFF2-40B4-BE49-F238E27FC236}">
-                <a16:creationId xmlns:a16="http://schemas.microsoft.com/office/drawing/2014/main" id="{3B6091ED-527B-47E8-B7F8-77C298195572}"/>
-              </a:ext>
-            </a:extLst>
-          </p:cNvPr>
+          <p:cNvPr id="5" name="Footer Placeholder 4"/>
           <p:cNvSpPr>
             <a:spLocks noGrp="1"/>
           </p:cNvSpPr>
@@ -2990,8 +2679,8 @@
         </p:nvSpPr>
         <p:spPr>
           <a:xfrm>
-            <a:off x="4038600" y="6356350"/>
-            <a:ext cx="4114800" cy="365125"/>
+            <a:off x="13630275" y="38138109"/>
+            <a:ext cx="13887450" cy="2190750"/>
           </a:xfrm>
           <a:prstGeom prst="rect">
             <a:avLst/>
@@ -3001,7 +2690,7 @@
           <a:bodyPr vert="horz" lIns="91440" tIns="45720" rIns="91440" bIns="45720" rtlCol="0" anchor="ctr"/>
           <a:lstStyle>
             <a:lvl1pPr algn="ctr">
-              <a:defRPr sz="1200">
+              <a:defRPr sz="5400">
                 <a:solidFill>
                   <a:schemeClr val="tx1">
                     <a:tint val="75000"/>
@@ -3017,13 +2706,7 @@
       </p:sp>
       <p:sp>
         <p:nvSpPr>
-          <p:cNvPr id="6" name="Slide Number Placeholder 5">
-            <a:extLst>
-              <a:ext uri="{FF2B5EF4-FFF2-40B4-BE49-F238E27FC236}">
-                <a16:creationId xmlns:a16="http://schemas.microsoft.com/office/drawing/2014/main" id="{6337DBEB-5FA5-45BF-B2A7-9E9536DA9123}"/>
-              </a:ext>
-            </a:extLst>
-          </p:cNvPr>
+          <p:cNvPr id="6" name="Slide Number Placeholder 5"/>
           <p:cNvSpPr>
             <a:spLocks noGrp="1"/>
           </p:cNvSpPr>
@@ -3033,8 +2716,8 @@
         </p:nvSpPr>
         <p:spPr>
           <a:xfrm>
-            <a:off x="8610600" y="6356350"/>
-            <a:ext cx="2743200" cy="365125"/>
+            <a:off x="29060775" y="38138109"/>
+            <a:ext cx="9258300" cy="2190750"/>
           </a:xfrm>
           <a:prstGeom prst="rect">
             <a:avLst/>
@@ -3044,7 +2727,7 @@
           <a:bodyPr vert="horz" lIns="91440" tIns="45720" rIns="91440" bIns="45720" rtlCol="0" anchor="ctr"/>
           <a:lstStyle>
             <a:lvl1pPr algn="r">
-              <a:defRPr sz="1200">
+              <a:defRPr sz="5400">
                 <a:solidFill>
                   <a:schemeClr val="tx1">
                     <a:tint val="75000"/>
@@ -3065,27 +2748,27 @@
     </p:spTree>
     <p:extLst>
       <p:ext uri="{BB962C8B-B14F-4D97-AF65-F5344CB8AC3E}">
-        <p14:creationId xmlns:p14="http://schemas.microsoft.com/office/powerpoint/2010/main" val="2581949458"/>
+        <p14:creationId xmlns:p14="http://schemas.microsoft.com/office/powerpoint/2010/main" val="1928010439"/>
       </p:ext>
     </p:extLst>
   </p:cSld>
   <p:clrMap bg1="lt1" tx1="dk1" bg2="lt2" tx2="dk2" accent1="accent1" accent2="accent2" accent3="accent3" accent4="accent4" accent5="accent5" accent6="accent6" hlink="hlink" folHlink="folHlink"/>
   <p:sldLayoutIdLst>
-    <p:sldLayoutId id="2147483649" r:id="rId1"/>
-    <p:sldLayoutId id="2147483650" r:id="rId2"/>
-    <p:sldLayoutId id="2147483651" r:id="rId3"/>
-    <p:sldLayoutId id="2147483652" r:id="rId4"/>
-    <p:sldLayoutId id="2147483653" r:id="rId5"/>
-    <p:sldLayoutId id="2147483654" r:id="rId6"/>
-    <p:sldLayoutId id="2147483655" r:id="rId7"/>
-    <p:sldLayoutId id="2147483656" r:id="rId8"/>
-    <p:sldLayoutId id="2147483657" r:id="rId9"/>
-    <p:sldLayoutId id="2147483658" r:id="rId10"/>
-    <p:sldLayoutId id="2147483659" r:id="rId11"/>
+    <p:sldLayoutId id="2147483673" r:id="rId1"/>
+    <p:sldLayoutId id="2147483674" r:id="rId2"/>
+    <p:sldLayoutId id="2147483675" r:id="rId3"/>
+    <p:sldLayoutId id="2147483676" r:id="rId4"/>
+    <p:sldLayoutId id="2147483677" r:id="rId5"/>
+    <p:sldLayoutId id="2147483678" r:id="rId6"/>
+    <p:sldLayoutId id="2147483679" r:id="rId7"/>
+    <p:sldLayoutId id="2147483680" r:id="rId8"/>
+    <p:sldLayoutId id="2147483681" r:id="rId9"/>
+    <p:sldLayoutId id="2147483682" r:id="rId10"/>
+    <p:sldLayoutId id="2147483683" r:id="rId11"/>
   </p:sldLayoutIdLst>
   <p:txStyles>
     <p:titleStyle>
-      <a:lvl1pPr algn="l" defTabSz="914400" rtl="0" eaLnBrk="1" latinLnBrk="0" hangingPunct="1">
+      <a:lvl1pPr algn="l" defTabSz="4114800" rtl="0" eaLnBrk="1" latinLnBrk="0" hangingPunct="1">
         <a:lnSpc>
           <a:spcPct val="90000"/>
         </a:lnSpc>
@@ -3093,7 +2776,7 @@
           <a:spcPct val="0"/>
         </a:spcBef>
         <a:buNone/>
-        <a:defRPr sz="4400" kern="1200">
+        <a:defRPr sz="19800" kern="1200">
           <a:solidFill>
             <a:schemeClr val="tx1"/>
           </a:solidFill>
@@ -3104,16 +2787,16 @@
       </a:lvl1pPr>
     </p:titleStyle>
     <p:bodyStyle>
-      <a:lvl1pPr marL="228600" indent="-228600" algn="l" defTabSz="914400" rtl="0" eaLnBrk="1" latinLnBrk="0" hangingPunct="1">
+      <a:lvl1pPr marL="1028700" indent="-1028700" algn="l" defTabSz="4114800" rtl="0" eaLnBrk="1" latinLnBrk="0" hangingPunct="1">
         <a:lnSpc>
           <a:spcPct val="90000"/>
         </a:lnSpc>
         <a:spcBef>
-          <a:spcPts val="1000"/>
+          <a:spcPts val="4500"/>
         </a:spcBef>
         <a:buFont typeface="Arial" panose="020B0604020202020204" pitchFamily="34" charset="0"/>
         <a:buChar char="•"/>
-        <a:defRPr sz="2800" kern="1200">
+        <a:defRPr sz="12600" kern="1200">
           <a:solidFill>
             <a:schemeClr val="tx1"/>
           </a:solidFill>
@@ -3122,16 +2805,16 @@
           <a:cs typeface="+mn-cs"/>
         </a:defRPr>
       </a:lvl1pPr>
-      <a:lvl2pPr marL="685800" indent="-228600" algn="l" defTabSz="914400" rtl="0" eaLnBrk="1" latinLnBrk="0" hangingPunct="1">
+      <a:lvl2pPr marL="3086100" indent="-1028700" algn="l" defTabSz="4114800" rtl="0" eaLnBrk="1" latinLnBrk="0" hangingPunct="1">
         <a:lnSpc>
           <a:spcPct val="90000"/>
         </a:lnSpc>
         <a:spcBef>
-          <a:spcPts val="500"/>
+          <a:spcPts val="2250"/>
         </a:spcBef>
         <a:buFont typeface="Arial" panose="020B0604020202020204" pitchFamily="34" charset="0"/>
         <a:buChar char="•"/>
-        <a:defRPr sz="2400" kern="1200">
+        <a:defRPr sz="10800" kern="1200">
           <a:solidFill>
             <a:schemeClr val="tx1"/>
           </a:solidFill>
@@ -3140,16 +2823,16 @@
           <a:cs typeface="+mn-cs"/>
         </a:defRPr>
       </a:lvl2pPr>
-      <a:lvl3pPr marL="1143000" indent="-228600" algn="l" defTabSz="914400" rtl="0" eaLnBrk="1" latinLnBrk="0" hangingPunct="1">
+      <a:lvl3pPr marL="5143500" indent="-1028700" algn="l" defTabSz="4114800" rtl="0" eaLnBrk="1" latinLnBrk="0" hangingPunct="1">
         <a:lnSpc>
           <a:spcPct val="90000"/>
         </a:lnSpc>
         <a:spcBef>
-          <a:spcPts val="500"/>
+          <a:spcPts val="2250"/>
         </a:spcBef>
         <a:buFont typeface="Arial" panose="020B0604020202020204" pitchFamily="34" charset="0"/>
         <a:buChar char="•"/>
-        <a:defRPr sz="2000" kern="1200">
+        <a:defRPr sz="9000" kern="1200">
           <a:solidFill>
             <a:schemeClr val="tx1"/>
           </a:solidFill>
@@ -3158,16 +2841,16 @@
           <a:cs typeface="+mn-cs"/>
         </a:defRPr>
       </a:lvl3pPr>
-      <a:lvl4pPr marL="1600200" indent="-228600" algn="l" defTabSz="914400" rtl="0" eaLnBrk="1" latinLnBrk="0" hangingPunct="1">
+      <a:lvl4pPr marL="7200900" indent="-1028700" algn="l" defTabSz="4114800" rtl="0" eaLnBrk="1" latinLnBrk="0" hangingPunct="1">
         <a:lnSpc>
           <a:spcPct val="90000"/>
         </a:lnSpc>
         <a:spcBef>
-          <a:spcPts val="500"/>
+          <a:spcPts val="2250"/>
         </a:spcBef>
         <a:buFont typeface="Arial" panose="020B0604020202020204" pitchFamily="34" charset="0"/>
         <a:buChar char="•"/>
-        <a:defRPr sz="1800" kern="1200">
+        <a:defRPr sz="8100" kern="1200">
           <a:solidFill>
             <a:schemeClr val="tx1"/>
           </a:solidFill>
@@ -3176,16 +2859,16 @@
           <a:cs typeface="+mn-cs"/>
         </a:defRPr>
       </a:lvl4pPr>
-      <a:lvl5pPr marL="2057400" indent="-228600" algn="l" defTabSz="914400" rtl="0" eaLnBrk="1" latinLnBrk="0" hangingPunct="1">
+      <a:lvl5pPr marL="9258300" indent="-1028700" algn="l" defTabSz="4114800" rtl="0" eaLnBrk="1" latinLnBrk="0" hangingPunct="1">
         <a:lnSpc>
           <a:spcPct val="90000"/>
         </a:lnSpc>
         <a:spcBef>
-          <a:spcPts val="500"/>
+          <a:spcPts val="2250"/>
         </a:spcBef>
         <a:buFont typeface="Arial" panose="020B0604020202020204" pitchFamily="34" charset="0"/>
         <a:buChar char="•"/>
-        <a:defRPr sz="1800" kern="1200">
+        <a:defRPr sz="8100" kern="1200">
           <a:solidFill>
             <a:schemeClr val="tx1"/>
           </a:solidFill>
@@ -3194,16 +2877,16 @@
           <a:cs typeface="+mn-cs"/>
         </a:defRPr>
       </a:lvl5pPr>
-      <a:lvl6pPr marL="2514600" indent="-228600" algn="l" defTabSz="914400" rtl="0" eaLnBrk="1" latinLnBrk="0" hangingPunct="1">
+      <a:lvl6pPr marL="11315700" indent="-1028700" algn="l" defTabSz="4114800" rtl="0" eaLnBrk="1" latinLnBrk="0" hangingPunct="1">
         <a:lnSpc>
           <a:spcPct val="90000"/>
         </a:lnSpc>
         <a:spcBef>
-          <a:spcPts val="500"/>
+          <a:spcPts val="2250"/>
         </a:spcBef>
         <a:buFont typeface="Arial" panose="020B0604020202020204" pitchFamily="34" charset="0"/>
         <a:buChar char="•"/>
-        <a:defRPr sz="1800" kern="1200">
+        <a:defRPr sz="8100" kern="1200">
           <a:solidFill>
             <a:schemeClr val="tx1"/>
           </a:solidFill>
@@ -3212,16 +2895,16 @@
           <a:cs typeface="+mn-cs"/>
         </a:defRPr>
       </a:lvl6pPr>
-      <a:lvl7pPr marL="2971800" indent="-228600" algn="l" defTabSz="914400" rtl="0" eaLnBrk="1" latinLnBrk="0" hangingPunct="1">
+      <a:lvl7pPr marL="13373100" indent="-1028700" algn="l" defTabSz="4114800" rtl="0" eaLnBrk="1" latinLnBrk="0" hangingPunct="1">
         <a:lnSpc>
           <a:spcPct val="90000"/>
         </a:lnSpc>
         <a:spcBef>
-          <a:spcPts val="500"/>
+          <a:spcPts val="2250"/>
         </a:spcBef>
         <a:buFont typeface="Arial" panose="020B0604020202020204" pitchFamily="34" charset="0"/>
         <a:buChar char="•"/>
-        <a:defRPr sz="1800" kern="1200">
+        <a:defRPr sz="8100" kern="1200">
           <a:solidFill>
             <a:schemeClr val="tx1"/>
           </a:solidFill>
@@ -3230,16 +2913,16 @@
           <a:cs typeface="+mn-cs"/>
         </a:defRPr>
       </a:lvl7pPr>
-      <a:lvl8pPr marL="3429000" indent="-228600" algn="l" defTabSz="914400" rtl="0" eaLnBrk="1" latinLnBrk="0" hangingPunct="1">
+      <a:lvl8pPr marL="15430500" indent="-1028700" algn="l" defTabSz="4114800" rtl="0" eaLnBrk="1" latinLnBrk="0" hangingPunct="1">
         <a:lnSpc>
           <a:spcPct val="90000"/>
         </a:lnSpc>
         <a:spcBef>
-          <a:spcPts val="500"/>
+          <a:spcPts val="2250"/>
         </a:spcBef>
         <a:buFont typeface="Arial" panose="020B0604020202020204" pitchFamily="34" charset="0"/>
         <a:buChar char="•"/>
-        <a:defRPr sz="1800" kern="1200">
+        <a:defRPr sz="8100" kern="1200">
           <a:solidFill>
             <a:schemeClr val="tx1"/>
           </a:solidFill>
@@ -3248,16 +2931,16 @@
           <a:cs typeface="+mn-cs"/>
         </a:defRPr>
       </a:lvl8pPr>
-      <a:lvl9pPr marL="3886200" indent="-228600" algn="l" defTabSz="914400" rtl="0" eaLnBrk="1" latinLnBrk="0" hangingPunct="1">
+      <a:lvl9pPr marL="17487900" indent="-1028700" algn="l" defTabSz="4114800" rtl="0" eaLnBrk="1" latinLnBrk="0" hangingPunct="1">
         <a:lnSpc>
           <a:spcPct val="90000"/>
         </a:lnSpc>
         <a:spcBef>
-          <a:spcPts val="500"/>
+          <a:spcPts val="2250"/>
         </a:spcBef>
         <a:buFont typeface="Arial" panose="020B0604020202020204" pitchFamily="34" charset="0"/>
         <a:buChar char="•"/>
-        <a:defRPr sz="1800" kern="1200">
+        <a:defRPr sz="8100" kern="1200">
           <a:solidFill>
             <a:schemeClr val="tx1"/>
           </a:solidFill>
@@ -3271,8 +2954,8 @@
       <a:defPPr>
         <a:defRPr lang="en-US"/>
       </a:defPPr>
-      <a:lvl1pPr marL="0" algn="l" defTabSz="914400" rtl="0" eaLnBrk="1" latinLnBrk="0" hangingPunct="1">
-        <a:defRPr sz="1800" kern="1200">
+      <a:lvl1pPr marL="0" algn="l" defTabSz="4114800" rtl="0" eaLnBrk="1" latinLnBrk="0" hangingPunct="1">
+        <a:defRPr sz="8100" kern="1200">
           <a:solidFill>
             <a:schemeClr val="tx1"/>
           </a:solidFill>
@@ -3281,8 +2964,8 @@
           <a:cs typeface="+mn-cs"/>
         </a:defRPr>
       </a:lvl1pPr>
-      <a:lvl2pPr marL="457200" algn="l" defTabSz="914400" rtl="0" eaLnBrk="1" latinLnBrk="0" hangingPunct="1">
-        <a:defRPr sz="1800" kern="1200">
+      <a:lvl2pPr marL="2057400" algn="l" defTabSz="4114800" rtl="0" eaLnBrk="1" latinLnBrk="0" hangingPunct="1">
+        <a:defRPr sz="8100" kern="1200">
           <a:solidFill>
             <a:schemeClr val="tx1"/>
           </a:solidFill>
@@ -3291,8 +2974,8 @@
           <a:cs typeface="+mn-cs"/>
         </a:defRPr>
       </a:lvl2pPr>
-      <a:lvl3pPr marL="914400" algn="l" defTabSz="914400" rtl="0" eaLnBrk="1" latinLnBrk="0" hangingPunct="1">
-        <a:defRPr sz="1800" kern="1200">
+      <a:lvl3pPr marL="4114800" algn="l" defTabSz="4114800" rtl="0" eaLnBrk="1" latinLnBrk="0" hangingPunct="1">
+        <a:defRPr sz="8100" kern="1200">
           <a:solidFill>
             <a:schemeClr val="tx1"/>
           </a:solidFill>
@@ -3301,8 +2984,8 @@
           <a:cs typeface="+mn-cs"/>
         </a:defRPr>
       </a:lvl3pPr>
-      <a:lvl4pPr marL="1371600" algn="l" defTabSz="914400" rtl="0" eaLnBrk="1" latinLnBrk="0" hangingPunct="1">
-        <a:defRPr sz="1800" kern="1200">
+      <a:lvl4pPr marL="6172200" algn="l" defTabSz="4114800" rtl="0" eaLnBrk="1" latinLnBrk="0" hangingPunct="1">
+        <a:defRPr sz="8100" kern="1200">
           <a:solidFill>
             <a:schemeClr val="tx1"/>
           </a:solidFill>
@@ -3311,8 +2994,8 @@
           <a:cs typeface="+mn-cs"/>
         </a:defRPr>
       </a:lvl4pPr>
-      <a:lvl5pPr marL="1828800" algn="l" defTabSz="914400" rtl="0" eaLnBrk="1" latinLnBrk="0" hangingPunct="1">
-        <a:defRPr sz="1800" kern="1200">
+      <a:lvl5pPr marL="8229600" algn="l" defTabSz="4114800" rtl="0" eaLnBrk="1" latinLnBrk="0" hangingPunct="1">
+        <a:defRPr sz="8100" kern="1200">
           <a:solidFill>
             <a:schemeClr val="tx1"/>
           </a:solidFill>
@@ -3321,8 +3004,8 @@
           <a:cs typeface="+mn-cs"/>
         </a:defRPr>
       </a:lvl5pPr>
-      <a:lvl6pPr marL="2286000" algn="l" defTabSz="914400" rtl="0" eaLnBrk="1" latinLnBrk="0" hangingPunct="1">
-        <a:defRPr sz="1800" kern="1200">
+      <a:lvl6pPr marL="10287000" algn="l" defTabSz="4114800" rtl="0" eaLnBrk="1" latinLnBrk="0" hangingPunct="1">
+        <a:defRPr sz="8100" kern="1200">
           <a:solidFill>
             <a:schemeClr val="tx1"/>
           </a:solidFill>
@@ -3331,8 +3014,8 @@
           <a:cs typeface="+mn-cs"/>
         </a:defRPr>
       </a:lvl6pPr>
-      <a:lvl7pPr marL="2743200" algn="l" defTabSz="914400" rtl="0" eaLnBrk="1" latinLnBrk="0" hangingPunct="1">
-        <a:defRPr sz="1800" kern="1200">
+      <a:lvl7pPr marL="12344400" algn="l" defTabSz="4114800" rtl="0" eaLnBrk="1" latinLnBrk="0" hangingPunct="1">
+        <a:defRPr sz="8100" kern="1200">
           <a:solidFill>
             <a:schemeClr val="tx1"/>
           </a:solidFill>
@@ -3341,8 +3024,8 @@
           <a:cs typeface="+mn-cs"/>
         </a:defRPr>
       </a:lvl7pPr>
-      <a:lvl8pPr marL="3200400" algn="l" defTabSz="914400" rtl="0" eaLnBrk="1" latinLnBrk="0" hangingPunct="1">
-        <a:defRPr sz="1800" kern="1200">
+      <a:lvl8pPr marL="14401800" algn="l" defTabSz="4114800" rtl="0" eaLnBrk="1" latinLnBrk="0" hangingPunct="1">
+        <a:defRPr sz="8100" kern="1200">
           <a:solidFill>
             <a:schemeClr val="tx1"/>
           </a:solidFill>
@@ -3351,8 +3034,8 @@
           <a:cs typeface="+mn-cs"/>
         </a:defRPr>
       </a:lvl8pPr>
-      <a:lvl9pPr marL="3657600" algn="l" defTabSz="914400" rtl="0" eaLnBrk="1" latinLnBrk="0" hangingPunct="1">
-        <a:defRPr sz="1800" kern="1200">
+      <a:lvl9pPr marL="16459200" algn="l" defTabSz="4114800" rtl="0" eaLnBrk="1" latinLnBrk="0" hangingPunct="1">
+        <a:defRPr sz="8100" kern="1200">
           <a:solidFill>
             <a:schemeClr val="tx1"/>
           </a:solidFill>
@@ -3371,12 +3054,38 @@
   <p:cSld>
     <p:bg>
       <p:bgPr>
-        <a:solidFill>
-          <a:schemeClr val="accent3">
-            <a:lumMod val="40000"/>
-            <a:lumOff val="60000"/>
-          </a:schemeClr>
-        </a:solidFill>
+        <a:gradFill>
+          <a:gsLst>
+            <a:gs pos="53000">
+              <a:schemeClr val="accent1">
+                <a:lumMod val="60000"/>
+                <a:lumOff val="40000"/>
+              </a:schemeClr>
+            </a:gs>
+            <a:gs pos="27000">
+              <a:srgbClr val="D1476E"/>
+            </a:gs>
+            <a:gs pos="74000">
+              <a:schemeClr val="accent1">
+                <a:lumMod val="45000"/>
+                <a:lumOff val="55000"/>
+              </a:schemeClr>
+            </a:gs>
+            <a:gs pos="83000">
+              <a:schemeClr val="accent1">
+                <a:lumMod val="45000"/>
+                <a:lumOff val="55000"/>
+              </a:schemeClr>
+            </a:gs>
+            <a:gs pos="100000">
+              <a:schemeClr val="accent1">
+                <a:lumMod val="30000"/>
+                <a:lumOff val="70000"/>
+              </a:schemeClr>
+            </a:gs>
+          </a:gsLst>
+          <a:lin ang="5400000" scaled="1"/>
+        </a:gradFill>
         <a:effectLst/>
       </p:bgPr>
     </p:bg>
@@ -3412,8 +3121,8 @@
         </p:nvSpPr>
         <p:spPr>
           <a:xfrm>
-            <a:off x="538579" y="262530"/>
-            <a:ext cx="7238260" cy="576263"/>
+            <a:off x="2924616" y="2975509"/>
+            <a:ext cx="28222735" cy="6815980"/>
           </a:xfrm>
         </p:spPr>
         <p:txBody>
@@ -3424,18 +3133,11 @@
           <a:p>
             <a:pPr algn="l"/>
             <a:r>
-              <a:rPr lang="en-US" sz="3200" dirty="0">
+              <a:rPr lang="en-US" sz="9600" dirty="0">
                 <a:latin typeface="Arial" panose="020B0604020202020204" pitchFamily="34" charset="0"/>
                 <a:cs typeface="Arial" panose="020B0604020202020204" pitchFamily="34" charset="0"/>
               </a:rPr>
-              <a:t>Marine heat waves in the Chile-Peru Eastern Boundary Upwelling System: </a:t>
-            </a:r>
-            <a:r>
-              <a:rPr lang="en-US" sz="1800" dirty="0">
-                <a:latin typeface="Arial" panose="020B0604020202020204" pitchFamily="34" charset="0"/>
-                <a:cs typeface="Arial" panose="020B0604020202020204" pitchFamily="34" charset="0"/>
-              </a:rPr>
-              <a:t>rates of change in sea-surface temperature anomalies near a major upwelling center</a:t>
+              <a:t>Marine heat waves in the Chile-Peru Eastern Boundary Upwelling System: rates of change in sea-surface temperature anomalies near a major upwelling center</a:t>
             </a:r>
           </a:p>
         </p:txBody>
@@ -3454,8 +3156,8 @@
         </p:nvSpPr>
         <p:spPr>
           <a:xfrm>
-            <a:off x="186765" y="3187083"/>
-            <a:ext cx="3169329" cy="3416320"/>
+            <a:off x="1701752" y="9446981"/>
+            <a:ext cx="9696681" cy="26868894"/>
           </a:xfrm>
           <a:prstGeom prst="rect">
             <a:avLst/>
@@ -3469,28 +3171,42 @@
           <a:lstStyle/>
           <a:p>
             <a:r>
-              <a:rPr lang="en-US" sz="800" b="1" dirty="0">
+              <a:rPr lang="en-US" sz="4000" b="1" dirty="0">
                 <a:latin typeface="Arial" panose="020B0604020202020204" pitchFamily="34" charset="0"/>
                 <a:cs typeface="Arial" panose="020B0604020202020204" pitchFamily="34" charset="0"/>
               </a:rPr>
               <a:t>Abstract</a:t>
             </a:r>
             <a:r>
-              <a:rPr lang="en-US" sz="800" dirty="0">
+              <a:rPr lang="en-US" sz="4000" dirty="0">
                 <a:latin typeface="Arial" panose="020B0604020202020204" pitchFamily="34" charset="0"/>
                 <a:cs typeface="Arial" panose="020B0604020202020204" pitchFamily="34" charset="0"/>
               </a:rPr>
-              <a:t>: In the Chile-Peru eastern boundary upwelling system (EBUS), scientists do not yet understand which forcing mechanisms dominate the surface ocean heat budget during marine heat waves. Although primary contributing processes and extent of warming may vary, worldwide EBUS are sensitive to prolonged periods of extreme warming, which may affect their ability to serve as important biological and economic centers. In the California Current System (CCS), there are apparent dipole patterns in SST anomalies and in surface wind stress measurements during wind relaxations. Previous studies found that SST anomalies during wind relaxation events were preconditioned to be colder than average, but still showed heating during the relaxation via advection of SST gradients from farther south, decreased entrainment and Ekman pumping at the base of the mixed layer, and some combination of cloudiness and SST feedback.  We analyzed SST anomalies surrounding the Punta </a:t>
-            </a:r>
-            <a:r>
-              <a:rPr lang="en-US" sz="800" dirty="0" err="1">
+              <a:t>: In the Chile-Peru eastern boundary upwelling system (EBUS), scientists do not yet understand which forcing </a:t>
+            </a:r>
+            <a:r>
+              <a:rPr lang="en-US" sz="6000" dirty="0">
+                <a:latin typeface="Arial" panose="020B0604020202020204" pitchFamily="34" charset="0"/>
+                <a:cs typeface="Arial" panose="020B0604020202020204" pitchFamily="34" charset="0"/>
+              </a:rPr>
+              <a:t>mechanisms</a:t>
+            </a:r>
+            <a:r>
+              <a:rPr lang="en-US" sz="4000" dirty="0">
+                <a:latin typeface="Arial" panose="020B0604020202020204" pitchFamily="34" charset="0"/>
+                <a:cs typeface="Arial" panose="020B0604020202020204" pitchFamily="34" charset="0"/>
+              </a:rPr>
+              <a:t> dominate the surface ocean heat budget during marine heat waves. Although primary contributing processes and extent of warming may vary, worldwide EBUS are sensitive to prolonged periods of extreme warming, which may affect their ability to serve as important biological and economic centers. In the California Current System (CCS), there are apparent dipole patterns in SST anomalies and in surface wind stress measurements during wind relaxations. Previous studies found that SST anomalies during wind relaxation events were preconditioned to be colder than average, but still showed heating during the relaxation via advection of SST gradients from farther south, decreased entrainment and Ekman pumping at the base of the mixed layer, and some combination of cloudiness and SST feedback.  We analyzed SST anomalies surrounding the Punta </a:t>
+            </a:r>
+            <a:r>
+              <a:rPr lang="en-US" sz="4000" dirty="0" err="1">
                 <a:latin typeface="Arial" panose="020B0604020202020204" pitchFamily="34" charset="0"/>
                 <a:cs typeface="Arial" panose="020B0604020202020204" pitchFamily="34" charset="0"/>
               </a:rPr>
               <a:t>Lavapié</a:t>
             </a:r>
             <a:r>
-              <a:rPr lang="en-US" sz="800" dirty="0">
+              <a:rPr lang="en-US" sz="4000" dirty="0">
                 <a:latin typeface="Arial" panose="020B0604020202020204" pitchFamily="34" charset="0"/>
                 <a:cs typeface="Arial" panose="020B0604020202020204" pitchFamily="34" charset="0"/>
               </a:rPr>
@@ -3513,8 +3229,8 @@
         </p:nvSpPr>
         <p:spPr>
           <a:xfrm>
-            <a:off x="8211845" y="238628"/>
-            <a:ext cx="3980155" cy="646331"/>
+            <a:off x="29380945" y="1488042"/>
+            <a:ext cx="14433400" cy="1938992"/>
           </a:xfrm>
           <a:prstGeom prst="rect">
             <a:avLst/>
@@ -3528,41 +3244,41 @@
           <a:lstStyle/>
           <a:p>
             <a:r>
-              <a:rPr lang="en-US" sz="1200" dirty="0">
+              <a:rPr lang="en-US" sz="4000" dirty="0">
                 <a:latin typeface="Arial" panose="020B0604020202020204" pitchFamily="34" charset="0"/>
                 <a:cs typeface="Arial" panose="020B0604020202020204" pitchFamily="34" charset="0"/>
               </a:rPr>
               <a:t>Kylene Cooley, Melanie R. </a:t>
             </a:r>
             <a:r>
-              <a:rPr lang="en-US" sz="1200" dirty="0" err="1">
+              <a:rPr lang="en-US" sz="4000" dirty="0" err="1">
                 <a:latin typeface="Arial" panose="020B0604020202020204" pitchFamily="34" charset="0"/>
                 <a:cs typeface="Arial" panose="020B0604020202020204" pitchFamily="34" charset="0"/>
               </a:rPr>
               <a:t>Fewings</a:t>
             </a:r>
             <a:r>
-              <a:rPr lang="en-US" sz="1200" dirty="0">
+              <a:rPr lang="en-US" sz="4000" dirty="0">
                 <a:latin typeface="Arial" panose="020B0604020202020204" pitchFamily="34" charset="0"/>
                 <a:cs typeface="Arial" panose="020B0604020202020204" pitchFamily="34" charset="0"/>
               </a:rPr>
               <a:t>, Jim </a:t>
             </a:r>
             <a:r>
-              <a:rPr lang="en-US" sz="1200" dirty="0" err="1">
+              <a:rPr lang="en-US" sz="4000" dirty="0" err="1">
                 <a:latin typeface="Arial" panose="020B0604020202020204" pitchFamily="34" charset="0"/>
                 <a:cs typeface="Arial" panose="020B0604020202020204" pitchFamily="34" charset="0"/>
               </a:rPr>
               <a:t>Lerczak</a:t>
             </a:r>
-            <a:endParaRPr lang="en-US" sz="1200" dirty="0">
+            <a:endParaRPr lang="en-US" sz="4000" dirty="0">
               <a:latin typeface="Arial" panose="020B0604020202020204" pitchFamily="34" charset="0"/>
               <a:cs typeface="Arial" panose="020B0604020202020204" pitchFamily="34" charset="0"/>
             </a:endParaRPr>
           </a:p>
           <a:p>
             <a:r>
-              <a:rPr lang="en-US" sz="1200" dirty="0">
+              <a:rPr lang="en-US" sz="4000" dirty="0">
                 <a:latin typeface="Arial" panose="020B0604020202020204" pitchFamily="34" charset="0"/>
                 <a:cs typeface="Arial" panose="020B0604020202020204" pitchFamily="34" charset="0"/>
               </a:rPr>
@@ -3571,7 +3287,7 @@
           </a:p>
           <a:p>
             <a:r>
-              <a:rPr lang="en-US" sz="1200" dirty="0">
+              <a:rPr lang="en-US" sz="4000" dirty="0">
                 <a:latin typeface="Arial" panose="020B0604020202020204" pitchFamily="34" charset="0"/>
                 <a:cs typeface="Arial" panose="020B0604020202020204" pitchFamily="34" charset="0"/>
                 <a:hlinkClick r:id="rId2"/>
@@ -3579,7 +3295,7 @@
               <a:t>cooleyky@oregonstate.edu</a:t>
             </a:r>
             <a:r>
-              <a:rPr lang="en-US" sz="1200" dirty="0">
+              <a:rPr lang="en-US" sz="4000" dirty="0">
                 <a:latin typeface="Arial" panose="020B0604020202020204" pitchFamily="34" charset="0"/>
                 <a:cs typeface="Arial" panose="020B0604020202020204" pitchFamily="34" charset="0"/>
               </a:rPr>
@@ -3602,8 +3318,8 @@
         </p:nvSpPr>
         <p:spPr>
           <a:xfrm>
-            <a:off x="3888419" y="2290439"/>
-            <a:ext cx="4065973" cy="369332"/>
+            <a:off x="13710802" y="9105825"/>
+            <a:ext cx="9463133" cy="1938992"/>
           </a:xfrm>
           <a:prstGeom prst="rect">
             <a:avLst/>
@@ -3617,7 +3333,7 @@
           <a:lstStyle/>
           <a:p>
             <a:r>
-              <a:rPr lang="en-US" dirty="0">
+              <a:rPr lang="en-US" sz="6000" dirty="0">
                 <a:latin typeface="Arial" panose="020B0604020202020204" pitchFamily="34" charset="0"/>
                 <a:cs typeface="Arial" panose="020B0604020202020204" pitchFamily="34" charset="0"/>
               </a:rPr>
@@ -3640,8 +3356,8 @@
         </p:nvSpPr>
         <p:spPr>
           <a:xfrm>
-            <a:off x="3888419" y="5552147"/>
-            <a:ext cx="3056521" cy="923330"/>
+            <a:off x="14218946" y="20574000"/>
+            <a:ext cx="15679929" cy="1938992"/>
           </a:xfrm>
           <a:prstGeom prst="rect">
             <a:avLst/>
@@ -3655,7 +3371,7 @@
           <a:lstStyle/>
           <a:p>
             <a:r>
-              <a:rPr lang="en-US" dirty="0">
+              <a:rPr lang="en-US" sz="6000" dirty="0">
                 <a:latin typeface="Arial" panose="020B0604020202020204" pitchFamily="34" charset="0"/>
                 <a:cs typeface="Arial" panose="020B0604020202020204" pitchFamily="34" charset="0"/>
               </a:rPr>
@@ -3678,8 +3394,8 @@
         </p:nvSpPr>
         <p:spPr>
           <a:xfrm>
-            <a:off x="8211846" y="3986930"/>
-            <a:ext cx="3882794" cy="646331"/>
+            <a:off x="22358871" y="27218574"/>
+            <a:ext cx="17576959" cy="1938992"/>
           </a:xfrm>
           <a:prstGeom prst="rect">
             <a:avLst/>
@@ -3693,7 +3409,7 @@
           <a:lstStyle/>
           <a:p>
             <a:r>
-              <a:rPr lang="en-US" dirty="0">
+              <a:rPr lang="en-US" sz="6000" dirty="0">
                 <a:latin typeface="Arial" panose="020B0604020202020204" pitchFamily="34" charset="0"/>
                 <a:cs typeface="Arial" panose="020B0604020202020204" pitchFamily="34" charset="0"/>
               </a:rPr>
@@ -3729,8 +3445,8 @@
         </p:blipFill>
         <p:spPr>
           <a:xfrm>
-            <a:off x="3356094" y="2921771"/>
-            <a:ext cx="4736359" cy="2351093"/>
+            <a:off x="12235437" y="11463874"/>
+            <a:ext cx="11374485" cy="5646208"/>
           </a:xfrm>
           <a:prstGeom prst="rect">
             <a:avLst/>
@@ -3764,8 +3480,8 @@
         </p:blipFill>
         <p:spPr>
           <a:xfrm>
-            <a:off x="8246740" y="1753964"/>
-            <a:ext cx="3758495" cy="1811614"/>
+            <a:off x="25240910" y="10600209"/>
+            <a:ext cx="15679929" cy="7557804"/>
           </a:xfrm>
           <a:prstGeom prst="rect">
             <a:avLst/>
@@ -3799,8 +3515,8 @@
         </p:blipFill>
         <p:spPr>
           <a:xfrm>
-            <a:off x="8246740" y="4643637"/>
-            <a:ext cx="3860959" cy="1959766"/>
+            <a:off x="23302394" y="29831707"/>
+            <a:ext cx="14433400" cy="7326183"/>
           </a:xfrm>
           <a:prstGeom prst="rect">
             <a:avLst/>
@@ -3834,8 +3550,8 @@
         </p:blipFill>
         <p:spPr>
           <a:xfrm>
-            <a:off x="408671" y="1869071"/>
-            <a:ext cx="2279440" cy="1052700"/>
+            <a:off x="1515193" y="37157890"/>
+            <a:ext cx="21440488" cy="9901732"/>
           </a:xfrm>
           <a:prstGeom prst="rect">
             <a:avLst/>
@@ -3856,8 +3572,8 @@
         </p:nvSpPr>
         <p:spPr>
           <a:xfrm>
-            <a:off x="7612878" y="6645717"/>
-            <a:ext cx="3980155" cy="215444"/>
+            <a:off x="29380945" y="38218127"/>
+            <a:ext cx="10416131" cy="2862322"/>
           </a:xfrm>
           <a:prstGeom prst="rect">
             <a:avLst/>
@@ -3871,7 +3587,7 @@
           <a:lstStyle/>
           <a:p>
             <a:r>
-              <a:rPr lang="en-US" sz="800" dirty="0">
+              <a:rPr lang="en-US" sz="6000" dirty="0">
                 <a:latin typeface="Arial" panose="020B0604020202020204" pitchFamily="34" charset="0"/>
                 <a:cs typeface="Arial" panose="020B0604020202020204" pitchFamily="34" charset="0"/>
               </a:rPr>
@@ -3893,10 +3609,1184 @@
 </p:sld>
 </file>
 
+<file path=ppt/slides/slide10.xml><?xml version="1.0" encoding="utf-8"?>
+<p:sld xmlns:a="http://schemas.openxmlformats.org/drawingml/2006/main" xmlns:r="http://schemas.openxmlformats.org/officeDocument/2006/relationships" xmlns:p="http://schemas.openxmlformats.org/presentationml/2006/main">
+  <p:cSld>
+    <p:spTree>
+      <p:nvGrpSpPr>
+        <p:cNvPr id="1" name=""/>
+        <p:cNvGrpSpPr/>
+        <p:nvPr/>
+      </p:nvGrpSpPr>
+      <p:grpSpPr>
+        <a:xfrm>
+          <a:off x="0" y="0"/>
+          <a:ext cx="0" cy="0"/>
+          <a:chOff x="0" y="0"/>
+          <a:chExt cx="0" cy="0"/>
+        </a:xfrm>
+      </p:grpSpPr>
+    </p:spTree>
+    <p:extLst>
+      <p:ext uri="{BB962C8B-B14F-4D97-AF65-F5344CB8AC3E}">
+        <p14:creationId xmlns:p14="http://schemas.microsoft.com/office/powerpoint/2010/main" val="3624955646"/>
+      </p:ext>
+    </p:extLst>
+  </p:cSld>
+  <p:clrMapOvr>
+    <a:masterClrMapping/>
+  </p:clrMapOvr>
+</p:sld>
+</file>
+
+<file path=ppt/slides/slide2.xml><?xml version="1.0" encoding="utf-8"?>
+<p:sld xmlns:a="http://schemas.openxmlformats.org/drawingml/2006/main" xmlns:r="http://schemas.openxmlformats.org/officeDocument/2006/relationships" xmlns:p="http://schemas.openxmlformats.org/presentationml/2006/main">
+  <p:cSld>
+    <p:bg>
+      <p:bgPr>
+        <a:gradFill flip="none" rotWithShape="1">
+          <a:gsLst>
+            <a:gs pos="43000">
+              <a:schemeClr val="accent1">
+                <a:lumMod val="60000"/>
+                <a:lumOff val="40000"/>
+              </a:schemeClr>
+            </a:gs>
+            <a:gs pos="9000">
+              <a:srgbClr val="D1476E"/>
+            </a:gs>
+            <a:gs pos="74000">
+              <a:schemeClr val="accent1">
+                <a:lumMod val="45000"/>
+                <a:lumOff val="55000"/>
+              </a:schemeClr>
+            </a:gs>
+            <a:gs pos="83000">
+              <a:schemeClr val="accent1">
+                <a:lumMod val="45000"/>
+                <a:lumOff val="55000"/>
+              </a:schemeClr>
+            </a:gs>
+            <a:gs pos="100000">
+              <a:schemeClr val="accent1">
+                <a:lumMod val="30000"/>
+                <a:lumOff val="70000"/>
+              </a:schemeClr>
+            </a:gs>
+          </a:gsLst>
+          <a:lin ang="5400000" scaled="1"/>
+          <a:tileRect/>
+        </a:gradFill>
+        <a:effectLst/>
+      </p:bgPr>
+    </p:bg>
+    <p:spTree>
+      <p:nvGrpSpPr>
+        <p:cNvPr id="1" name=""/>
+        <p:cNvGrpSpPr/>
+        <p:nvPr/>
+      </p:nvGrpSpPr>
+      <p:grpSpPr>
+        <a:xfrm>
+          <a:off x="0" y="0"/>
+          <a:ext cx="0" cy="0"/>
+          <a:chOff x="0" y="0"/>
+          <a:chExt cx="0" cy="0"/>
+        </a:xfrm>
+      </p:grpSpPr>
+      <p:sp>
+        <p:nvSpPr>
+          <p:cNvPr id="4" name="Rectangle 3">
+            <a:extLst>
+              <a:ext uri="{FF2B5EF4-FFF2-40B4-BE49-F238E27FC236}">
+                <a16:creationId xmlns:a16="http://schemas.microsoft.com/office/drawing/2014/main" id="{2C14EB84-956D-4572-92AF-372E73C4E63E}"/>
+              </a:ext>
+            </a:extLst>
+          </p:cNvPr>
+          <p:cNvSpPr/>
+          <p:nvPr/>
+        </p:nvSpPr>
+        <p:spPr>
+          <a:xfrm>
+            <a:off x="0" y="-26894"/>
+            <a:ext cx="8811491" cy="41148000"/>
+          </a:xfrm>
+          <a:prstGeom prst="rect">
+            <a:avLst/>
+          </a:prstGeom>
+          <a:solidFill>
+            <a:schemeClr val="bg1"/>
+          </a:solidFill>
+          <a:ln>
+            <a:noFill/>
+          </a:ln>
+        </p:spPr>
+        <p:style>
+          <a:lnRef idx="2">
+            <a:schemeClr val="accent1">
+              <a:shade val="50000"/>
+            </a:schemeClr>
+          </a:lnRef>
+          <a:fillRef idx="1">
+            <a:schemeClr val="accent1"/>
+          </a:fillRef>
+          <a:effectRef idx="0">
+            <a:schemeClr val="accent1"/>
+          </a:effectRef>
+          <a:fontRef idx="minor">
+            <a:schemeClr val="lt1"/>
+          </a:fontRef>
+        </p:style>
+        <p:txBody>
+          <a:bodyPr rtlCol="0" anchor="ctr"/>
+          <a:lstStyle/>
+          <a:p>
+            <a:pPr algn="ctr"/>
+            <a:endParaRPr lang="en-US" sz="8000" dirty="0">
+              <a:solidFill>
+                <a:schemeClr val="tx1"/>
+              </a:solidFill>
+            </a:endParaRPr>
+          </a:p>
+        </p:txBody>
+      </p:sp>
+      <p:sp>
+        <p:nvSpPr>
+          <p:cNvPr id="5" name="Rectangle 4">
+            <a:extLst>
+              <a:ext uri="{FF2B5EF4-FFF2-40B4-BE49-F238E27FC236}">
+                <a16:creationId xmlns:a16="http://schemas.microsoft.com/office/drawing/2014/main" id="{A861476F-BDB9-4314-A2A9-778A07331E78}"/>
+              </a:ext>
+            </a:extLst>
+          </p:cNvPr>
+          <p:cNvSpPr/>
+          <p:nvPr/>
+        </p:nvSpPr>
+        <p:spPr>
+          <a:xfrm>
+            <a:off x="34747200" y="0"/>
+            <a:ext cx="6400799" cy="41148000"/>
+          </a:xfrm>
+          <a:prstGeom prst="rect">
+            <a:avLst/>
+          </a:prstGeom>
+          <a:solidFill>
+            <a:schemeClr val="bg1"/>
+          </a:solidFill>
+          <a:ln>
+            <a:noFill/>
+          </a:ln>
+        </p:spPr>
+        <p:style>
+          <a:lnRef idx="2">
+            <a:schemeClr val="accent1">
+              <a:shade val="50000"/>
+            </a:schemeClr>
+          </a:lnRef>
+          <a:fillRef idx="1">
+            <a:schemeClr val="accent1"/>
+          </a:fillRef>
+          <a:effectRef idx="0">
+            <a:schemeClr val="accent1"/>
+          </a:effectRef>
+          <a:fontRef idx="minor">
+            <a:schemeClr val="lt1"/>
+          </a:fontRef>
+        </p:style>
+        <p:txBody>
+          <a:bodyPr rtlCol="0" anchor="ctr"/>
+          <a:lstStyle/>
+          <a:p>
+            <a:pPr algn="ctr"/>
+            <a:endParaRPr lang="en-US"/>
+          </a:p>
+        </p:txBody>
+      </p:sp>
+      <p:sp>
+        <p:nvSpPr>
+          <p:cNvPr id="6" name="TextBox 5">
+            <a:extLst>
+              <a:ext uri="{FF2B5EF4-FFF2-40B4-BE49-F238E27FC236}">
+                <a16:creationId xmlns:a16="http://schemas.microsoft.com/office/drawing/2014/main" id="{6979A0C6-DEDF-454A-A5A5-D88F9B887AAA}"/>
+              </a:ext>
+            </a:extLst>
+          </p:cNvPr>
+          <p:cNvSpPr txBox="1"/>
+          <p:nvPr/>
+        </p:nvSpPr>
+        <p:spPr>
+          <a:xfrm>
+            <a:off x="1" y="26894"/>
+            <a:ext cx="8337176" cy="3785652"/>
+          </a:xfrm>
+          <a:prstGeom prst="rect">
+            <a:avLst/>
+          </a:prstGeom>
+          <a:noFill/>
+        </p:spPr>
+        <p:txBody>
+          <a:bodyPr wrap="square" rtlCol="0">
+            <a:spAutoFit/>
+          </a:bodyPr>
+          <a:lstStyle/>
+          <a:p>
+            <a:r>
+              <a:rPr lang="en-US" sz="6000" b="1" dirty="0">
+                <a:latin typeface="Arial" panose="020B0604020202020204" pitchFamily="34" charset="0"/>
+                <a:cs typeface="Arial" panose="020B0604020202020204" pitchFamily="34" charset="0"/>
+              </a:rPr>
+              <a:t>Marine heat waves in the Chile-Peru Eastern Boundary Upwelling System:</a:t>
+            </a:r>
+            <a:endParaRPr lang="en-US" sz="6000" b="1" dirty="0"/>
+          </a:p>
+        </p:txBody>
+      </p:sp>
+      <p:sp>
+        <p:nvSpPr>
+          <p:cNvPr id="7" name="TextBox 6">
+            <a:extLst>
+              <a:ext uri="{FF2B5EF4-FFF2-40B4-BE49-F238E27FC236}">
+                <a16:creationId xmlns:a16="http://schemas.microsoft.com/office/drawing/2014/main" id="{FE9A93E2-7EAE-4BAE-A318-21CE7C755763}"/>
+              </a:ext>
+            </a:extLst>
+          </p:cNvPr>
+          <p:cNvSpPr txBox="1"/>
+          <p:nvPr/>
+        </p:nvSpPr>
+        <p:spPr>
+          <a:xfrm>
+            <a:off x="0" y="3812546"/>
+            <a:ext cx="8337176" cy="3046988"/>
+          </a:xfrm>
+          <a:prstGeom prst="rect">
+            <a:avLst/>
+          </a:prstGeom>
+          <a:noFill/>
+        </p:spPr>
+        <p:txBody>
+          <a:bodyPr wrap="square" rtlCol="0">
+            <a:spAutoFit/>
+          </a:bodyPr>
+          <a:lstStyle/>
+          <a:p>
+            <a:r>
+              <a:rPr lang="en-US" sz="4800" dirty="0">
+                <a:latin typeface="Arial" panose="020B0604020202020204" pitchFamily="34" charset="0"/>
+                <a:cs typeface="Arial" panose="020B0604020202020204" pitchFamily="34" charset="0"/>
+              </a:rPr>
+              <a:t>rates of change in sea-surface temperature anomalies near a major upwelling center</a:t>
+            </a:r>
+            <a:endParaRPr lang="en-US" sz="4800" dirty="0"/>
+          </a:p>
+        </p:txBody>
+      </p:sp>
+      <p:sp>
+        <p:nvSpPr>
+          <p:cNvPr id="8" name="TextBox 7">
+            <a:extLst>
+              <a:ext uri="{FF2B5EF4-FFF2-40B4-BE49-F238E27FC236}">
+                <a16:creationId xmlns:a16="http://schemas.microsoft.com/office/drawing/2014/main" id="{278E9174-90F1-4BBF-AF64-BD5D354321BA}"/>
+              </a:ext>
+            </a:extLst>
+          </p:cNvPr>
+          <p:cNvSpPr txBox="1"/>
+          <p:nvPr/>
+        </p:nvSpPr>
+        <p:spPr>
+          <a:xfrm>
+            <a:off x="-3" y="11571497"/>
+            <a:ext cx="8337176" cy="8956298"/>
+          </a:xfrm>
+          <a:prstGeom prst="rect">
+            <a:avLst/>
+          </a:prstGeom>
+          <a:noFill/>
+        </p:spPr>
+        <p:txBody>
+          <a:bodyPr wrap="square" rtlCol="0">
+            <a:spAutoFit/>
+          </a:bodyPr>
+          <a:lstStyle/>
+          <a:p>
+            <a:r>
+              <a:rPr lang="en-US" sz="4800" b="1" dirty="0">
+                <a:latin typeface="Arial" panose="020B0604020202020204" pitchFamily="34" charset="0"/>
+                <a:cs typeface="Arial" panose="020B0604020202020204" pitchFamily="34" charset="0"/>
+              </a:rPr>
+              <a:t>Background: </a:t>
+            </a:r>
+          </a:p>
+          <a:p>
+            <a:pPr marL="685800" indent="-685800">
+              <a:buFont typeface="Arial" panose="020B0604020202020204" pitchFamily="34" charset="0"/>
+              <a:buChar char="•"/>
+            </a:pPr>
+            <a:r>
+              <a:rPr lang="en-US" sz="4800" dirty="0">
+                <a:latin typeface="Arial" panose="020B0604020202020204" pitchFamily="34" charset="0"/>
+                <a:cs typeface="Arial" panose="020B0604020202020204" pitchFamily="34" charset="0"/>
+              </a:rPr>
+              <a:t>Marine heat waves like those in the California Current System (CCS) have also been observed in the Chile-Peru System (CPS)</a:t>
+            </a:r>
+          </a:p>
+          <a:p>
+            <a:pPr marL="685800" indent="-685800">
+              <a:buFont typeface="Arial" panose="020B0604020202020204" pitchFamily="34" charset="0"/>
+              <a:buChar char="•"/>
+            </a:pPr>
+            <a:r>
+              <a:rPr lang="en-US" sz="4800" dirty="0">
+                <a:latin typeface="Arial" panose="020B0604020202020204" pitchFamily="34" charset="0"/>
+                <a:cs typeface="Arial" panose="020B0604020202020204" pitchFamily="34" charset="0"/>
+              </a:rPr>
+              <a:t>Dominant </a:t>
+            </a:r>
+            <a:r>
+              <a:rPr lang="en-US" sz="4800" dirty="0" err="1">
+                <a:latin typeface="Arial" panose="020B0604020202020204" pitchFamily="34" charset="0"/>
+                <a:cs typeface="Arial" panose="020B0604020202020204" pitchFamily="34" charset="0"/>
+              </a:rPr>
+              <a:t>forcings</a:t>
+            </a:r>
+            <a:r>
+              <a:rPr lang="en-US" sz="4800" dirty="0">
+                <a:latin typeface="Arial" panose="020B0604020202020204" pitchFamily="34" charset="0"/>
+                <a:cs typeface="Arial" panose="020B0604020202020204" pitchFamily="34" charset="0"/>
+              </a:rPr>
+              <a:t> of wind relaxations in the CCS have been found through analysis of the surface ocean heat budget</a:t>
+            </a:r>
+            <a:endParaRPr lang="en-US" sz="4800" b="1" dirty="0">
+              <a:latin typeface="Arial" panose="020B0604020202020204" pitchFamily="34" charset="0"/>
+              <a:cs typeface="Arial" panose="020B0604020202020204" pitchFamily="34" charset="0"/>
+            </a:endParaRPr>
+          </a:p>
+        </p:txBody>
+      </p:sp>
+      <p:sp>
+        <p:nvSpPr>
+          <p:cNvPr id="9" name="TextBox 8">
+            <a:extLst>
+              <a:ext uri="{FF2B5EF4-FFF2-40B4-BE49-F238E27FC236}">
+                <a16:creationId xmlns:a16="http://schemas.microsoft.com/office/drawing/2014/main" id="{5A044E9D-2B43-498C-9D8E-3EDBBF145716}"/>
+              </a:ext>
+            </a:extLst>
+          </p:cNvPr>
+          <p:cNvSpPr txBox="1"/>
+          <p:nvPr/>
+        </p:nvSpPr>
+        <p:spPr>
+          <a:xfrm>
+            <a:off x="67350" y="20916923"/>
+            <a:ext cx="8337175" cy="11172289"/>
+          </a:xfrm>
+          <a:prstGeom prst="rect">
+            <a:avLst/>
+          </a:prstGeom>
+          <a:noFill/>
+        </p:spPr>
+        <p:txBody>
+          <a:bodyPr wrap="square" rtlCol="0">
+            <a:spAutoFit/>
+          </a:bodyPr>
+          <a:lstStyle/>
+          <a:p>
+            <a:r>
+              <a:rPr lang="en-US" sz="4800" b="1" dirty="0">
+                <a:latin typeface="Arial" panose="020B0604020202020204" pitchFamily="34" charset="0"/>
+                <a:cs typeface="Arial" panose="020B0604020202020204" pitchFamily="34" charset="0"/>
+              </a:rPr>
+              <a:t>Methods:</a:t>
+            </a:r>
+          </a:p>
+          <a:p>
+            <a:pPr marL="685800" indent="-685800">
+              <a:buFont typeface="Arial" panose="020B0604020202020204" pitchFamily="34" charset="0"/>
+              <a:buChar char="•"/>
+            </a:pPr>
+            <a:r>
+              <a:rPr lang="en-US" sz="4800" dirty="0">
+                <a:latin typeface="Arial" panose="020B0604020202020204" pitchFamily="34" charset="0"/>
+                <a:cs typeface="Arial" panose="020B0604020202020204" pitchFamily="34" charset="0"/>
+              </a:rPr>
+              <a:t>Obtain European Centre for Medium-Range Weather Forecasts reanalysis (ERA5) hourly SST</a:t>
+            </a:r>
+          </a:p>
+          <a:p>
+            <a:pPr marL="685800" indent="-685800">
+              <a:buFont typeface="Arial" panose="020B0604020202020204" pitchFamily="34" charset="0"/>
+              <a:buChar char="•"/>
+            </a:pPr>
+            <a:r>
+              <a:rPr lang="en-US" sz="4800" dirty="0">
+                <a:latin typeface="Arial" panose="020B0604020202020204" pitchFamily="34" charset="0"/>
+                <a:cs typeface="Arial" panose="020B0604020202020204" pitchFamily="34" charset="0"/>
+              </a:rPr>
+              <a:t>Define periods of intense warming as departures from climatology</a:t>
+            </a:r>
+          </a:p>
+          <a:p>
+            <a:pPr marL="685800" indent="-685800">
+              <a:buFont typeface="Arial" panose="020B0604020202020204" pitchFamily="34" charset="0"/>
+              <a:buChar char="•"/>
+            </a:pPr>
+            <a:r>
+              <a:rPr lang="en-US" sz="4800" dirty="0">
+                <a:latin typeface="Arial" panose="020B0604020202020204" pitchFamily="34" charset="0"/>
+                <a:cs typeface="Arial" panose="020B0604020202020204" pitchFamily="34" charset="0"/>
+              </a:rPr>
+              <a:t>Sort these times based on annual and seasonal occurrence</a:t>
+            </a:r>
+          </a:p>
+          <a:p>
+            <a:pPr marL="685800" indent="-685800">
+              <a:buFont typeface="Arial" panose="020B0604020202020204" pitchFamily="34" charset="0"/>
+              <a:buChar char="•"/>
+            </a:pPr>
+            <a:r>
+              <a:rPr lang="en-US" sz="4800" dirty="0">
+                <a:latin typeface="Arial" panose="020B0604020202020204" pitchFamily="34" charset="0"/>
+                <a:cs typeface="Arial" panose="020B0604020202020204" pitchFamily="34" charset="0"/>
+              </a:rPr>
+              <a:t>Take time derivative of SST’ for rates of anomalous warming</a:t>
+            </a:r>
+          </a:p>
+        </p:txBody>
+      </p:sp>
+      <p:sp>
+        <p:nvSpPr>
+          <p:cNvPr id="10" name="TextBox 9">
+            <a:extLst>
+              <a:ext uri="{FF2B5EF4-FFF2-40B4-BE49-F238E27FC236}">
+                <a16:creationId xmlns:a16="http://schemas.microsoft.com/office/drawing/2014/main" id="{91547583-4A2D-471C-AB8A-C1FA591FF5DB}"/>
+              </a:ext>
+            </a:extLst>
+          </p:cNvPr>
+          <p:cNvSpPr txBox="1"/>
+          <p:nvPr/>
+        </p:nvSpPr>
+        <p:spPr>
+          <a:xfrm>
+            <a:off x="67350" y="33147495"/>
+            <a:ext cx="8337175" cy="830997"/>
+          </a:xfrm>
+          <a:prstGeom prst="rect">
+            <a:avLst/>
+          </a:prstGeom>
+          <a:noFill/>
+        </p:spPr>
+        <p:txBody>
+          <a:bodyPr wrap="square" rtlCol="0">
+            <a:spAutoFit/>
+          </a:bodyPr>
+          <a:lstStyle/>
+          <a:p>
+            <a:r>
+              <a:rPr lang="en-US" sz="4800" b="1" dirty="0">
+                <a:latin typeface="Arial" panose="020B0604020202020204" pitchFamily="34" charset="0"/>
+                <a:cs typeface="Arial" panose="020B0604020202020204" pitchFamily="34" charset="0"/>
+              </a:rPr>
+              <a:t>Results: </a:t>
+            </a:r>
+          </a:p>
+        </p:txBody>
+      </p:sp>
+      <p:sp>
+        <p:nvSpPr>
+          <p:cNvPr id="11" name="TextBox 10">
+            <a:extLst>
+              <a:ext uri="{FF2B5EF4-FFF2-40B4-BE49-F238E27FC236}">
+                <a16:creationId xmlns:a16="http://schemas.microsoft.com/office/drawing/2014/main" id="{0D3666AE-626E-476F-B223-ADFCB810E323}"/>
+              </a:ext>
+            </a:extLst>
+          </p:cNvPr>
+          <p:cNvSpPr txBox="1"/>
+          <p:nvPr/>
+        </p:nvSpPr>
+        <p:spPr>
+          <a:xfrm>
+            <a:off x="-1" y="35335260"/>
+            <a:ext cx="8337174" cy="3785652"/>
+          </a:xfrm>
+          <a:prstGeom prst="rect">
+            <a:avLst/>
+          </a:prstGeom>
+          <a:noFill/>
+        </p:spPr>
+        <p:txBody>
+          <a:bodyPr wrap="square" rtlCol="0">
+            <a:spAutoFit/>
+          </a:bodyPr>
+          <a:lstStyle/>
+          <a:p>
+            <a:r>
+              <a:rPr lang="en-US" sz="4800" b="1" dirty="0">
+                <a:latin typeface="Arial" panose="020B0604020202020204" pitchFamily="34" charset="0"/>
+                <a:cs typeface="Arial" panose="020B0604020202020204" pitchFamily="34" charset="0"/>
+              </a:rPr>
+              <a:t>Future Work:</a:t>
+            </a:r>
+          </a:p>
+          <a:p>
+            <a:pPr marL="685800" indent="-685800">
+              <a:buFont typeface="Arial" panose="020B0604020202020204" pitchFamily="34" charset="0"/>
+              <a:buChar char="•"/>
+            </a:pPr>
+            <a:r>
+              <a:rPr lang="en-US" sz="4800" dirty="0">
+                <a:latin typeface="Arial" panose="020B0604020202020204" pitchFamily="34" charset="0"/>
+                <a:cs typeface="Arial" panose="020B0604020202020204" pitchFamily="34" charset="0"/>
+              </a:rPr>
+              <a:t>examine terms in the sea surface heat budget for which are dominant during different times</a:t>
+            </a:r>
+            <a:endParaRPr lang="en-US" sz="4800" b="1" dirty="0">
+              <a:latin typeface="Arial" panose="020B0604020202020204" pitchFamily="34" charset="0"/>
+              <a:cs typeface="Arial" panose="020B0604020202020204" pitchFamily="34" charset="0"/>
+            </a:endParaRPr>
+          </a:p>
+        </p:txBody>
+      </p:sp>
+      <p:sp>
+        <p:nvSpPr>
+          <p:cNvPr id="12" name="TextBox 11">
+            <a:extLst>
+              <a:ext uri="{FF2B5EF4-FFF2-40B4-BE49-F238E27FC236}">
+                <a16:creationId xmlns:a16="http://schemas.microsoft.com/office/drawing/2014/main" id="{CABAE4C0-B8FD-4A41-9DB9-87BA0AACA740}"/>
+              </a:ext>
+            </a:extLst>
+          </p:cNvPr>
+          <p:cNvSpPr txBox="1"/>
+          <p:nvPr/>
+        </p:nvSpPr>
+        <p:spPr>
+          <a:xfrm>
+            <a:off x="12681375" y="16957351"/>
+            <a:ext cx="3892412" cy="1323439"/>
+          </a:xfrm>
+          <a:prstGeom prst="rect">
+            <a:avLst/>
+          </a:prstGeom>
+          <a:noFill/>
+        </p:spPr>
+        <p:txBody>
+          <a:bodyPr wrap="none" rtlCol="0">
+            <a:spAutoFit/>
+          </a:bodyPr>
+          <a:lstStyle/>
+          <a:p>
+            <a:r>
+              <a:rPr lang="en-US" sz="8000" dirty="0">
+                <a:latin typeface="Arial" panose="020B0604020202020204" pitchFamily="34" charset="0"/>
+                <a:cs typeface="Arial" panose="020B0604020202020204" pitchFamily="34" charset="0"/>
+              </a:rPr>
+              <a:t>Finding:</a:t>
+            </a:r>
+          </a:p>
+        </p:txBody>
+      </p:sp>
+      <p:sp>
+        <p:nvSpPr>
+          <p:cNvPr id="13" name="TextBox 12">
+            <a:extLst>
+              <a:ext uri="{FF2B5EF4-FFF2-40B4-BE49-F238E27FC236}">
+                <a16:creationId xmlns:a16="http://schemas.microsoft.com/office/drawing/2014/main" id="{1BB35C44-27E0-4A5F-8385-C670BFADD399}"/>
+              </a:ext>
+            </a:extLst>
+          </p:cNvPr>
+          <p:cNvSpPr txBox="1"/>
+          <p:nvPr/>
+        </p:nvSpPr>
+        <p:spPr>
+          <a:xfrm>
+            <a:off x="35009781" y="322729"/>
+            <a:ext cx="6138219" cy="830997"/>
+          </a:xfrm>
+          <a:prstGeom prst="rect">
+            <a:avLst/>
+          </a:prstGeom>
+          <a:noFill/>
+        </p:spPr>
+        <p:txBody>
+          <a:bodyPr wrap="none" rtlCol="0">
+            <a:spAutoFit/>
+          </a:bodyPr>
+          <a:lstStyle/>
+          <a:p>
+            <a:r>
+              <a:rPr lang="en-US" sz="4800" dirty="0">
+                <a:latin typeface="Arial" panose="020B0604020202020204" pitchFamily="34" charset="0"/>
+                <a:cs typeface="Arial" panose="020B0604020202020204" pitchFamily="34" charset="0"/>
+              </a:rPr>
+              <a:t>~~~~Ammo Bar ~~~~</a:t>
+            </a:r>
+          </a:p>
+        </p:txBody>
+      </p:sp>
+      <p:sp>
+        <p:nvSpPr>
+          <p:cNvPr id="14" name="TextBox 13">
+            <a:extLst>
+              <a:ext uri="{FF2B5EF4-FFF2-40B4-BE49-F238E27FC236}">
+                <a16:creationId xmlns:a16="http://schemas.microsoft.com/office/drawing/2014/main" id="{24EA3EC2-0BFF-4D6F-BE51-A0F70EC122B4}"/>
+              </a:ext>
+            </a:extLst>
+          </p:cNvPr>
+          <p:cNvSpPr txBox="1"/>
+          <p:nvPr/>
+        </p:nvSpPr>
+        <p:spPr>
+          <a:xfrm>
+            <a:off x="34702934" y="30196386"/>
+            <a:ext cx="6400801" cy="3785652"/>
+          </a:xfrm>
+          <a:prstGeom prst="rect">
+            <a:avLst/>
+          </a:prstGeom>
+          <a:noFill/>
+        </p:spPr>
+        <p:txBody>
+          <a:bodyPr wrap="square" rtlCol="0">
+            <a:spAutoFit/>
+          </a:bodyPr>
+          <a:lstStyle/>
+          <a:p>
+            <a:r>
+              <a:rPr lang="en-US" sz="4000" dirty="0">
+                <a:latin typeface="Arial" panose="020B0604020202020204" pitchFamily="34" charset="0"/>
+                <a:cs typeface="Arial" panose="020B0604020202020204" pitchFamily="34" charset="0"/>
+              </a:rPr>
+              <a:t>Authors:</a:t>
+            </a:r>
+          </a:p>
+          <a:p>
+            <a:r>
+              <a:rPr lang="en-US" sz="4000" dirty="0">
+                <a:latin typeface="Arial" panose="020B0604020202020204" pitchFamily="34" charset="0"/>
+                <a:cs typeface="Arial" panose="020B0604020202020204" pitchFamily="34" charset="0"/>
+              </a:rPr>
+              <a:t>Kylene Cooley, Melanie R. </a:t>
+            </a:r>
+            <a:r>
+              <a:rPr lang="en-US" sz="4000" dirty="0" err="1">
+                <a:latin typeface="Arial" panose="020B0604020202020204" pitchFamily="34" charset="0"/>
+                <a:cs typeface="Arial" panose="020B0604020202020204" pitchFamily="34" charset="0"/>
+              </a:rPr>
+              <a:t>Fewings</a:t>
+            </a:r>
+            <a:r>
+              <a:rPr lang="en-US" sz="4000" dirty="0">
+                <a:latin typeface="Arial" panose="020B0604020202020204" pitchFamily="34" charset="0"/>
+                <a:cs typeface="Arial" panose="020B0604020202020204" pitchFamily="34" charset="0"/>
+              </a:rPr>
+              <a:t>, Jim </a:t>
+            </a:r>
+            <a:r>
+              <a:rPr lang="en-US" sz="4000" dirty="0" err="1">
+                <a:latin typeface="Arial" panose="020B0604020202020204" pitchFamily="34" charset="0"/>
+                <a:cs typeface="Arial" panose="020B0604020202020204" pitchFamily="34" charset="0"/>
+              </a:rPr>
+              <a:t>Lerczak</a:t>
+            </a:r>
+            <a:endParaRPr lang="en-US" sz="4000" dirty="0">
+              <a:latin typeface="Arial" panose="020B0604020202020204" pitchFamily="34" charset="0"/>
+              <a:cs typeface="Arial" panose="020B0604020202020204" pitchFamily="34" charset="0"/>
+            </a:endParaRPr>
+          </a:p>
+          <a:p>
+            <a:r>
+              <a:rPr lang="en-US" sz="4000" dirty="0">
+                <a:latin typeface="Arial" panose="020B0604020202020204" pitchFamily="34" charset="0"/>
+                <a:cs typeface="Arial" panose="020B0604020202020204" pitchFamily="34" charset="0"/>
+              </a:rPr>
+              <a:t>Oregon State University, CEOAS</a:t>
+            </a:r>
+          </a:p>
+          <a:p>
+            <a:r>
+              <a:rPr lang="en-US" sz="4000" dirty="0">
+                <a:latin typeface="Arial" panose="020B0604020202020204" pitchFamily="34" charset="0"/>
+                <a:cs typeface="Arial" panose="020B0604020202020204" pitchFamily="34" charset="0"/>
+                <a:hlinkClick r:id="rId2"/>
+              </a:rPr>
+              <a:t>cooleyky@oregonstate.edu</a:t>
+            </a:r>
+            <a:r>
+              <a:rPr lang="en-US" sz="4000" dirty="0">
+                <a:latin typeface="Arial" panose="020B0604020202020204" pitchFamily="34" charset="0"/>
+                <a:cs typeface="Arial" panose="020B0604020202020204" pitchFamily="34" charset="0"/>
+              </a:rPr>
+              <a:t> </a:t>
+            </a:r>
+          </a:p>
+        </p:txBody>
+      </p:sp>
+      <p:pic>
+        <p:nvPicPr>
+          <p:cNvPr id="16" name="Picture 15">
+            <a:extLst>
+              <a:ext uri="{FF2B5EF4-FFF2-40B4-BE49-F238E27FC236}">
+                <a16:creationId xmlns:a16="http://schemas.microsoft.com/office/drawing/2014/main" id="{2345CC81-BC56-4F02-B5EE-93DC67C49A90}"/>
+              </a:ext>
+            </a:extLst>
+          </p:cNvPr>
+          <p:cNvPicPr>
+            <a:picLocks noChangeAspect="1"/>
+          </p:cNvPicPr>
+          <p:nvPr/>
+        </p:nvPicPr>
+        <p:blipFill>
+          <a:blip r:embed="rId3">
+            <a:extLst>
+              <a:ext uri="{28A0092B-C50C-407E-A947-70E740481C1C}">
+                <a14:useLocalDpi xmlns:a14="http://schemas.microsoft.com/office/drawing/2010/main" val="0"/>
+              </a:ext>
+            </a:extLst>
+          </a:blip>
+          <a:stretch>
+            <a:fillRect/>
+          </a:stretch>
+        </p:blipFill>
+        <p:spPr>
+          <a:xfrm>
+            <a:off x="383748" y="7417193"/>
+            <a:ext cx="3765176" cy="3765176"/>
+          </a:xfrm>
+          <a:prstGeom prst="rect">
+            <a:avLst/>
+          </a:prstGeom>
+        </p:spPr>
+      </p:pic>
+      <p:sp>
+        <p:nvSpPr>
+          <p:cNvPr id="17" name="TextBox 16">
+            <a:extLst>
+              <a:ext uri="{FF2B5EF4-FFF2-40B4-BE49-F238E27FC236}">
+                <a16:creationId xmlns:a16="http://schemas.microsoft.com/office/drawing/2014/main" id="{F8E5CE40-A3AF-449A-AB8B-DF59BF6979DB}"/>
+              </a:ext>
+            </a:extLst>
+          </p:cNvPr>
+          <p:cNvSpPr txBox="1"/>
+          <p:nvPr/>
+        </p:nvSpPr>
+        <p:spPr>
+          <a:xfrm>
+            <a:off x="4401754" y="7373371"/>
+            <a:ext cx="4156907" cy="1569660"/>
+          </a:xfrm>
+          <a:prstGeom prst="rect">
+            <a:avLst/>
+          </a:prstGeom>
+          <a:noFill/>
+        </p:spPr>
+        <p:txBody>
+          <a:bodyPr wrap="none" rtlCol="0">
+            <a:spAutoFit/>
+          </a:bodyPr>
+          <a:lstStyle/>
+          <a:p>
+            <a:r>
+              <a:rPr lang="en-US" sz="4800" dirty="0">
+                <a:latin typeface="Arial" panose="020B0604020202020204" pitchFamily="34" charset="0"/>
+                <a:cs typeface="Arial" panose="020B0604020202020204" pitchFamily="34" charset="0"/>
+              </a:rPr>
+              <a:t>Presenter:</a:t>
+            </a:r>
+          </a:p>
+          <a:p>
+            <a:r>
+              <a:rPr lang="en-US" sz="4800" dirty="0">
+                <a:latin typeface="Arial" panose="020B0604020202020204" pitchFamily="34" charset="0"/>
+                <a:cs typeface="Arial" panose="020B0604020202020204" pitchFamily="34" charset="0"/>
+              </a:rPr>
+              <a:t>Kylene Cooley</a:t>
+            </a:r>
+          </a:p>
+        </p:txBody>
+      </p:sp>
+      <p:pic>
+        <p:nvPicPr>
+          <p:cNvPr id="18" name="Picture 17">
+            <a:extLst>
+              <a:ext uri="{FF2B5EF4-FFF2-40B4-BE49-F238E27FC236}">
+                <a16:creationId xmlns:a16="http://schemas.microsoft.com/office/drawing/2014/main" id="{2ABD314A-99BF-45D2-AB95-1BED70742BFB}"/>
+              </a:ext>
+            </a:extLst>
+          </p:cNvPr>
+          <p:cNvPicPr>
+            <a:picLocks noChangeAspect="1"/>
+          </p:cNvPicPr>
+          <p:nvPr/>
+        </p:nvPicPr>
+        <p:blipFill>
+          <a:blip r:embed="rId4"/>
+          <a:stretch>
+            <a:fillRect/>
+          </a:stretch>
+        </p:blipFill>
+        <p:spPr>
+          <a:xfrm>
+            <a:off x="12681375" y="26503067"/>
+            <a:ext cx="18977750" cy="9629184"/>
+          </a:xfrm>
+          <a:prstGeom prst="rect">
+            <a:avLst/>
+          </a:prstGeom>
+        </p:spPr>
+      </p:pic>
+      <p:pic>
+        <p:nvPicPr>
+          <p:cNvPr id="19" name="Picture 18">
+            <a:extLst>
+              <a:ext uri="{FF2B5EF4-FFF2-40B4-BE49-F238E27FC236}">
+                <a16:creationId xmlns:a16="http://schemas.microsoft.com/office/drawing/2014/main" id="{7B50CA91-35CF-43D2-84B0-BF84705B646D}"/>
+              </a:ext>
+            </a:extLst>
+          </p:cNvPr>
+          <p:cNvPicPr>
+            <a:picLocks noChangeAspect="1"/>
+          </p:cNvPicPr>
+          <p:nvPr/>
+        </p:nvPicPr>
+        <p:blipFill>
+          <a:blip r:embed="rId5"/>
+          <a:stretch>
+            <a:fillRect/>
+          </a:stretch>
+        </p:blipFill>
+        <p:spPr>
+          <a:xfrm>
+            <a:off x="35287603" y="7417193"/>
+            <a:ext cx="5231464" cy="2596107"/>
+          </a:xfrm>
+          <a:prstGeom prst="rect">
+            <a:avLst/>
+          </a:prstGeom>
+        </p:spPr>
+      </p:pic>
+      <p:pic>
+        <p:nvPicPr>
+          <p:cNvPr id="20" name="Picture 19">
+            <a:extLst>
+              <a:ext uri="{FF2B5EF4-FFF2-40B4-BE49-F238E27FC236}">
+                <a16:creationId xmlns:a16="http://schemas.microsoft.com/office/drawing/2014/main" id="{8986AAAE-4791-47A5-98FC-78AA22187910}"/>
+              </a:ext>
+            </a:extLst>
+          </p:cNvPr>
+          <p:cNvPicPr>
+            <a:picLocks noChangeAspect="1"/>
+          </p:cNvPicPr>
+          <p:nvPr/>
+        </p:nvPicPr>
+        <p:blipFill>
+          <a:blip r:embed="rId6"/>
+          <a:stretch>
+            <a:fillRect/>
+          </a:stretch>
+        </p:blipFill>
+        <p:spPr>
+          <a:xfrm>
+            <a:off x="35126832" y="10957176"/>
+            <a:ext cx="5553006" cy="2677188"/>
+          </a:xfrm>
+          <a:prstGeom prst="rect">
+            <a:avLst/>
+          </a:prstGeom>
+        </p:spPr>
+      </p:pic>
+      <p:pic>
+        <p:nvPicPr>
+          <p:cNvPr id="21" name="Picture 20">
+            <a:extLst>
+              <a:ext uri="{FF2B5EF4-FFF2-40B4-BE49-F238E27FC236}">
+                <a16:creationId xmlns:a16="http://schemas.microsoft.com/office/drawing/2014/main" id="{E7A7971E-48EA-447D-840B-4F1D96ED6993}"/>
+              </a:ext>
+            </a:extLst>
+          </p:cNvPr>
+          <p:cNvPicPr>
+            <a:picLocks noChangeAspect="1"/>
+          </p:cNvPicPr>
+          <p:nvPr/>
+        </p:nvPicPr>
+        <p:blipFill>
+          <a:blip r:embed="rId7"/>
+          <a:stretch>
+            <a:fillRect/>
+          </a:stretch>
+        </p:blipFill>
+        <p:spPr>
+          <a:xfrm>
+            <a:off x="35287603" y="2514492"/>
+            <a:ext cx="5618773" cy="2596107"/>
+          </a:xfrm>
+          <a:prstGeom prst="rect">
+            <a:avLst/>
+          </a:prstGeom>
+        </p:spPr>
+      </p:pic>
+      <p:sp>
+        <p:nvSpPr>
+          <p:cNvPr id="22" name="TextBox 21">
+            <a:extLst>
+              <a:ext uri="{FF2B5EF4-FFF2-40B4-BE49-F238E27FC236}">
+                <a16:creationId xmlns:a16="http://schemas.microsoft.com/office/drawing/2014/main" id="{246E4DF9-A044-4234-907E-E0F8CC00B721}"/>
+              </a:ext>
+            </a:extLst>
+          </p:cNvPr>
+          <p:cNvSpPr txBox="1"/>
+          <p:nvPr/>
+        </p:nvSpPr>
+        <p:spPr>
+          <a:xfrm>
+            <a:off x="34747199" y="36435668"/>
+            <a:ext cx="5771868" cy="1938992"/>
+          </a:xfrm>
+          <a:prstGeom prst="rect">
+            <a:avLst/>
+          </a:prstGeom>
+          <a:noFill/>
+        </p:spPr>
+        <p:txBody>
+          <a:bodyPr wrap="square" rtlCol="0">
+            <a:spAutoFit/>
+          </a:bodyPr>
+          <a:lstStyle/>
+          <a:p>
+            <a:r>
+              <a:rPr lang="en-US" sz="4000" dirty="0">
+                <a:latin typeface="Arial" panose="020B0604020202020204" pitchFamily="34" charset="0"/>
+                <a:cs typeface="Arial" panose="020B0604020202020204" pitchFamily="34" charset="0"/>
+              </a:rPr>
+              <a:t>References and Acknowledgements: Flynn et al. (2017) </a:t>
+            </a:r>
+          </a:p>
+        </p:txBody>
+      </p:sp>
+    </p:spTree>
+    <p:extLst>
+      <p:ext uri="{BB962C8B-B14F-4D97-AF65-F5344CB8AC3E}">
+        <p14:creationId xmlns:p14="http://schemas.microsoft.com/office/powerpoint/2010/main" val="2556772550"/>
+      </p:ext>
+    </p:extLst>
+  </p:cSld>
+  <p:clrMapOvr>
+    <a:masterClrMapping/>
+  </p:clrMapOvr>
+</p:sld>
+</file>
+
+<file path=ppt/slides/slide3.xml><?xml version="1.0" encoding="utf-8"?>
+<p:sld xmlns:a="http://schemas.openxmlformats.org/drawingml/2006/main" xmlns:r="http://schemas.openxmlformats.org/officeDocument/2006/relationships" xmlns:p="http://schemas.openxmlformats.org/presentationml/2006/main">
+  <p:cSld>
+    <p:spTree>
+      <p:nvGrpSpPr>
+        <p:cNvPr id="1" name=""/>
+        <p:cNvGrpSpPr/>
+        <p:nvPr/>
+      </p:nvGrpSpPr>
+      <p:grpSpPr>
+        <a:xfrm>
+          <a:off x="0" y="0"/>
+          <a:ext cx="0" cy="0"/>
+          <a:chOff x="0" y="0"/>
+          <a:chExt cx="0" cy="0"/>
+        </a:xfrm>
+      </p:grpSpPr>
+    </p:spTree>
+    <p:extLst>
+      <p:ext uri="{BB962C8B-B14F-4D97-AF65-F5344CB8AC3E}">
+        <p14:creationId xmlns:p14="http://schemas.microsoft.com/office/powerpoint/2010/main" val="3313339349"/>
+      </p:ext>
+    </p:extLst>
+  </p:cSld>
+  <p:clrMapOvr>
+    <a:masterClrMapping/>
+  </p:clrMapOvr>
+</p:sld>
+</file>
+
+<file path=ppt/slides/slide4.xml><?xml version="1.0" encoding="utf-8"?>
+<p:sld xmlns:a="http://schemas.openxmlformats.org/drawingml/2006/main" xmlns:r="http://schemas.openxmlformats.org/officeDocument/2006/relationships" xmlns:p="http://schemas.openxmlformats.org/presentationml/2006/main">
+  <p:cSld>
+    <p:spTree>
+      <p:nvGrpSpPr>
+        <p:cNvPr id="1" name=""/>
+        <p:cNvGrpSpPr/>
+        <p:nvPr/>
+      </p:nvGrpSpPr>
+      <p:grpSpPr>
+        <a:xfrm>
+          <a:off x="0" y="0"/>
+          <a:ext cx="0" cy="0"/>
+          <a:chOff x="0" y="0"/>
+          <a:chExt cx="0" cy="0"/>
+        </a:xfrm>
+      </p:grpSpPr>
+    </p:spTree>
+    <p:extLst>
+      <p:ext uri="{BB962C8B-B14F-4D97-AF65-F5344CB8AC3E}">
+        <p14:creationId xmlns:p14="http://schemas.microsoft.com/office/powerpoint/2010/main" val="1080778897"/>
+      </p:ext>
+    </p:extLst>
+  </p:cSld>
+  <p:clrMapOvr>
+    <a:masterClrMapping/>
+  </p:clrMapOvr>
+</p:sld>
+</file>
+
+<file path=ppt/slides/slide5.xml><?xml version="1.0" encoding="utf-8"?>
+<p:sld xmlns:a="http://schemas.openxmlformats.org/drawingml/2006/main" xmlns:r="http://schemas.openxmlformats.org/officeDocument/2006/relationships" xmlns:p="http://schemas.openxmlformats.org/presentationml/2006/main">
+  <p:cSld>
+    <p:spTree>
+      <p:nvGrpSpPr>
+        <p:cNvPr id="1" name=""/>
+        <p:cNvGrpSpPr/>
+        <p:nvPr/>
+      </p:nvGrpSpPr>
+      <p:grpSpPr>
+        <a:xfrm>
+          <a:off x="0" y="0"/>
+          <a:ext cx="0" cy="0"/>
+          <a:chOff x="0" y="0"/>
+          <a:chExt cx="0" cy="0"/>
+        </a:xfrm>
+      </p:grpSpPr>
+    </p:spTree>
+    <p:extLst>
+      <p:ext uri="{BB962C8B-B14F-4D97-AF65-F5344CB8AC3E}">
+        <p14:creationId xmlns:p14="http://schemas.microsoft.com/office/powerpoint/2010/main" val="3864257368"/>
+      </p:ext>
+    </p:extLst>
+  </p:cSld>
+  <p:clrMapOvr>
+    <a:masterClrMapping/>
+  </p:clrMapOvr>
+</p:sld>
+</file>
+
+<file path=ppt/slides/slide6.xml><?xml version="1.0" encoding="utf-8"?>
+<p:sld xmlns:a="http://schemas.openxmlformats.org/drawingml/2006/main" xmlns:r="http://schemas.openxmlformats.org/officeDocument/2006/relationships" xmlns:p="http://schemas.openxmlformats.org/presentationml/2006/main">
+  <p:cSld>
+    <p:spTree>
+      <p:nvGrpSpPr>
+        <p:cNvPr id="1" name=""/>
+        <p:cNvGrpSpPr/>
+        <p:nvPr/>
+      </p:nvGrpSpPr>
+      <p:grpSpPr>
+        <a:xfrm>
+          <a:off x="0" y="0"/>
+          <a:ext cx="0" cy="0"/>
+          <a:chOff x="0" y="0"/>
+          <a:chExt cx="0" cy="0"/>
+        </a:xfrm>
+      </p:grpSpPr>
+    </p:spTree>
+    <p:extLst>
+      <p:ext uri="{BB962C8B-B14F-4D97-AF65-F5344CB8AC3E}">
+        <p14:creationId xmlns:p14="http://schemas.microsoft.com/office/powerpoint/2010/main" val="1675628864"/>
+      </p:ext>
+    </p:extLst>
+  </p:cSld>
+  <p:clrMapOvr>
+    <a:masterClrMapping/>
+  </p:clrMapOvr>
+</p:sld>
+</file>
+
+<file path=ppt/slides/slide7.xml><?xml version="1.0" encoding="utf-8"?>
+<p:sld xmlns:a="http://schemas.openxmlformats.org/drawingml/2006/main" xmlns:r="http://schemas.openxmlformats.org/officeDocument/2006/relationships" xmlns:p="http://schemas.openxmlformats.org/presentationml/2006/main">
+  <p:cSld>
+    <p:spTree>
+      <p:nvGrpSpPr>
+        <p:cNvPr id="1" name=""/>
+        <p:cNvGrpSpPr/>
+        <p:nvPr/>
+      </p:nvGrpSpPr>
+      <p:grpSpPr>
+        <a:xfrm>
+          <a:off x="0" y="0"/>
+          <a:ext cx="0" cy="0"/>
+          <a:chOff x="0" y="0"/>
+          <a:chExt cx="0" cy="0"/>
+        </a:xfrm>
+      </p:grpSpPr>
+    </p:spTree>
+    <p:extLst>
+      <p:ext uri="{BB962C8B-B14F-4D97-AF65-F5344CB8AC3E}">
+        <p14:creationId xmlns:p14="http://schemas.microsoft.com/office/powerpoint/2010/main" val="1564551260"/>
+      </p:ext>
+    </p:extLst>
+  </p:cSld>
+  <p:clrMapOvr>
+    <a:masterClrMapping/>
+  </p:clrMapOvr>
+</p:sld>
+</file>
+
+<file path=ppt/slides/slide8.xml><?xml version="1.0" encoding="utf-8"?>
+<p:sld xmlns:a="http://schemas.openxmlformats.org/drawingml/2006/main" xmlns:r="http://schemas.openxmlformats.org/officeDocument/2006/relationships" xmlns:p="http://schemas.openxmlformats.org/presentationml/2006/main">
+  <p:cSld>
+    <p:spTree>
+      <p:nvGrpSpPr>
+        <p:cNvPr id="1" name=""/>
+        <p:cNvGrpSpPr/>
+        <p:nvPr/>
+      </p:nvGrpSpPr>
+      <p:grpSpPr>
+        <a:xfrm>
+          <a:off x="0" y="0"/>
+          <a:ext cx="0" cy="0"/>
+          <a:chOff x="0" y="0"/>
+          <a:chExt cx="0" cy="0"/>
+        </a:xfrm>
+      </p:grpSpPr>
+    </p:spTree>
+    <p:extLst>
+      <p:ext uri="{BB962C8B-B14F-4D97-AF65-F5344CB8AC3E}">
+        <p14:creationId xmlns:p14="http://schemas.microsoft.com/office/powerpoint/2010/main" val="2079898941"/>
+      </p:ext>
+    </p:extLst>
+  </p:cSld>
+  <p:clrMapOvr>
+    <a:masterClrMapping/>
+  </p:clrMapOvr>
+</p:sld>
+</file>
+
+<file path=ppt/slides/slide9.xml><?xml version="1.0" encoding="utf-8"?>
+<p:sld xmlns:a="http://schemas.openxmlformats.org/drawingml/2006/main" xmlns:r="http://schemas.openxmlformats.org/officeDocument/2006/relationships" xmlns:p="http://schemas.openxmlformats.org/presentationml/2006/main">
+  <p:cSld>
+    <p:spTree>
+      <p:nvGrpSpPr>
+        <p:cNvPr id="1" name=""/>
+        <p:cNvGrpSpPr/>
+        <p:nvPr/>
+      </p:nvGrpSpPr>
+      <p:grpSpPr>
+        <a:xfrm>
+          <a:off x="0" y="0"/>
+          <a:ext cx="0" cy="0"/>
+          <a:chOff x="0" y="0"/>
+          <a:chExt cx="0" cy="0"/>
+        </a:xfrm>
+      </p:grpSpPr>
+    </p:spTree>
+    <p:extLst>
+      <p:ext uri="{BB962C8B-B14F-4D97-AF65-F5344CB8AC3E}">
+        <p14:creationId xmlns:p14="http://schemas.microsoft.com/office/powerpoint/2010/main" val="1109693138"/>
+      </p:ext>
+    </p:extLst>
+  </p:cSld>
+  <p:clrMapOvr>
+    <a:masterClrMapping/>
+  </p:clrMapOvr>
+</p:sld>
+</file>
+
 <file path=ppt/theme/theme1.xml><?xml version="1.0" encoding="utf-8"?>
 <a:theme xmlns:a="http://schemas.openxmlformats.org/drawingml/2006/main" name="Office Theme">
   <a:themeElements>
-    <a:clrScheme name="Office">
+    <a:clrScheme name="Office Theme">
       <a:dk1>
         <a:sysClr val="windowText" lastClr="000000"/>
       </a:dk1>
@@ -3934,7 +4824,7 @@
         <a:srgbClr val="954F72"/>
       </a:folHlink>
     </a:clrScheme>
-    <a:fontScheme name="Office">
+    <a:fontScheme name="Office Theme">
       <a:majorFont>
         <a:latin typeface="Calibri Light" panose="020F0302020204030204"/>
         <a:ea typeface=""/>
@@ -3969,23 +4859,6 @@
         <a:font script="Viet" typeface="Times New Roman"/>
         <a:font script="Uigh" typeface="Microsoft Uighur"/>
         <a:font script="Geor" typeface="Sylfaen"/>
-        <a:font script="Armn" typeface="Arial"/>
-        <a:font script="Bugi" typeface="Leelawadee UI"/>
-        <a:font script="Bopo" typeface="Microsoft JhengHei"/>
-        <a:font script="Java" typeface="Javanese Text"/>
-        <a:font script="Lisu" typeface="Segoe UI"/>
-        <a:font script="Mymr" typeface="Myanmar Text"/>
-        <a:font script="Nkoo" typeface="Ebrima"/>
-        <a:font script="Olck" typeface="Nirmala UI"/>
-        <a:font script="Osma" typeface="Ebrima"/>
-        <a:font script="Phag" typeface="Phagspa"/>
-        <a:font script="Syrn" typeface="Estrangelo Edessa"/>
-        <a:font script="Syrj" typeface="Estrangelo Edessa"/>
-        <a:font script="Syre" typeface="Estrangelo Edessa"/>
-        <a:font script="Sora" typeface="Nirmala UI"/>
-        <a:font script="Tale" typeface="Microsoft Tai Le"/>
-        <a:font script="Talu" typeface="Microsoft New Tai Lue"/>
-        <a:font script="Tfng" typeface="Ebrima"/>
       </a:majorFont>
       <a:minorFont>
         <a:latin typeface="Calibri" panose="020F0502020204030204"/>
@@ -4021,26 +4894,9 @@
         <a:font script="Viet" typeface="Arial"/>
         <a:font script="Uigh" typeface="Microsoft Uighur"/>
         <a:font script="Geor" typeface="Sylfaen"/>
-        <a:font script="Armn" typeface="Arial"/>
-        <a:font script="Bugi" typeface="Leelawadee UI"/>
-        <a:font script="Bopo" typeface="Microsoft JhengHei"/>
-        <a:font script="Java" typeface="Javanese Text"/>
-        <a:font script="Lisu" typeface="Segoe UI"/>
-        <a:font script="Mymr" typeface="Myanmar Text"/>
-        <a:font script="Nkoo" typeface="Ebrima"/>
-        <a:font script="Olck" typeface="Nirmala UI"/>
-        <a:font script="Osma" typeface="Ebrima"/>
-        <a:font script="Phag" typeface="Phagspa"/>
-        <a:font script="Syrn" typeface="Estrangelo Edessa"/>
-        <a:font script="Syrj" typeface="Estrangelo Edessa"/>
-        <a:font script="Syre" typeface="Estrangelo Edessa"/>
-        <a:font script="Sora" typeface="Nirmala UI"/>
-        <a:font script="Tale" typeface="Microsoft Tai Le"/>
-        <a:font script="Talu" typeface="Microsoft New Tai Lue"/>
-        <a:font script="Tfng" typeface="Ebrima"/>
       </a:minorFont>
     </a:fontScheme>
-    <a:fmtScheme name="Office">
+    <a:fmtScheme name="Office Theme">
       <a:fillStyleLst>
         <a:solidFill>
           <a:schemeClr val="phClr"/>

</xml_diff>

<commit_message>
Updates and switching to Matlab
</commit_message>
<xml_diff>
--- a/IOVWST-poster-draft.pptx
+++ b/IOVWST-poster-draft.pptx
@@ -305,7 +305,7 @@
           <a:p>
             <a:fld id="{AABE0D5F-EF8E-4089-A75E-93EF4FB18C62}" type="datetimeFigureOut">
               <a:rPr lang="en-US" smtClean="0"/>
-              <a:t>1/27/2021</a:t>
+              <a:t>1/29/2021</a:t>
             </a:fld>
             <a:endParaRPr lang="en-US"/>
           </a:p>
@@ -475,7 +475,7 @@
           <a:p>
             <a:fld id="{AABE0D5F-EF8E-4089-A75E-93EF4FB18C62}" type="datetimeFigureOut">
               <a:rPr lang="en-US" smtClean="0"/>
-              <a:t>1/27/2021</a:t>
+              <a:t>1/29/2021</a:t>
             </a:fld>
             <a:endParaRPr lang="en-US"/>
           </a:p>
@@ -655,7 +655,7 @@
           <a:p>
             <a:fld id="{AABE0D5F-EF8E-4089-A75E-93EF4FB18C62}" type="datetimeFigureOut">
               <a:rPr lang="en-US" smtClean="0"/>
-              <a:t>1/27/2021</a:t>
+              <a:t>1/29/2021</a:t>
             </a:fld>
             <a:endParaRPr lang="en-US"/>
           </a:p>
@@ -825,7 +825,7 @@
           <a:p>
             <a:fld id="{AABE0D5F-EF8E-4089-A75E-93EF4FB18C62}" type="datetimeFigureOut">
               <a:rPr lang="en-US" smtClean="0"/>
-              <a:t>1/27/2021</a:t>
+              <a:t>1/29/2021</a:t>
             </a:fld>
             <a:endParaRPr lang="en-US"/>
           </a:p>
@@ -1069,7 +1069,7 @@
           <a:p>
             <a:fld id="{AABE0D5F-EF8E-4089-A75E-93EF4FB18C62}" type="datetimeFigureOut">
               <a:rPr lang="en-US" smtClean="0"/>
-              <a:t>1/27/2021</a:t>
+              <a:t>1/29/2021</a:t>
             </a:fld>
             <a:endParaRPr lang="en-US"/>
           </a:p>
@@ -1301,7 +1301,7 @@
           <a:p>
             <a:fld id="{AABE0D5F-EF8E-4089-A75E-93EF4FB18C62}" type="datetimeFigureOut">
               <a:rPr lang="en-US" smtClean="0"/>
-              <a:t>1/27/2021</a:t>
+              <a:t>1/29/2021</a:t>
             </a:fld>
             <a:endParaRPr lang="en-US"/>
           </a:p>
@@ -1668,7 +1668,7 @@
           <a:p>
             <a:fld id="{AABE0D5F-EF8E-4089-A75E-93EF4FB18C62}" type="datetimeFigureOut">
               <a:rPr lang="en-US" smtClean="0"/>
-              <a:t>1/27/2021</a:t>
+              <a:t>1/29/2021</a:t>
             </a:fld>
             <a:endParaRPr lang="en-US"/>
           </a:p>
@@ -1786,7 +1786,7 @@
           <a:p>
             <a:fld id="{AABE0D5F-EF8E-4089-A75E-93EF4FB18C62}" type="datetimeFigureOut">
               <a:rPr lang="en-US" smtClean="0"/>
-              <a:t>1/27/2021</a:t>
+              <a:t>1/29/2021</a:t>
             </a:fld>
             <a:endParaRPr lang="en-US"/>
           </a:p>
@@ -1881,7 +1881,7 @@
           <a:p>
             <a:fld id="{AABE0D5F-EF8E-4089-A75E-93EF4FB18C62}" type="datetimeFigureOut">
               <a:rPr lang="en-US" smtClean="0"/>
-              <a:t>1/27/2021</a:t>
+              <a:t>1/29/2021</a:t>
             </a:fld>
             <a:endParaRPr lang="en-US"/>
           </a:p>
@@ -2158,7 +2158,7 @@
           <a:p>
             <a:fld id="{AABE0D5F-EF8E-4089-A75E-93EF4FB18C62}" type="datetimeFigureOut">
               <a:rPr lang="en-US" smtClean="0"/>
-              <a:t>1/27/2021</a:t>
+              <a:t>1/29/2021</a:t>
             </a:fld>
             <a:endParaRPr lang="en-US"/>
           </a:p>
@@ -2415,7 +2415,7 @@
           <a:p>
             <a:fld id="{AABE0D5F-EF8E-4089-A75E-93EF4FB18C62}" type="datetimeFigureOut">
               <a:rPr lang="en-US" smtClean="0"/>
-              <a:t>1/27/2021</a:t>
+              <a:t>1/29/2021</a:t>
             </a:fld>
             <a:endParaRPr lang="en-US"/>
           </a:p>
@@ -2661,7 +2661,7 @@
           <a:p>
             <a:fld id="{AABE0D5F-EF8E-4089-A75E-93EF4FB18C62}" type="datetimeFigureOut">
               <a:rPr lang="en-US" smtClean="0"/>
-              <a:t>1/27/2021</a:t>
+              <a:t>1/29/2021</a:t>
             </a:fld>
             <a:endParaRPr lang="en-US"/>
           </a:p>
@@ -3646,13 +3646,13 @@
       <p:bgPr>
         <a:gradFill flip="none" rotWithShape="1">
           <a:gsLst>
-            <a:gs pos="43000">
+            <a:gs pos="34000">
               <a:schemeClr val="accent1">
                 <a:lumMod val="60000"/>
                 <a:lumOff val="40000"/>
               </a:schemeClr>
             </a:gs>
-            <a:gs pos="9000">
+            <a:gs pos="0">
               <a:srgbClr val="D1476E"/>
             </a:gs>
             <a:gs pos="74000">
@@ -3708,8 +3708,8 @@
         </p:nvSpPr>
         <p:spPr>
           <a:xfrm>
-            <a:off x="0" y="-26894"/>
-            <a:ext cx="8811491" cy="41148000"/>
+            <a:off x="-1" y="-26894"/>
+            <a:ext cx="11486169" cy="41148000"/>
           </a:xfrm>
           <a:prstGeom prst="rect">
             <a:avLst/>
@@ -3764,8 +3764,8 @@
         </p:nvSpPr>
         <p:spPr>
           <a:xfrm>
-            <a:off x="34747200" y="0"/>
-            <a:ext cx="6400799" cy="41148000"/>
+            <a:off x="33008387" y="0"/>
+            <a:ext cx="8139613" cy="41148000"/>
           </a:xfrm>
           <a:prstGeom prst="rect">
             <a:avLst/>
@@ -3798,7 +3798,7 @@
           <a:lstStyle/>
           <a:p>
             <a:pPr algn="ctr"/>
-            <a:endParaRPr lang="en-US"/>
+            <a:endParaRPr lang="en-US" dirty="0"/>
           </a:p>
         </p:txBody>
       </p:sp>
@@ -3817,7 +3817,7 @@
         <p:spPr>
           <a:xfrm>
             <a:off x="1" y="26894"/>
-            <a:ext cx="8337176" cy="3785652"/>
+            <a:ext cx="11486164" cy="4154984"/>
           </a:xfrm>
           <a:prstGeom prst="rect">
             <a:avLst/>
@@ -3831,13 +3831,13 @@
           <a:lstStyle/>
           <a:p>
             <a:r>
-              <a:rPr lang="en-US" sz="6000" b="1" dirty="0">
+              <a:rPr lang="en-US" sz="6600" b="1" dirty="0">
                 <a:latin typeface="Arial" panose="020B0604020202020204" pitchFamily="34" charset="0"/>
                 <a:cs typeface="Arial" panose="020B0604020202020204" pitchFamily="34" charset="0"/>
               </a:rPr>
               <a:t>Marine heat waves in the Chile-Peru Eastern Boundary Upwelling System:</a:t>
             </a:r>
-            <a:endParaRPr lang="en-US" sz="6000" b="1" dirty="0"/>
+            <a:endParaRPr lang="en-US" sz="6600" b="1" dirty="0"/>
           </a:p>
         </p:txBody>
       </p:sp>
@@ -3855,8 +3855,8 @@
         </p:nvSpPr>
         <p:spPr>
           <a:xfrm>
-            <a:off x="0" y="3812546"/>
-            <a:ext cx="8337176" cy="3046988"/>
+            <a:off x="-3" y="4430485"/>
+            <a:ext cx="11486164" cy="2308324"/>
           </a:xfrm>
           <a:prstGeom prst="rect">
             <a:avLst/>
@@ -3895,7 +3895,7 @@
         <p:spPr>
           <a:xfrm>
             <a:off x="-3" y="11571497"/>
-            <a:ext cx="8337176" cy="8956298"/>
+            <a:ext cx="11486168" cy="6740307"/>
           </a:xfrm>
           <a:prstGeom prst="rect">
             <a:avLst/>
@@ -3977,7 +3977,7 @@
         <p:spPr>
           <a:xfrm>
             <a:off x="67350" y="20916923"/>
-            <a:ext cx="8337175" cy="11172289"/>
+            <a:ext cx="11418817" cy="7478970"/>
           </a:xfrm>
           <a:prstGeom prst="rect">
             <a:avLst/>
@@ -4105,7 +4105,7 @@
         <p:spPr>
           <a:xfrm>
             <a:off x="-1" y="35335260"/>
-            <a:ext cx="8337174" cy="3785652"/>
+            <a:ext cx="11486168" cy="3046988"/>
           </a:xfrm>
           <a:prstGeom prst="rect">
             <a:avLst/>
@@ -4159,8 +4159,8 @@
         </p:nvSpPr>
         <p:spPr>
           <a:xfrm>
-            <a:off x="12681375" y="16957351"/>
-            <a:ext cx="3892412" cy="1323439"/>
+            <a:off x="12887152" y="17423174"/>
+            <a:ext cx="18646984" cy="6247864"/>
           </a:xfrm>
           <a:prstGeom prst="rect">
             <a:avLst/>
@@ -4168,17 +4168,60 @@
           <a:noFill/>
         </p:spPr>
         <p:txBody>
-          <a:bodyPr wrap="none" rtlCol="0">
+          <a:bodyPr wrap="square" rtlCol="0">
             <a:spAutoFit/>
           </a:bodyPr>
           <a:lstStyle/>
           <a:p>
+            <a:pPr algn="just"/>
             <a:r>
               <a:rPr lang="en-US" sz="8000" dirty="0">
                 <a:latin typeface="Arial" panose="020B0604020202020204" pitchFamily="34" charset="0"/>
                 <a:cs typeface="Arial" panose="020B0604020202020204" pitchFamily="34" charset="0"/>
               </a:rPr>
-              <a:t>Finding:</a:t>
+              <a:t>Of all </a:t>
+            </a:r>
+            <a:r>
+              <a:rPr lang="en-US" sz="8000" b="1" dirty="0">
+                <a:latin typeface="Arial" panose="020B0604020202020204" pitchFamily="34" charset="0"/>
+                <a:cs typeface="Arial" panose="020B0604020202020204" pitchFamily="34" charset="0"/>
+              </a:rPr>
+              <a:t>SST anomalies</a:t>
+            </a:r>
+            <a:r>
+              <a:rPr lang="en-US" sz="8000" dirty="0">
+                <a:latin typeface="Arial" panose="020B0604020202020204" pitchFamily="34" charset="0"/>
+                <a:cs typeface="Arial" panose="020B0604020202020204" pitchFamily="34" charset="0"/>
+              </a:rPr>
+              <a:t> in the Punta </a:t>
+            </a:r>
+            <a:r>
+              <a:rPr lang="en-US" sz="8000" dirty="0" err="1">
+                <a:latin typeface="Arial" panose="020B0604020202020204" pitchFamily="34" charset="0"/>
+                <a:cs typeface="Arial" panose="020B0604020202020204" pitchFamily="34" charset="0"/>
+              </a:rPr>
+              <a:t>Lavapie</a:t>
+            </a:r>
+            <a:r>
+              <a:rPr lang="en-US" sz="8000" dirty="0">
+                <a:latin typeface="Arial" panose="020B0604020202020204" pitchFamily="34" charset="0"/>
+                <a:cs typeface="Arial" panose="020B0604020202020204" pitchFamily="34" charset="0"/>
+              </a:rPr>
+              <a:t> Upwelling Center, </a:t>
+            </a:r>
+            <a:r>
+              <a:rPr lang="en-US" sz="8000" b="1" dirty="0">
+                <a:latin typeface="Arial" panose="020B0604020202020204" pitchFamily="34" charset="0"/>
+                <a:cs typeface="Arial" panose="020B0604020202020204" pitchFamily="34" charset="0"/>
+              </a:rPr>
+              <a:t>the most extreme are dominated by positive anomalies </a:t>
+            </a:r>
+            <a:r>
+              <a:rPr lang="en-US" sz="8000" dirty="0">
+                <a:latin typeface="Arial" panose="020B0604020202020204" pitchFamily="34" charset="0"/>
+                <a:cs typeface="Arial" panose="020B0604020202020204" pitchFamily="34" charset="0"/>
+              </a:rPr>
+              <a:t>which occur most often in the Austral Summer.</a:t>
             </a:r>
           </a:p>
         </p:txBody>
@@ -4235,8 +4278,8 @@
         </p:nvSpPr>
         <p:spPr>
           <a:xfrm>
-            <a:off x="34702934" y="30196386"/>
-            <a:ext cx="6400801" cy="3785652"/>
+            <a:off x="33008387" y="30567303"/>
+            <a:ext cx="8095349" cy="4524315"/>
           </a:xfrm>
           <a:prstGeom prst="rect">
             <a:avLst/>
@@ -4250,7 +4293,7 @@
           <a:lstStyle/>
           <a:p>
             <a:r>
-              <a:rPr lang="en-US" sz="4000" dirty="0">
+              <a:rPr lang="en-US" sz="4800" dirty="0">
                 <a:latin typeface="Arial" panose="020B0604020202020204" pitchFamily="34" charset="0"/>
                 <a:cs typeface="Arial" panose="020B0604020202020204" pitchFamily="34" charset="0"/>
               </a:rPr>
@@ -4259,41 +4302,41 @@
           </a:p>
           <a:p>
             <a:r>
-              <a:rPr lang="en-US" sz="4000" dirty="0">
+              <a:rPr lang="en-US" sz="4800" dirty="0">
                 <a:latin typeface="Arial" panose="020B0604020202020204" pitchFamily="34" charset="0"/>
                 <a:cs typeface="Arial" panose="020B0604020202020204" pitchFamily="34" charset="0"/>
               </a:rPr>
               <a:t>Kylene Cooley, Melanie R. </a:t>
             </a:r>
             <a:r>
-              <a:rPr lang="en-US" sz="4000" dirty="0" err="1">
+              <a:rPr lang="en-US" sz="4800" dirty="0" err="1">
                 <a:latin typeface="Arial" panose="020B0604020202020204" pitchFamily="34" charset="0"/>
                 <a:cs typeface="Arial" panose="020B0604020202020204" pitchFamily="34" charset="0"/>
               </a:rPr>
               <a:t>Fewings</a:t>
             </a:r>
             <a:r>
-              <a:rPr lang="en-US" sz="4000" dirty="0">
+              <a:rPr lang="en-US" sz="4800" dirty="0">
                 <a:latin typeface="Arial" panose="020B0604020202020204" pitchFamily="34" charset="0"/>
                 <a:cs typeface="Arial" panose="020B0604020202020204" pitchFamily="34" charset="0"/>
               </a:rPr>
               <a:t>, Jim </a:t>
             </a:r>
             <a:r>
-              <a:rPr lang="en-US" sz="4000" dirty="0" err="1">
+              <a:rPr lang="en-US" sz="4800" dirty="0" err="1">
                 <a:latin typeface="Arial" panose="020B0604020202020204" pitchFamily="34" charset="0"/>
                 <a:cs typeface="Arial" panose="020B0604020202020204" pitchFamily="34" charset="0"/>
               </a:rPr>
               <a:t>Lerczak</a:t>
             </a:r>
-            <a:endParaRPr lang="en-US" sz="4000" dirty="0">
+            <a:endParaRPr lang="en-US" sz="4800" dirty="0">
               <a:latin typeface="Arial" panose="020B0604020202020204" pitchFamily="34" charset="0"/>
               <a:cs typeface="Arial" panose="020B0604020202020204" pitchFamily="34" charset="0"/>
             </a:endParaRPr>
           </a:p>
           <a:p>
             <a:r>
-              <a:rPr lang="en-US" sz="4000" dirty="0">
+              <a:rPr lang="en-US" sz="4800" dirty="0">
                 <a:latin typeface="Arial" panose="020B0604020202020204" pitchFamily="34" charset="0"/>
                 <a:cs typeface="Arial" panose="020B0604020202020204" pitchFamily="34" charset="0"/>
               </a:rPr>
@@ -4302,7 +4345,7 @@
           </a:p>
           <a:p>
             <a:r>
-              <a:rPr lang="en-US" sz="4000" dirty="0">
+              <a:rPr lang="en-US" sz="4800" dirty="0">
                 <a:latin typeface="Arial" panose="020B0604020202020204" pitchFamily="34" charset="0"/>
                 <a:cs typeface="Arial" panose="020B0604020202020204" pitchFamily="34" charset="0"/>
                 <a:hlinkClick r:id="rId2"/>
@@ -4310,7 +4353,7 @@
               <a:t>cooleyky@oregonstate.edu</a:t>
             </a:r>
             <a:r>
-              <a:rPr lang="en-US" sz="4000" dirty="0">
+              <a:rPr lang="en-US" sz="4800" dirty="0">
                 <a:latin typeface="Arial" panose="020B0604020202020204" pitchFamily="34" charset="0"/>
                 <a:cs typeface="Arial" panose="020B0604020202020204" pitchFamily="34" charset="0"/>
               </a:rPr>
@@ -4404,10 +4447,10 @@
       </p:sp>
       <p:pic>
         <p:nvPicPr>
-          <p:cNvPr id="18" name="Picture 17">
+          <p:cNvPr id="19" name="Picture 18">
             <a:extLst>
               <a:ext uri="{FF2B5EF4-FFF2-40B4-BE49-F238E27FC236}">
-                <a16:creationId xmlns:a16="http://schemas.microsoft.com/office/drawing/2014/main" id="{2ABD314A-99BF-45D2-AB95-1BED70742BFB}"/>
+                <a16:creationId xmlns:a16="http://schemas.microsoft.com/office/drawing/2014/main" id="{7B50CA91-35CF-43D2-84B0-BF84705B646D}"/>
               </a:ext>
             </a:extLst>
           </p:cNvPr>
@@ -4424,38 +4467,8 @@
         </p:blipFill>
         <p:spPr>
           <a:xfrm>
-            <a:off x="12681375" y="26503067"/>
-            <a:ext cx="18977750" cy="9629184"/>
-          </a:xfrm>
-          <a:prstGeom prst="rect">
-            <a:avLst/>
-          </a:prstGeom>
-        </p:spPr>
-      </p:pic>
-      <p:pic>
-        <p:nvPicPr>
-          <p:cNvPr id="19" name="Picture 18">
-            <a:extLst>
-              <a:ext uri="{FF2B5EF4-FFF2-40B4-BE49-F238E27FC236}">
-                <a16:creationId xmlns:a16="http://schemas.microsoft.com/office/drawing/2014/main" id="{7B50CA91-35CF-43D2-84B0-BF84705B646D}"/>
-              </a:ext>
-            </a:extLst>
-          </p:cNvPr>
-          <p:cNvPicPr>
-            <a:picLocks noChangeAspect="1"/>
-          </p:cNvPicPr>
-          <p:nvPr/>
-        </p:nvPicPr>
-        <p:blipFill>
-          <a:blip r:embed="rId5"/>
-          <a:stretch>
-            <a:fillRect/>
-          </a:stretch>
-        </p:blipFill>
-        <p:spPr>
-          <a:xfrm>
-            <a:off x="35287603" y="7417193"/>
-            <a:ext cx="5231464" cy="2596107"/>
+            <a:off x="33399877" y="6795046"/>
+            <a:ext cx="7628538" cy="3785652"/>
           </a:xfrm>
           <a:prstGeom prst="rect">
             <a:avLst/>
@@ -4477,15 +4490,15 @@
           <p:nvPr/>
         </p:nvPicPr>
         <p:blipFill>
-          <a:blip r:embed="rId6"/>
+          <a:blip r:embed="rId5"/>
           <a:stretch>
             <a:fillRect/>
           </a:stretch>
         </p:blipFill>
         <p:spPr>
           <a:xfrm>
-            <a:off x="35126832" y="10957176"/>
-            <a:ext cx="5553006" cy="2677188"/>
+            <a:off x="33176240" y="11470620"/>
+            <a:ext cx="7852175" cy="3785652"/>
           </a:xfrm>
           <a:prstGeom prst="rect">
             <a:avLst/>
@@ -4507,15 +4520,15 @@
           <p:nvPr/>
         </p:nvPicPr>
         <p:blipFill>
-          <a:blip r:embed="rId7"/>
+          <a:blip r:embed="rId6"/>
           <a:stretch>
             <a:fillRect/>
           </a:stretch>
         </p:blipFill>
         <p:spPr>
           <a:xfrm>
-            <a:off x="35287603" y="2514492"/>
-            <a:ext cx="5618773" cy="2596107"/>
+            <a:off x="33399877" y="2360985"/>
+            <a:ext cx="7506499" cy="3468315"/>
           </a:xfrm>
           <a:prstGeom prst="rect">
             <a:avLst/>
@@ -4536,8 +4549,8 @@
         </p:nvSpPr>
         <p:spPr>
           <a:xfrm>
-            <a:off x="34747199" y="36435668"/>
-            <a:ext cx="5771868" cy="1938992"/>
+            <a:off x="33008387" y="35833050"/>
+            <a:ext cx="7510680" cy="2308324"/>
           </a:xfrm>
           <a:prstGeom prst="rect">
             <a:avLst/>
@@ -4551,7 +4564,7 @@
           <a:lstStyle/>
           <a:p>
             <a:r>
-              <a:rPr lang="en-US" sz="4000" dirty="0">
+              <a:rPr lang="en-US" sz="4800" dirty="0">
                 <a:latin typeface="Arial" panose="020B0604020202020204" pitchFamily="34" charset="0"/>
                 <a:cs typeface="Arial" panose="020B0604020202020204" pitchFamily="34" charset="0"/>
               </a:rPr>
@@ -4560,6 +4573,78 @@
           </a:p>
         </p:txBody>
       </p:sp>
+      <p:pic>
+        <p:nvPicPr>
+          <p:cNvPr id="3" name="Picture 2">
+            <a:extLst>
+              <a:ext uri="{FF2B5EF4-FFF2-40B4-BE49-F238E27FC236}">
+                <a16:creationId xmlns:a16="http://schemas.microsoft.com/office/drawing/2014/main" id="{538C57FE-ADC0-42E8-A490-6BE74D89B006}"/>
+              </a:ext>
+            </a:extLst>
+          </p:cNvPr>
+          <p:cNvPicPr>
+            <a:picLocks noChangeAspect="1"/>
+          </p:cNvPicPr>
+          <p:nvPr/>
+        </p:nvPicPr>
+        <p:blipFill>
+          <a:blip r:embed="rId7">
+            <a:extLst>
+              <a:ext uri="{28A0092B-C50C-407E-A947-70E740481C1C}">
+                <a14:useLocalDpi xmlns:a14="http://schemas.microsoft.com/office/drawing/2010/main" val="0"/>
+              </a:ext>
+            </a:extLst>
+          </a:blip>
+          <a:stretch>
+            <a:fillRect/>
+          </a:stretch>
+        </p:blipFill>
+        <p:spPr>
+          <a:xfrm>
+            <a:off x="12887155" y="28236136"/>
+            <a:ext cx="18720245" cy="11036280"/>
+          </a:xfrm>
+          <a:prstGeom prst="rect">
+            <a:avLst/>
+          </a:prstGeom>
+        </p:spPr>
+      </p:pic>
+      <p:pic>
+        <p:nvPicPr>
+          <p:cNvPr id="23" name="Picture 22">
+            <a:extLst>
+              <a:ext uri="{FF2B5EF4-FFF2-40B4-BE49-F238E27FC236}">
+                <a16:creationId xmlns:a16="http://schemas.microsoft.com/office/drawing/2014/main" id="{6FD37AEE-5B28-4961-B314-C634176B9A6C}"/>
+              </a:ext>
+            </a:extLst>
+          </p:cNvPr>
+          <p:cNvPicPr>
+            <a:picLocks noChangeAspect="1"/>
+          </p:cNvPicPr>
+          <p:nvPr/>
+        </p:nvPicPr>
+        <p:blipFill>
+          <a:blip r:embed="rId8">
+            <a:extLst>
+              <a:ext uri="{28A0092B-C50C-407E-A947-70E740481C1C}">
+                <a14:useLocalDpi xmlns:a14="http://schemas.microsoft.com/office/drawing/2010/main" val="0"/>
+              </a:ext>
+            </a:extLst>
+          </a:blip>
+          <a:stretch>
+            <a:fillRect/>
+          </a:stretch>
+        </p:blipFill>
+        <p:spPr>
+          <a:xfrm>
+            <a:off x="19314249" y="7919132"/>
+            <a:ext cx="6787576" cy="6787576"/>
+          </a:xfrm>
+          <a:prstGeom prst="rect">
+            <a:avLst/>
+          </a:prstGeom>
+        </p:spPr>
+      </p:pic>
     </p:spTree>
     <p:extLst>
       <p:ext uri="{BB962C8B-B14F-4D97-AF65-F5344CB8AC3E}">

</xml_diff>